<commit_message>
add mid-term repo ppt-v2
</commit_message>
<xml_diff>
--- a/中期报告-04-08.pptx
+++ b/中期报告-04-08.pptx
@@ -3924,6 +3924,19 @@
                 </a:spcAft>
               </a:pPr>
               <a:r>
+                <a:rPr lang="zh-CN" altLang="en-US" sz="5400" b="1">
+                  <a:solidFill>
+                    <a:schemeClr val="tx2">
+                      <a:lumMod val="75000"/>
+                    </a:schemeClr>
+                  </a:solidFill>
+                  <a:latin typeface="黑体" pitchFamily="49" charset="-122"/>
+                  <a:ea typeface="黑体" pitchFamily="49" charset="-122"/>
+                  <a:sym typeface="SimSun-ExtB" panose="02010609060101010101" pitchFamily="49" charset="-122"/>
+                </a:rPr>
+                <a:t>毕业设计中期</a:t>
+              </a:r>
+              <a:r>
                 <a:rPr lang="zh-CN" altLang="en-US" sz="5400" b="1" dirty="0">
                   <a:solidFill>
                     <a:schemeClr val="tx2">
@@ -3934,7 +3947,7 @@
                   <a:ea typeface="黑体" pitchFamily="49" charset="-122"/>
                   <a:sym typeface="SimSun-ExtB" panose="02010609060101010101" pitchFamily="49" charset="-122"/>
                 </a:rPr>
-                <a:t>本科毕设中期答辩</a:t>
+                <a:t>报告</a:t>
               </a:r>
             </a:p>
           </p:txBody>

</xml_diff>

<commit_message>
add mid-term repo ppt-v3
</commit_message>
<xml_diff>
--- a/中期报告-04-08.pptx
+++ b/中期报告-04-08.pptx
@@ -5,7 +5,7 @@
     <p:sldMasterId id="2147483648" r:id="rId1"/>
   </p:sldMasterIdLst>
   <p:notesMasterIdLst>
-    <p:notesMasterId r:id="rId17"/>
+    <p:notesMasterId r:id="rId16"/>
   </p:notesMasterIdLst>
   <p:sldIdLst>
     <p:sldId id="256" r:id="rId2"/>
@@ -15,14 +15,13 @@
     <p:sldId id="274" r:id="rId6"/>
     <p:sldId id="287" r:id="rId7"/>
     <p:sldId id="288" r:id="rId8"/>
-    <p:sldId id="284" r:id="rId9"/>
-    <p:sldId id="285" r:id="rId10"/>
-    <p:sldId id="286" r:id="rId11"/>
-    <p:sldId id="275" r:id="rId12"/>
-    <p:sldId id="289" r:id="rId13"/>
-    <p:sldId id="278" r:id="rId14"/>
-    <p:sldId id="276" r:id="rId15"/>
-    <p:sldId id="272" r:id="rId16"/>
+    <p:sldId id="285" r:id="rId9"/>
+    <p:sldId id="286" r:id="rId10"/>
+    <p:sldId id="275" r:id="rId11"/>
+    <p:sldId id="289" r:id="rId12"/>
+    <p:sldId id="278" r:id="rId13"/>
+    <p:sldId id="276" r:id="rId14"/>
+    <p:sldId id="272" r:id="rId15"/>
   </p:sldIdLst>
   <p:sldSz cx="12192000" cy="6858000"/>
   <p:notesSz cx="6858000" cy="9144000"/>
@@ -4127,360 +4126,6 @@
       <p:bgPr>
         <a:blipFill rotWithShape="1">
           <a:blip r:embed="rId2" cstate="print">
-            <a:alphaModFix amt="39000"/>
-          </a:blip>
-          <a:stretch>
-            <a:fillRect l="-5000" t="-9000" r="-10000" b="-13000"/>
-          </a:stretch>
-        </a:blipFill>
-        <a:effectLst/>
-      </p:bgPr>
-    </p:bg>
-    <p:spTree>
-      <p:nvGrpSpPr>
-        <p:cNvPr id="1" name="">
-          <a:extLst>
-            <a:ext uri="{FF2B5EF4-FFF2-40B4-BE49-F238E27FC236}">
-              <a16:creationId xmlns:a16="http://schemas.microsoft.com/office/drawing/2014/main" id="{D7B3757C-37F6-3F39-162E-7DFBE4B8DCFD}"/>
-            </a:ext>
-          </a:extLst>
-        </p:cNvPr>
-        <p:cNvGrpSpPr/>
-        <p:nvPr/>
-      </p:nvGrpSpPr>
-      <p:grpSpPr>
-        <a:xfrm>
-          <a:off x="0" y="0"/>
-          <a:ext cx="0" cy="0"/>
-          <a:chOff x="0" y="0"/>
-          <a:chExt cx="0" cy="0"/>
-        </a:xfrm>
-      </p:grpSpPr>
-      <p:sp>
-        <p:nvSpPr>
-          <p:cNvPr id="1048856" name="燕尾形 9">
-            <a:extLst>
-              <a:ext uri="{FF2B5EF4-FFF2-40B4-BE49-F238E27FC236}">
-                <a16:creationId xmlns:a16="http://schemas.microsoft.com/office/drawing/2014/main" id="{8D390BBA-B652-3C0B-375B-658863095F5F}"/>
-              </a:ext>
-            </a:extLst>
-          </p:cNvPr>
-          <p:cNvSpPr/>
-          <p:nvPr/>
-        </p:nvSpPr>
-        <p:spPr>
-          <a:xfrm>
-            <a:off x="849630" y="494030"/>
-            <a:ext cx="812800" cy="340360"/>
-          </a:xfrm>
-          <a:prstGeom prst="chevron">
-            <a:avLst/>
-          </a:prstGeom>
-          <a:solidFill>
-            <a:schemeClr val="tx2">
-              <a:lumMod val="40000"/>
-              <a:lumOff val="60000"/>
-            </a:schemeClr>
-          </a:solidFill>
-          <a:ln>
-            <a:noFill/>
-          </a:ln>
-        </p:spPr>
-        <p:style>
-          <a:lnRef idx="2">
-            <a:schemeClr val="accent1">
-              <a:shade val="50000"/>
-            </a:schemeClr>
-          </a:lnRef>
-          <a:fillRef idx="1">
-            <a:schemeClr val="accent1"/>
-          </a:fillRef>
-          <a:effectRef idx="0">
-            <a:schemeClr val="accent1"/>
-          </a:effectRef>
-          <a:fontRef idx="minor">
-            <a:schemeClr val="lt1"/>
-          </a:fontRef>
-        </p:style>
-        <p:txBody>
-          <a:bodyPr rtlCol="0" anchor="ctr"/>
-          <a:lstStyle/>
-          <a:p>
-            <a:pPr algn="ctr"/>
-            <a:endParaRPr lang="zh-CN" altLang="en-US"/>
-          </a:p>
-        </p:txBody>
-      </p:sp>
-      <p:sp>
-        <p:nvSpPr>
-          <p:cNvPr id="1048857" name="文本框 39">
-            <a:extLst>
-              <a:ext uri="{FF2B5EF4-FFF2-40B4-BE49-F238E27FC236}">
-                <a16:creationId xmlns:a16="http://schemas.microsoft.com/office/drawing/2014/main" id="{0F29EE2C-E958-1EBC-06F3-BC4368123B5D}"/>
-              </a:ext>
-            </a:extLst>
-          </p:cNvPr>
-          <p:cNvSpPr txBox="1"/>
-          <p:nvPr/>
-        </p:nvSpPr>
-        <p:spPr>
-          <a:xfrm>
-            <a:off x="1783080" y="361950"/>
-            <a:ext cx="5379720" cy="584775"/>
-          </a:xfrm>
-          <a:prstGeom prst="rect">
-            <a:avLst/>
-          </a:prstGeom>
-          <a:noFill/>
-          <a:ln w="9525">
-            <a:noFill/>
-          </a:ln>
-        </p:spPr>
-        <p:txBody>
-          <a:bodyPr wrap="square" anchor="t">
-            <a:spAutoFit/>
-          </a:bodyPr>
-          <a:lstStyle/>
-          <a:p>
-            <a:r>
-              <a:rPr lang="en-US" altLang="zh-CN" sz="3200" b="0" dirty="0">
-                <a:solidFill>
-                  <a:srgbClr val="000000"/>
-                </a:solidFill>
-                <a:effectLst/>
-                <a:highlight>
-                  <a:srgbClr val="FFFFFF"/>
-                </a:highlight>
-                <a:latin typeface="Consolas" panose="020B0609020204030204" pitchFamily="49" charset="0"/>
-              </a:rPr>
-              <a:t>reL4</a:t>
-            </a:r>
-            <a:r>
-              <a:rPr lang="zh-CN" altLang="en-US" sz="3200" b="0" dirty="0">
-                <a:solidFill>
-                  <a:srgbClr val="000000"/>
-                </a:solidFill>
-                <a:effectLst/>
-                <a:highlight>
-                  <a:srgbClr val="FFFFFF"/>
-                </a:highlight>
-                <a:latin typeface="Consolas" panose="020B0609020204030204" pitchFamily="49" charset="0"/>
-              </a:rPr>
-              <a:t>异步</a:t>
-            </a:r>
-            <a:r>
-              <a:rPr lang="en-US" altLang="zh-CN" sz="3200" b="0" dirty="0">
-                <a:solidFill>
-                  <a:srgbClr val="000000"/>
-                </a:solidFill>
-                <a:effectLst/>
-                <a:highlight>
-                  <a:srgbClr val="FFFFFF"/>
-                </a:highlight>
-                <a:latin typeface="Consolas" panose="020B0609020204030204" pitchFamily="49" charset="0"/>
-              </a:rPr>
-              <a:t>IPC</a:t>
-            </a:r>
-            <a:r>
-              <a:rPr lang="zh-CN" altLang="en-US" sz="3200" b="0" dirty="0">
-                <a:solidFill>
-                  <a:srgbClr val="000000"/>
-                </a:solidFill>
-                <a:effectLst/>
-                <a:highlight>
-                  <a:srgbClr val="FFFFFF"/>
-                </a:highlight>
-                <a:latin typeface="Consolas" panose="020B0609020204030204" pitchFamily="49" charset="0"/>
-              </a:rPr>
-              <a:t>实验</a:t>
-            </a:r>
-          </a:p>
-        </p:txBody>
-      </p:sp>
-      <p:sp>
-        <p:nvSpPr>
-          <p:cNvPr id="1048858" name="矩形 16">
-            <a:extLst>
-              <a:ext uri="{FF2B5EF4-FFF2-40B4-BE49-F238E27FC236}">
-                <a16:creationId xmlns:a16="http://schemas.microsoft.com/office/drawing/2014/main" id="{50B68FEA-4DD6-81EB-9693-DDB769063201}"/>
-              </a:ext>
-            </a:extLst>
-          </p:cNvPr>
-          <p:cNvSpPr/>
-          <p:nvPr/>
-        </p:nvSpPr>
-        <p:spPr>
-          <a:xfrm>
-            <a:off x="664431" y="1218648"/>
-            <a:ext cx="8117755" cy="400110"/>
-          </a:xfrm>
-          <a:prstGeom prst="rect">
-            <a:avLst/>
-          </a:prstGeom>
-          <a:noFill/>
-          <a:ln w="9525">
-            <a:noFill/>
-          </a:ln>
-        </p:spPr>
-        <p:txBody>
-          <a:bodyPr wrap="square" anchor="t">
-            <a:spAutoFit/>
-          </a:bodyPr>
-          <a:lstStyle/>
-          <a:p>
-            <a:r>
-              <a:rPr lang="en-US" altLang="zh-CN" sz="2000" dirty="0">
-                <a:solidFill>
-                  <a:srgbClr val="000000"/>
-                </a:solidFill>
-                <a:latin typeface="Consolas" panose="020B0609020204030204" pitchFamily="49" charset="0"/>
-                <a:sym typeface="SimSun-ExtB" panose="02010609060101010101" pitchFamily="49" charset="-122"/>
-              </a:rPr>
-              <a:t>3.</a:t>
-            </a:r>
-            <a:r>
-              <a:rPr lang="zh-CN" altLang="en-US" sz="2000" dirty="0">
-                <a:solidFill>
-                  <a:srgbClr val="000000"/>
-                </a:solidFill>
-                <a:latin typeface="Consolas" panose="020B0609020204030204" pitchFamily="49" charset="0"/>
-                <a:sym typeface="SimSun-ExtB" panose="02010609060101010101" pitchFamily="49" charset="-122"/>
-              </a:rPr>
-              <a:t>阅读技术文档并结合代码理解</a:t>
-            </a:r>
-            <a:r>
-              <a:rPr lang="en-US" altLang="zh-CN" sz="2000" dirty="0">
-                <a:solidFill>
-                  <a:srgbClr val="000000"/>
-                </a:solidFill>
-                <a:latin typeface="Consolas" panose="020B0609020204030204" pitchFamily="49" charset="0"/>
-                <a:sym typeface="SimSun-ExtB" panose="02010609060101010101" pitchFamily="49" charset="-122"/>
-              </a:rPr>
-              <a:t>reL4</a:t>
-            </a:r>
-            <a:r>
-              <a:rPr lang="zh-CN" altLang="en-US" sz="2000" dirty="0">
-                <a:solidFill>
-                  <a:srgbClr val="000000"/>
-                </a:solidFill>
-                <a:latin typeface="Consolas" panose="020B0609020204030204" pitchFamily="49" charset="0"/>
-                <a:sym typeface="SimSun-ExtB" panose="02010609060101010101" pitchFamily="49" charset="-122"/>
-              </a:rPr>
-              <a:t>异步</a:t>
-            </a:r>
-            <a:r>
-              <a:rPr lang="en-US" altLang="zh-CN" sz="2000" dirty="0">
-                <a:solidFill>
-                  <a:srgbClr val="000000"/>
-                </a:solidFill>
-                <a:latin typeface="Consolas" panose="020B0609020204030204" pitchFamily="49" charset="0"/>
-                <a:sym typeface="SimSun-ExtB" panose="02010609060101010101" pitchFamily="49" charset="-122"/>
-              </a:rPr>
-              <a:t>IPC</a:t>
-            </a:r>
-            <a:endParaRPr lang="zh-CN" altLang="en-US" sz="2000" dirty="0">
-              <a:solidFill>
-                <a:srgbClr val="2D3E50"/>
-              </a:solidFill>
-              <a:latin typeface="SimSun-ExtB" panose="02010609060101010101" pitchFamily="49" charset="-122"/>
-              <a:ea typeface="微软雅黑 Light" panose="020B0502040204020203" pitchFamily="34" charset="-122"/>
-              <a:sym typeface="SimSun-ExtB" panose="02010609060101010101" pitchFamily="49" charset="-122"/>
-            </a:endParaRPr>
-          </a:p>
-        </p:txBody>
-      </p:sp>
-      <p:pic>
-        <p:nvPicPr>
-          <p:cNvPr id="2097192" name="图片 3" descr="理工灰">
-            <a:extLst>
-              <a:ext uri="{FF2B5EF4-FFF2-40B4-BE49-F238E27FC236}">
-                <a16:creationId xmlns:a16="http://schemas.microsoft.com/office/drawing/2014/main" id="{4E12E03C-27C6-7B08-AD5D-91308F2E9793}"/>
-              </a:ext>
-            </a:extLst>
-          </p:cNvPr>
-          <p:cNvPicPr>
-            <a:picLocks noChangeAspect="1"/>
-          </p:cNvPicPr>
-          <p:nvPr/>
-        </p:nvPicPr>
-        <p:blipFill>
-          <a:blip r:embed="rId3" cstate="print"/>
-          <a:stretch>
-            <a:fillRect/>
-          </a:stretch>
-        </p:blipFill>
-        <p:spPr>
-          <a:xfrm>
-            <a:off x="11017250" y="279400"/>
-            <a:ext cx="873125" cy="752475"/>
-          </a:xfrm>
-          <a:prstGeom prst="rect">
-            <a:avLst/>
-          </a:prstGeom>
-          <a:noFill/>
-          <a:ln w="9525">
-            <a:noFill/>
-          </a:ln>
-        </p:spPr>
-      </p:pic>
-      <p:sp>
-        <p:nvSpPr>
-          <p:cNvPr id="2" name="灯片编号占位符 1">
-            <a:extLst>
-              <a:ext uri="{FF2B5EF4-FFF2-40B4-BE49-F238E27FC236}">
-                <a16:creationId xmlns:a16="http://schemas.microsoft.com/office/drawing/2014/main" id="{6069CFEF-DCB2-EE8E-9109-DA0AEF336CD3}"/>
-              </a:ext>
-            </a:extLst>
-          </p:cNvPr>
-          <p:cNvSpPr>
-            <a:spLocks noGrp="1"/>
-          </p:cNvSpPr>
-          <p:nvPr>
-            <p:ph type="sldNum" sz="quarter" idx="12"/>
-          </p:nvPr>
-        </p:nvSpPr>
-        <p:spPr/>
-        <p:txBody>
-          <a:bodyPr/>
-          <a:lstStyle/>
-          <a:p>
-            <a:pPr fontAlgn="auto"/>
-            <a:fld id="{CA2E1F5A-C151-4DEE-93E4-F5F32EEAF57D}" type="slidenum">
-              <a:rPr lang="zh-CN" altLang="en-US" strike="noStrike" noProof="1" smtClean="0">
-                <a:latin typeface="+mn-lt"/>
-                <a:ea typeface="+mn-ea"/>
-                <a:cs typeface="+mn-cs"/>
-              </a:rPr>
-              <a:pPr fontAlgn="auto"/>
-              <a:t>10</a:t>
-            </a:fld>
-            <a:endParaRPr lang="zh-CN" altLang="en-US" strike="noStrike" noProof="1"/>
-          </a:p>
-        </p:txBody>
-      </p:sp>
-    </p:spTree>
-    <p:extLst>
-      <p:ext uri="{BB962C8B-B14F-4D97-AF65-F5344CB8AC3E}">
-        <p14:creationId xmlns:p14="http://schemas.microsoft.com/office/powerpoint/2010/main" val="4194884469"/>
-      </p:ext>
-    </p:extLst>
-  </p:cSld>
-  <p:clrMapOvr>
-    <a:masterClrMapping/>
-  </p:clrMapOvr>
-  <p:transition>
-    <p:fade thruBlk="1"/>
-  </p:transition>
-</p:sld>
-</file>
-
-<file path=ppt/slides/slide11.xml><?xml version="1.0" encoding="utf-8"?>
-<p:sld xmlns:a="http://schemas.openxmlformats.org/drawingml/2006/main" xmlns:r="http://schemas.openxmlformats.org/officeDocument/2006/relationships" xmlns:p="http://schemas.openxmlformats.org/presentationml/2006/main" showMasterSp="0">
-  <p:cSld>
-    <p:bg>
-      <p:bgPr>
-        <a:blipFill rotWithShape="1">
-          <a:blip r:embed="rId2" cstate="print">
             <a:alphaModFix amt="74000"/>
           </a:blip>
           <a:stretch>
@@ -4726,7 +4371,7 @@
                 <a:cs typeface="+mn-cs"/>
               </a:rPr>
               <a:pPr fontAlgn="auto"/>
-              <a:t>11</a:t>
+              <a:t>10</a:t>
             </a:fld>
             <a:endParaRPr lang="zh-CN" altLang="en-US" strike="noStrike" noProof="1"/>
           </a:p>
@@ -4748,7 +4393,7 @@
 </p:sld>
 </file>
 
-<file path=ppt/slides/slide12.xml><?xml version="1.0" encoding="utf-8"?>
+<file path=ppt/slides/slide11.xml><?xml version="1.0" encoding="utf-8"?>
 <p:sld xmlns:a="http://schemas.openxmlformats.org/drawingml/2006/main" xmlns:r="http://schemas.openxmlformats.org/officeDocument/2006/relationships" xmlns:p="http://schemas.openxmlformats.org/presentationml/2006/main" showMasterSp="0">
   <p:cSld>
     <p:bg>
@@ -5232,7 +4877,7 @@
                 <a:cs typeface="+mn-cs"/>
               </a:rPr>
               <a:pPr fontAlgn="auto"/>
-              <a:t>12</a:t>
+              <a:t>11</a:t>
             </a:fld>
             <a:endParaRPr lang="zh-CN" altLang="en-US" strike="noStrike" noProof="1"/>
           </a:p>
@@ -5254,7 +4899,7 @@
 </p:sld>
 </file>
 
-<file path=ppt/slides/slide13.xml><?xml version="1.0" encoding="utf-8"?>
+<file path=ppt/slides/slide12.xml><?xml version="1.0" encoding="utf-8"?>
 <p:sld xmlns:a="http://schemas.openxmlformats.org/drawingml/2006/main" xmlns:r="http://schemas.openxmlformats.org/officeDocument/2006/relationships" xmlns:p="http://schemas.openxmlformats.org/presentationml/2006/main" showMasterSp="0">
   <p:cSld>
     <p:bg>
@@ -5506,7 +5151,7 @@
                 <a:cs typeface="+mn-cs"/>
               </a:rPr>
               <a:pPr fontAlgn="auto"/>
-              <a:t>13</a:t>
+              <a:t>12</a:t>
             </a:fld>
             <a:endParaRPr lang="zh-CN" altLang="en-US" strike="noStrike" noProof="1"/>
           </a:p>
@@ -5528,7 +5173,7 @@
 </p:sld>
 </file>
 
-<file path=ppt/slides/slide14.xml><?xml version="1.0" encoding="utf-8"?>
+<file path=ppt/slides/slide13.xml><?xml version="1.0" encoding="utf-8"?>
 <p:sld xmlns:a="http://schemas.openxmlformats.org/drawingml/2006/main" xmlns:r="http://schemas.openxmlformats.org/officeDocument/2006/relationships" xmlns:p="http://schemas.openxmlformats.org/presentationml/2006/main" showMasterSp="0">
   <p:cSld>
     <p:bg>
@@ -5660,7 +5305,7 @@
                 </a:highlight>
                 <a:latin typeface="Consolas" panose="020B0609020204030204" pitchFamily="49" charset="0"/>
               </a:rPr>
-              <a:t>毕设进度</a:t>
+              <a:t>进度进度安排</a:t>
             </a:r>
             <a:endParaRPr lang="zh-CN" altLang="en-US" sz="3200" b="0" dirty="0">
               <a:solidFill>
@@ -6025,7 +5670,7 @@
                 <a:cs typeface="+mn-cs"/>
               </a:rPr>
               <a:pPr fontAlgn="auto"/>
-              <a:t>14</a:t>
+              <a:t>13</a:t>
             </a:fld>
             <a:endParaRPr lang="zh-CN" altLang="en-US" strike="noStrike" noProof="1"/>
           </a:p>
@@ -6047,7 +5692,7 @@
 </p:sld>
 </file>
 
-<file path=ppt/slides/slide15.xml><?xml version="1.0" encoding="utf-8"?>
+<file path=ppt/slides/slide14.xml><?xml version="1.0" encoding="utf-8"?>
 <p:sld xmlns:a="http://schemas.openxmlformats.org/drawingml/2006/main" xmlns:r="http://schemas.openxmlformats.org/officeDocument/2006/relationships" xmlns:p="http://schemas.openxmlformats.org/presentationml/2006/main" showMasterSp="0">
   <p:cSld>
     <p:bg>
@@ -6272,7 +5917,7 @@
                 <a:cs typeface="+mn-cs"/>
               </a:rPr>
               <a:pPr fontAlgn="auto"/>
-              <a:t>15</a:t>
+              <a:t>14</a:t>
             </a:fld>
             <a:endParaRPr lang="zh-CN" altLang="en-US" strike="noStrike" noProof="1"/>
           </a:p>
@@ -7305,7 +6950,7 @@
         <p:spPr>
           <a:xfrm>
             <a:off x="664431" y="1218648"/>
-            <a:ext cx="10994169" cy="1938992"/>
+            <a:ext cx="10994169" cy="2246769"/>
           </a:xfrm>
           <a:prstGeom prst="rect">
             <a:avLst/>
@@ -7424,6 +7069,15 @@
               </a:rPr>
               <a:t>的重要数据结构和机制：</a:t>
             </a:r>
+            <a:endParaRPr lang="en-US" altLang="zh-CN" sz="2000" dirty="0">
+              <a:solidFill>
+                <a:srgbClr val="000000"/>
+              </a:solidFill>
+              <a:latin typeface="Consolas" panose="020B0609020204030204" pitchFamily="49" charset="0"/>
+              <a:sym typeface="SimSun-ExtB" panose="02010609060101010101" pitchFamily="49" charset="-122"/>
+            </a:endParaRPr>
+          </a:p>
+          <a:p>
             <a:r>
               <a:rPr lang="zh-CN" altLang="en-US" sz="2000" dirty="0">
                 <a:solidFill>
@@ -7433,7 +7087,7 @@
                 <a:ea typeface="微软雅黑 Light" panose="020B0502040204020203" pitchFamily="34" charset="-122"/>
                 <a:sym typeface="SimSun-ExtB" panose="02010609060101010101" pitchFamily="49" charset="-122"/>
               </a:rPr>
-              <a:t>微内核的职责是</a:t>
+              <a:t>由于微内核的职责是</a:t>
             </a:r>
             <a:r>
               <a:rPr lang="en-US" altLang="zh-CN" sz="2000" dirty="0">
@@ -7455,7 +7109,95 @@
                 <a:ea typeface="微软雅黑 Light" panose="020B0502040204020203" pitchFamily="34" charset="-122"/>
                 <a:sym typeface="SimSun-ExtB" panose="02010609060101010101" pitchFamily="49" charset="-122"/>
               </a:rPr>
-              <a:t>、虚拟内存、线程，其他一切都在用户空间中起作用。</a:t>
+              <a:t>、虚拟内存、线程，其他一切都在用户空间中起作用。于是着重阅读了</a:t>
+            </a:r>
+            <a:r>
+              <a:rPr lang="en-US" altLang="zh-CN" sz="2000" dirty="0">
+                <a:solidFill>
+                  <a:srgbClr val="000000"/>
+                </a:solidFill>
+                <a:latin typeface="Consolas" panose="020B0609020204030204" pitchFamily="49" charset="0"/>
+                <a:ea typeface="微软雅黑 Light" panose="020B0502040204020203" pitchFamily="34" charset="-122"/>
+                <a:sym typeface="SimSun-ExtB" panose="02010609060101010101" pitchFamily="49" charset="-122"/>
+              </a:rPr>
+              <a:t>seL4</a:t>
+            </a:r>
+            <a:r>
+              <a:rPr lang="zh-CN" altLang="en-US" sz="2000" dirty="0">
+                <a:solidFill>
+                  <a:srgbClr val="000000"/>
+                </a:solidFill>
+                <a:latin typeface="Consolas" panose="020B0609020204030204" pitchFamily="49" charset="0"/>
+                <a:ea typeface="微软雅黑 Light" panose="020B0502040204020203" pitchFamily="34" charset="-122"/>
+                <a:sym typeface="SimSun-ExtB" panose="02010609060101010101" pitchFamily="49" charset="-122"/>
+              </a:rPr>
+              <a:t>中的</a:t>
+            </a:r>
+            <a:r>
+              <a:rPr lang="en-US" altLang="zh-CN" sz="2000" dirty="0">
+                <a:solidFill>
+                  <a:srgbClr val="000000"/>
+                </a:solidFill>
+                <a:latin typeface="Consolas" panose="020B0609020204030204" pitchFamily="49" charset="0"/>
+                <a:ea typeface="微软雅黑 Light" panose="020B0502040204020203" pitchFamily="34" charset="-122"/>
+                <a:sym typeface="SimSun-ExtB" panose="02010609060101010101" pitchFamily="49" charset="-122"/>
+              </a:rPr>
+              <a:t>Capability</a:t>
+            </a:r>
+            <a:r>
+              <a:rPr lang="zh-CN" altLang="en-US" sz="2000" dirty="0">
+                <a:solidFill>
+                  <a:srgbClr val="000000"/>
+                </a:solidFill>
+                <a:latin typeface="Consolas" panose="020B0609020204030204" pitchFamily="49" charset="0"/>
+                <a:ea typeface="微软雅黑 Light" panose="020B0502040204020203" pitchFamily="34" charset="-122"/>
+                <a:sym typeface="SimSun-ExtB" panose="02010609060101010101" pitchFamily="49" charset="-122"/>
+              </a:rPr>
+              <a:t>、</a:t>
+            </a:r>
+            <a:r>
+              <a:rPr lang="en-US" altLang="zh-CN" sz="2000" dirty="0">
+                <a:solidFill>
+                  <a:srgbClr val="000000"/>
+                </a:solidFill>
+                <a:latin typeface="Consolas" panose="020B0609020204030204" pitchFamily="49" charset="0"/>
+                <a:ea typeface="微软雅黑 Light" panose="020B0502040204020203" pitchFamily="34" charset="-122"/>
+                <a:sym typeface="SimSun-ExtB" panose="02010609060101010101" pitchFamily="49" charset="-122"/>
+              </a:rPr>
+              <a:t>Untyped</a:t>
+            </a:r>
+            <a:r>
+              <a:rPr lang="zh-CN" altLang="en-US" sz="2000" dirty="0">
+                <a:solidFill>
+                  <a:srgbClr val="000000"/>
+                </a:solidFill>
+                <a:latin typeface="Consolas" panose="020B0609020204030204" pitchFamily="49" charset="0"/>
+                <a:ea typeface="微软雅黑 Light" panose="020B0502040204020203" pitchFamily="34" charset="-122"/>
+                <a:sym typeface="SimSun-ExtB" panose="02010609060101010101" pitchFamily="49" charset="-122"/>
+              </a:rPr>
+              <a:t>内存和</a:t>
+            </a:r>
+            <a:r>
+              <a:rPr lang="en-US" altLang="zh-CN" sz="2000" dirty="0">
+                <a:solidFill>
+                  <a:srgbClr val="000000"/>
+                </a:solidFill>
+                <a:latin typeface="Consolas" panose="020B0609020204030204" pitchFamily="49" charset="0"/>
+                <a:ea typeface="微软雅黑 Light" panose="020B0502040204020203" pitchFamily="34" charset="-122"/>
+                <a:sym typeface="SimSun-ExtB" panose="02010609060101010101" pitchFamily="49" charset="-122"/>
+              </a:rPr>
+              <a:t>IPC</a:t>
+            </a:r>
+            <a:r>
+              <a:rPr lang="zh-CN" altLang="en-US" sz="2000" dirty="0">
+                <a:solidFill>
+                  <a:srgbClr val="000000"/>
+                </a:solidFill>
+                <a:latin typeface="Consolas" panose="020B0609020204030204" pitchFamily="49" charset="0"/>
+                <a:ea typeface="微软雅黑 Light" panose="020B0502040204020203" pitchFamily="34" charset="-122"/>
+                <a:sym typeface="SimSun-ExtB" panose="02010609060101010101" pitchFamily="49" charset="-122"/>
+              </a:rPr>
+              <a:t>通信机制并形成笔记。</a:t>
             </a:r>
             <a:endParaRPr lang="zh-CN" altLang="en-US" sz="2000" dirty="0">
               <a:solidFill>
@@ -9694,7 +9436,7 @@
         <p:spPr>
           <a:xfrm>
             <a:off x="664431" y="1218648"/>
-            <a:ext cx="11017615" cy="400110"/>
+            <a:ext cx="10970723" cy="400110"/>
           </a:xfrm>
           <a:prstGeom prst="rect">
             <a:avLst/>
@@ -9728,7 +9470,7 @@
                 <a:latin typeface="Consolas" panose="020B0609020204030204" pitchFamily="49" charset="0"/>
                 <a:sym typeface="SimSun-ExtB" panose="02010609060101010101" pitchFamily="49" charset="-122"/>
               </a:rPr>
-              <a:t>正在推进</a:t>
+              <a:t>阅读</a:t>
             </a:r>
             <a:r>
               <a:rPr lang="en-US" altLang="zh-CN" sz="2000" dirty="0">
@@ -9738,7 +9480,7 @@
                 <a:latin typeface="Consolas" panose="020B0609020204030204" pitchFamily="49" charset="0"/>
                 <a:sym typeface="SimSun-ExtB" panose="02010609060101010101" pitchFamily="49" charset="-122"/>
               </a:rPr>
-              <a:t>reL4</a:t>
+              <a:t>Notification</a:t>
             </a:r>
             <a:r>
               <a:rPr lang="zh-CN" altLang="en-US" sz="2000" dirty="0">
@@ -9748,27 +9490,7 @@
                 <a:latin typeface="Consolas" panose="020B0609020204030204" pitchFamily="49" charset="0"/>
                 <a:sym typeface="SimSun-ExtB" panose="02010609060101010101" pitchFamily="49" charset="-122"/>
               </a:rPr>
-              <a:t>异步</a:t>
-            </a:r>
-            <a:r>
-              <a:rPr lang="en-US" altLang="zh-CN" sz="2000" dirty="0">
-                <a:solidFill>
-                  <a:srgbClr val="000000"/>
-                </a:solidFill>
-                <a:latin typeface="Consolas" panose="020B0609020204030204" pitchFamily="49" charset="0"/>
-                <a:sym typeface="SimSun-ExtB" panose="02010609060101010101" pitchFamily="49" charset="-122"/>
-              </a:rPr>
-              <a:t>IPC</a:t>
-            </a:r>
-            <a:r>
-              <a:rPr lang="zh-CN" altLang="en-US" sz="2000" dirty="0">
-                <a:solidFill>
-                  <a:srgbClr val="000000"/>
-                </a:solidFill>
-                <a:latin typeface="Consolas" panose="020B0609020204030204" pitchFamily="49" charset="0"/>
-                <a:sym typeface="SimSun-ExtB" panose="02010609060101010101" pitchFamily="49" charset="-122"/>
-              </a:rPr>
-              <a:t>代码路径分析实验</a:t>
+              <a:t>文档</a:t>
             </a:r>
             <a:endParaRPr lang="zh-CN" altLang="en-US" sz="2000" dirty="0">
               <a:solidFill>
@@ -9850,10 +9572,46 @@
           </a:p>
         </p:txBody>
       </p:sp>
+      <p:pic>
+        <p:nvPicPr>
+          <p:cNvPr id="6" name="图片 5">
+            <a:extLst>
+              <a:ext uri="{FF2B5EF4-FFF2-40B4-BE49-F238E27FC236}">
+                <a16:creationId xmlns:a16="http://schemas.microsoft.com/office/drawing/2014/main" id="{08A2AE65-21F0-BB40-6081-A5FC404C9DA8}"/>
+              </a:ext>
+            </a:extLst>
+          </p:cNvPr>
+          <p:cNvPicPr>
+            <a:picLocks noChangeAspect="1"/>
+          </p:cNvPicPr>
+          <p:nvPr/>
+        </p:nvPicPr>
+        <p:blipFill>
+          <a:blip r:embed="rId4">
+            <a:extLst>
+              <a:ext uri="{28A0092B-C50C-407E-A947-70E740481C1C}">
+                <a14:useLocalDpi xmlns:a14="http://schemas.microsoft.com/office/drawing/2010/main" val="0"/>
+              </a:ext>
+            </a:extLst>
+          </a:blip>
+          <a:stretch>
+            <a:fillRect/>
+          </a:stretch>
+        </p:blipFill>
+        <p:spPr>
+          <a:xfrm>
+            <a:off x="664431" y="1805531"/>
+            <a:ext cx="7541723" cy="4013559"/>
+          </a:xfrm>
+          <a:prstGeom prst="rect">
+            <a:avLst/>
+          </a:prstGeom>
+        </p:spPr>
+      </p:pic>
     </p:spTree>
     <p:extLst>
       <p:ext uri="{BB962C8B-B14F-4D97-AF65-F5344CB8AC3E}">
-        <p14:creationId xmlns:p14="http://schemas.microsoft.com/office/powerpoint/2010/main" val="4073785412"/>
+        <p14:creationId xmlns:p14="http://schemas.microsoft.com/office/powerpoint/2010/main" val="3605829571"/>
       </p:ext>
     </p:extLst>
   </p:cSld>
@@ -10058,7 +9816,7 @@
         <p:spPr>
           <a:xfrm>
             <a:off x="664431" y="1218648"/>
-            <a:ext cx="10970723" cy="400110"/>
+            <a:ext cx="8117755" cy="400110"/>
           </a:xfrm>
           <a:prstGeom prst="rect">
             <a:avLst/>
@@ -10092,7 +9850,7 @@
                 <a:latin typeface="Consolas" panose="020B0609020204030204" pitchFamily="49" charset="0"/>
                 <a:sym typeface="SimSun-ExtB" panose="02010609060101010101" pitchFamily="49" charset="-122"/>
               </a:rPr>
-              <a:t>阅读</a:t>
+              <a:t>阅读技术文档并结合代码理解</a:t>
             </a:r>
             <a:r>
               <a:rPr lang="en-US" altLang="zh-CN" sz="2000" dirty="0">
@@ -10102,7 +9860,7 @@
                 <a:latin typeface="Consolas" panose="020B0609020204030204" pitchFamily="49" charset="0"/>
                 <a:sym typeface="SimSun-ExtB" panose="02010609060101010101" pitchFamily="49" charset="-122"/>
               </a:rPr>
-              <a:t>Notification</a:t>
+              <a:t>reL4</a:t>
             </a:r>
             <a:r>
               <a:rPr lang="zh-CN" altLang="en-US" sz="2000" dirty="0">
@@ -10112,7 +9870,17 @@
                 <a:latin typeface="Consolas" panose="020B0609020204030204" pitchFamily="49" charset="0"/>
                 <a:sym typeface="SimSun-ExtB" panose="02010609060101010101" pitchFamily="49" charset="-122"/>
               </a:rPr>
-              <a:t>文档</a:t>
+              <a:t>异步</a:t>
+            </a:r>
+            <a:r>
+              <a:rPr lang="en-US" altLang="zh-CN" sz="2000" dirty="0">
+                <a:solidFill>
+                  <a:srgbClr val="000000"/>
+                </a:solidFill>
+                <a:latin typeface="Consolas" panose="020B0609020204030204" pitchFamily="49" charset="0"/>
+                <a:sym typeface="SimSun-ExtB" panose="02010609060101010101" pitchFamily="49" charset="-122"/>
+              </a:rPr>
+              <a:t>IPC</a:t>
             </a:r>
             <a:endParaRPr lang="zh-CN" altLang="en-US" sz="2000" dirty="0">
               <a:solidFill>
@@ -10194,10 +9962,46 @@
           </a:p>
         </p:txBody>
       </p:sp>
+      <p:pic>
+        <p:nvPicPr>
+          <p:cNvPr id="4" name="图片 3">
+            <a:extLst>
+              <a:ext uri="{FF2B5EF4-FFF2-40B4-BE49-F238E27FC236}">
+                <a16:creationId xmlns:a16="http://schemas.microsoft.com/office/drawing/2014/main" id="{8DD1695F-076D-8816-58C9-1555F36F9B58}"/>
+              </a:ext>
+            </a:extLst>
+          </p:cNvPr>
+          <p:cNvPicPr>
+            <a:picLocks noChangeAspect="1"/>
+          </p:cNvPicPr>
+          <p:nvPr/>
+        </p:nvPicPr>
+        <p:blipFill>
+          <a:blip r:embed="rId4">
+            <a:extLst>
+              <a:ext uri="{28A0092B-C50C-407E-A947-70E740481C1C}">
+                <a14:useLocalDpi xmlns:a14="http://schemas.microsoft.com/office/drawing/2010/main" val="0"/>
+              </a:ext>
+            </a:extLst>
+          </a:blip>
+          <a:stretch>
+            <a:fillRect/>
+          </a:stretch>
+        </p:blipFill>
+        <p:spPr>
+          <a:xfrm>
+            <a:off x="664431" y="1639570"/>
+            <a:ext cx="7495729" cy="4724400"/>
+          </a:xfrm>
+          <a:prstGeom prst="rect">
+            <a:avLst/>
+          </a:prstGeom>
+        </p:spPr>
+      </p:pic>
     </p:spTree>
     <p:extLst>
       <p:ext uri="{BB962C8B-B14F-4D97-AF65-F5344CB8AC3E}">
-        <p14:creationId xmlns:p14="http://schemas.microsoft.com/office/powerpoint/2010/main" val="3605829571"/>
+        <p14:creationId xmlns:p14="http://schemas.microsoft.com/office/powerpoint/2010/main" val="4194884469"/>
       </p:ext>
     </p:extLst>
   </p:cSld>

</xml_diff>

<commit_message>
add mid-term repo ppt-v4
</commit_message>
<xml_diff>
--- a/中期报告-04-08.pptx
+++ b/中期报告-04-08.pptx
@@ -5,7 +5,7 @@
     <p:sldMasterId id="2147483648" r:id="rId1"/>
   </p:sldMasterIdLst>
   <p:notesMasterIdLst>
-    <p:notesMasterId r:id="rId16"/>
+    <p:notesMasterId r:id="rId15"/>
   </p:notesMasterIdLst>
   <p:sldIdLst>
     <p:sldId id="256" r:id="rId2"/>
@@ -16,12 +16,11 @@
     <p:sldId id="287" r:id="rId7"/>
     <p:sldId id="288" r:id="rId8"/>
     <p:sldId id="285" r:id="rId9"/>
-    <p:sldId id="286" r:id="rId10"/>
-    <p:sldId id="275" r:id="rId11"/>
-    <p:sldId id="289" r:id="rId12"/>
-    <p:sldId id="278" r:id="rId13"/>
-    <p:sldId id="276" r:id="rId14"/>
-    <p:sldId id="272" r:id="rId15"/>
+    <p:sldId id="275" r:id="rId10"/>
+    <p:sldId id="289" r:id="rId11"/>
+    <p:sldId id="278" r:id="rId12"/>
+    <p:sldId id="276" r:id="rId13"/>
+    <p:sldId id="272" r:id="rId14"/>
   </p:sldIdLst>
   <p:sldSz cx="12192000" cy="6858000"/>
   <p:notesSz cx="6858000" cy="9144000"/>
@@ -695,7 +694,7 @@
                 <a:ea typeface="+mn-ea"/>
                 <a:cs typeface="+mn-cs"/>
               </a:rPr>
-              <a:t>2024/4/7</a:t>
+              <a:t>2024/4/8</a:t>
             </a:fld>
             <a:endParaRPr lang="zh-CN" altLang="en-US" strike="noStrike" noProof="1"/>
           </a:p>
@@ -956,7 +955,7 @@
                 <a:ea typeface="+mn-ea"/>
                 <a:cs typeface="+mn-cs"/>
               </a:rPr>
-              <a:t>2024/4/7</a:t>
+              <a:t>2024/4/8</a:t>
             </a:fld>
             <a:endParaRPr lang="zh-CN" altLang="en-US" strike="noStrike" noProof="1"/>
           </a:p>
@@ -1132,7 +1131,7 @@
                 <a:ea typeface="+mn-ea"/>
                 <a:cs typeface="+mn-cs"/>
               </a:rPr>
-              <a:t>2024/4/7</a:t>
+              <a:t>2024/4/8</a:t>
             </a:fld>
             <a:endParaRPr lang="zh-CN" altLang="en-US" strike="noStrike" noProof="1"/>
           </a:p>
@@ -1318,7 +1317,7 @@
                 <a:ea typeface="+mn-ea"/>
                 <a:cs typeface="+mn-cs"/>
               </a:rPr>
-              <a:t>2024/4/7</a:t>
+              <a:t>2024/4/8</a:t>
             </a:fld>
             <a:endParaRPr lang="zh-CN" altLang="en-US" strike="noStrike" noProof="1"/>
           </a:p>
@@ -1494,7 +1493,7 @@
                 <a:ea typeface="+mn-ea"/>
                 <a:cs typeface="+mn-cs"/>
               </a:rPr>
-              <a:t>2024/4/7</a:t>
+              <a:t>2024/4/8</a:t>
             </a:fld>
             <a:endParaRPr lang="zh-CN" altLang="en-US" strike="noStrike" noProof="1"/>
           </a:p>
@@ -1783,7 +1782,7 @@
                 <a:ea typeface="+mn-ea"/>
                 <a:cs typeface="+mn-cs"/>
               </a:rPr>
-              <a:t>2024/4/7</a:t>
+              <a:t>2024/4/8</a:t>
             </a:fld>
             <a:endParaRPr lang="zh-CN" altLang="en-US" strike="noStrike" noProof="1"/>
           </a:p>
@@ -2102,7 +2101,7 @@
                 <a:ea typeface="+mn-ea"/>
                 <a:cs typeface="+mn-cs"/>
               </a:rPr>
-              <a:t>2024/4/7</a:t>
+              <a:t>2024/4/8</a:t>
             </a:fld>
             <a:endParaRPr lang="zh-CN" altLang="en-US" strike="noStrike" noProof="1"/>
           </a:p>
@@ -2339,7 +2338,7 @@
                 <a:ea typeface="+mn-ea"/>
                 <a:cs typeface="+mn-cs"/>
               </a:rPr>
-              <a:t>2024/4/7</a:t>
+              <a:t>2024/4/8</a:t>
             </a:fld>
             <a:endParaRPr lang="zh-CN" altLang="en-US" strike="noStrike" noProof="1"/>
           </a:p>
@@ -2711,7 +2710,7 @@
                 <a:ea typeface="+mn-ea"/>
                 <a:cs typeface="+mn-cs"/>
               </a:rPr>
-              <a:t>2024/4/7</a:t>
+              <a:t>2024/4/8</a:t>
             </a:fld>
             <a:endParaRPr lang="zh-CN" altLang="en-US" strike="noStrike" noProof="1"/>
           </a:p>
@@ -2836,7 +2835,7 @@
                 <a:ea typeface="+mn-ea"/>
                 <a:cs typeface="+mn-cs"/>
               </a:rPr>
-              <a:t>2024/4/7</a:t>
+              <a:t>2024/4/8</a:t>
             </a:fld>
             <a:endParaRPr lang="zh-CN" altLang="en-US" strike="noStrike" noProof="1"/>
           </a:p>
@@ -2938,7 +2937,7 @@
                 <a:ea typeface="+mn-ea"/>
                 <a:cs typeface="+mn-cs"/>
               </a:rPr>
-              <a:t>2024/4/7</a:t>
+              <a:t>2024/4/8</a:t>
             </a:fld>
             <a:endParaRPr lang="zh-CN" altLang="en-US" strike="noStrike" noProof="1"/>
           </a:p>
@@ -3221,7 +3220,7 @@
                 <a:ea typeface="+mn-ea"/>
                 <a:cs typeface="+mn-cs"/>
               </a:rPr>
-              <a:t>2024/4/7</a:t>
+              <a:t>2024/4/8</a:t>
             </a:fld>
             <a:endParaRPr lang="zh-CN" altLang="en-US" strike="noStrike" noProof="1"/>
           </a:p>
@@ -3450,7 +3449,7 @@
                 <a:ea typeface="+mn-ea"/>
                 <a:cs typeface="+mn-cs"/>
               </a:rPr>
-              <a:t>2024/4/7</a:t>
+              <a:t>2024/4/8</a:t>
             </a:fld>
             <a:endParaRPr lang="zh-CN" altLang="en-US" strike="noStrike" noProof="1"/>
           </a:p>
@@ -4126,280 +4125,6 @@
       <p:bgPr>
         <a:blipFill rotWithShape="1">
           <a:blip r:embed="rId2" cstate="print">
-            <a:alphaModFix amt="74000"/>
-          </a:blip>
-          <a:stretch>
-            <a:fillRect l="-15000" t="-9000" r="-4000" b="-1000"/>
-          </a:stretch>
-        </a:blipFill>
-        <a:effectLst/>
-      </p:bgPr>
-    </p:bg>
-    <p:spTree>
-      <p:nvGrpSpPr>
-        <p:cNvPr id="1" name="">
-          <a:extLst>
-            <a:ext uri="{FF2B5EF4-FFF2-40B4-BE49-F238E27FC236}">
-              <a16:creationId xmlns:a16="http://schemas.microsoft.com/office/drawing/2014/main" id="{3D5305F2-1267-6578-16DE-E7E484D26FAA}"/>
-            </a:ext>
-          </a:extLst>
-        </p:cNvPr>
-        <p:cNvGrpSpPr/>
-        <p:nvPr/>
-      </p:nvGrpSpPr>
-      <p:grpSpPr>
-        <a:xfrm>
-          <a:off x="0" y="0"/>
-          <a:ext cx="0" cy="0"/>
-          <a:chOff x="0" y="0"/>
-          <a:chExt cx="0" cy="0"/>
-        </a:xfrm>
-      </p:grpSpPr>
-      <p:grpSp>
-        <p:nvGrpSpPr>
-          <p:cNvPr id="52" name="组合 13">
-            <a:extLst>
-              <a:ext uri="{FF2B5EF4-FFF2-40B4-BE49-F238E27FC236}">
-                <a16:creationId xmlns:a16="http://schemas.microsoft.com/office/drawing/2014/main" id="{0B778E5F-4943-E79C-8231-A01BC59E7602}"/>
-              </a:ext>
-            </a:extLst>
-          </p:cNvPr>
-          <p:cNvGrpSpPr/>
-          <p:nvPr/>
-        </p:nvGrpSpPr>
-        <p:grpSpPr>
-          <a:xfrm>
-            <a:off x="695325" y="2082799"/>
-            <a:ext cx="3830902" cy="1247397"/>
-            <a:chOff x="695324" y="2082338"/>
-            <a:chExt cx="3545903" cy="1247733"/>
-          </a:xfrm>
-        </p:grpSpPr>
-        <p:sp>
-          <p:nvSpPr>
-            <p:cNvPr id="1048620" name="稻壳儿春秋广告/盗版必究        原创来源：http://chn.docer.com/works?userid=199329941#!/work_time">
-              <a:extLst>
-                <a:ext uri="{FF2B5EF4-FFF2-40B4-BE49-F238E27FC236}">
-                  <a16:creationId xmlns:a16="http://schemas.microsoft.com/office/drawing/2014/main" id="{6057AE25-2CDE-2A6B-CD1E-7A3A96CF5E6C}"/>
-                </a:ext>
-              </a:extLst>
-            </p:cNvPr>
-            <p:cNvSpPr txBox="1"/>
-            <p:nvPr/>
-          </p:nvSpPr>
-          <p:spPr>
-            <a:xfrm flipH="1">
-              <a:off x="695324" y="2806851"/>
-              <a:ext cx="3545903" cy="523220"/>
-            </a:xfrm>
-            <a:prstGeom prst="rect">
-              <a:avLst/>
-            </a:prstGeom>
-            <a:noFill/>
-            <a:ln w="9525">
-              <a:noFill/>
-            </a:ln>
-          </p:spPr>
-          <p:txBody>
-            <a:bodyPr wrap="square" anchor="t">
-              <a:spAutoFit/>
-            </a:bodyPr>
-            <a:lstStyle/>
-            <a:p>
-              <a:r>
-                <a:rPr lang="zh-CN" altLang="en-US" sz="2800" b="1" dirty="0">
-                  <a:solidFill>
-                    <a:srgbClr val="2D3E50"/>
-                  </a:solidFill>
-                  <a:latin typeface="黑体" pitchFamily="49" charset="-122"/>
-                  <a:ea typeface="黑体" pitchFamily="49" charset="-122"/>
-                  <a:sym typeface="SimSun-ExtB" panose="02010609060101010101" pitchFamily="49" charset="-122"/>
-                </a:rPr>
-                <a:t>现存问题</a:t>
-              </a:r>
-            </a:p>
-          </p:txBody>
-        </p:sp>
-        <p:sp>
-          <p:nvSpPr>
-            <p:cNvPr id="1048621" name="稻壳儿春秋广告/盗版必究        原创来源：http://chn.docer.com/works?userid=199329941#!/work_time">
-              <a:extLst>
-                <a:ext uri="{FF2B5EF4-FFF2-40B4-BE49-F238E27FC236}">
-                  <a16:creationId xmlns:a16="http://schemas.microsoft.com/office/drawing/2014/main" id="{C760F5A4-35E2-DA0B-3B53-40F10F528DD3}"/>
-                </a:ext>
-              </a:extLst>
-            </p:cNvPr>
-            <p:cNvSpPr txBox="1"/>
-            <p:nvPr/>
-          </p:nvSpPr>
-          <p:spPr>
-            <a:xfrm flipH="1">
-              <a:off x="695324" y="2082338"/>
-              <a:ext cx="2778958" cy="707886"/>
-            </a:xfrm>
-            <a:prstGeom prst="rect">
-              <a:avLst/>
-            </a:prstGeom>
-            <a:noFill/>
-            <a:ln w="9525">
-              <a:noFill/>
-            </a:ln>
-          </p:spPr>
-          <p:txBody>
-            <a:bodyPr wrap="square" anchor="t">
-              <a:spAutoFit/>
-            </a:bodyPr>
-            <a:lstStyle/>
-            <a:p>
-              <a:r>
-                <a:rPr lang="en-US" altLang="zh-CN" sz="4000" b="1" dirty="0">
-                  <a:gradFill>
-                    <a:gsLst>
-                      <a:gs pos="0">
-                        <a:srgbClr val="012D86"/>
-                      </a:gs>
-                      <a:gs pos="100000">
-                        <a:srgbClr val="0E2557"/>
-                      </a:gs>
-                    </a:gsLst>
-                    <a:lin scaled="0"/>
-                  </a:gradFill>
-                  <a:latin typeface="SimSun-ExtB" panose="02010609060101010101" pitchFamily="49" charset="-122"/>
-                  <a:ea typeface="微软雅黑 Light" panose="020B0502040204020203" pitchFamily="34" charset="-122"/>
-                  <a:sym typeface="SimSun-ExtB" panose="02010609060101010101" pitchFamily="49" charset="-122"/>
-                </a:rPr>
-                <a:t>PART 02</a:t>
-              </a:r>
-            </a:p>
-          </p:txBody>
-        </p:sp>
-      </p:grpSp>
-      <p:pic>
-        <p:nvPicPr>
-          <p:cNvPr id="2097156" name="图片 1" descr="理工灰">
-            <a:extLst>
-              <a:ext uri="{FF2B5EF4-FFF2-40B4-BE49-F238E27FC236}">
-                <a16:creationId xmlns:a16="http://schemas.microsoft.com/office/drawing/2014/main" id="{F3394123-3BAA-7E0F-91D5-FEFAD5E8A884}"/>
-              </a:ext>
-            </a:extLst>
-          </p:cNvPr>
-          <p:cNvPicPr>
-            <a:picLocks noChangeAspect="1"/>
-          </p:cNvPicPr>
-          <p:nvPr/>
-        </p:nvPicPr>
-        <p:blipFill>
-          <a:blip r:embed="rId3" cstate="print"/>
-          <a:stretch>
-            <a:fillRect/>
-          </a:stretch>
-        </p:blipFill>
-        <p:spPr>
-          <a:xfrm>
-            <a:off x="11095038" y="5745163"/>
-            <a:ext cx="846137" cy="730250"/>
-          </a:xfrm>
-          <a:prstGeom prst="rect">
-            <a:avLst/>
-          </a:prstGeom>
-          <a:noFill/>
-          <a:ln w="9525">
-            <a:noFill/>
-          </a:ln>
-        </p:spPr>
-      </p:pic>
-      <p:pic>
-        <p:nvPicPr>
-          <p:cNvPr id="2097157" name="图片 3" descr="理工灰">
-            <a:extLst>
-              <a:ext uri="{FF2B5EF4-FFF2-40B4-BE49-F238E27FC236}">
-                <a16:creationId xmlns:a16="http://schemas.microsoft.com/office/drawing/2014/main" id="{B7DFB1E8-FFBF-0D56-CC58-0E413CE789AB}"/>
-              </a:ext>
-            </a:extLst>
-          </p:cNvPr>
-          <p:cNvPicPr>
-            <a:picLocks noChangeAspect="1"/>
-          </p:cNvPicPr>
-          <p:nvPr/>
-        </p:nvPicPr>
-        <p:blipFill>
-          <a:blip r:embed="rId4" cstate="print"/>
-          <a:stretch>
-            <a:fillRect/>
-          </a:stretch>
-        </p:blipFill>
-        <p:spPr>
-          <a:xfrm>
-            <a:off x="11017250" y="279400"/>
-            <a:ext cx="873125" cy="752475"/>
-          </a:xfrm>
-          <a:prstGeom prst="rect">
-            <a:avLst/>
-          </a:prstGeom>
-          <a:noFill/>
-          <a:ln w="9525">
-            <a:noFill/>
-          </a:ln>
-        </p:spPr>
-      </p:pic>
-      <p:sp>
-        <p:nvSpPr>
-          <p:cNvPr id="2" name="灯片编号占位符 1">
-            <a:extLst>
-              <a:ext uri="{FF2B5EF4-FFF2-40B4-BE49-F238E27FC236}">
-                <a16:creationId xmlns:a16="http://schemas.microsoft.com/office/drawing/2014/main" id="{18802F67-890D-63E6-E315-4B401A2A77D7}"/>
-              </a:ext>
-            </a:extLst>
-          </p:cNvPr>
-          <p:cNvSpPr>
-            <a:spLocks noGrp="1"/>
-          </p:cNvSpPr>
-          <p:nvPr>
-            <p:ph type="sldNum" sz="quarter" idx="12"/>
-          </p:nvPr>
-        </p:nvSpPr>
-        <p:spPr/>
-        <p:txBody>
-          <a:bodyPr/>
-          <a:lstStyle/>
-          <a:p>
-            <a:pPr fontAlgn="auto"/>
-            <a:fld id="{CA2E1F5A-C151-4DEE-93E4-F5F32EEAF57D}" type="slidenum">
-              <a:rPr lang="zh-CN" altLang="en-US" strike="noStrike" noProof="1" smtClean="0">
-                <a:latin typeface="+mn-lt"/>
-                <a:ea typeface="+mn-ea"/>
-                <a:cs typeface="+mn-cs"/>
-              </a:rPr>
-              <a:pPr fontAlgn="auto"/>
-              <a:t>10</a:t>
-            </a:fld>
-            <a:endParaRPr lang="zh-CN" altLang="en-US" strike="noStrike" noProof="1"/>
-          </a:p>
-        </p:txBody>
-      </p:sp>
-    </p:spTree>
-    <p:extLst>
-      <p:ext uri="{BB962C8B-B14F-4D97-AF65-F5344CB8AC3E}">
-        <p14:creationId xmlns:p14="http://schemas.microsoft.com/office/powerpoint/2010/main" val="895125780"/>
-      </p:ext>
-    </p:extLst>
-  </p:cSld>
-  <p:clrMapOvr>
-    <a:masterClrMapping/>
-  </p:clrMapOvr>
-  <p:transition>
-    <p:wipe/>
-  </p:transition>
-</p:sld>
-</file>
-
-<file path=ppt/slides/slide11.xml><?xml version="1.0" encoding="utf-8"?>
-<p:sld xmlns:a="http://schemas.openxmlformats.org/drawingml/2006/main" xmlns:r="http://schemas.openxmlformats.org/officeDocument/2006/relationships" xmlns:p="http://schemas.openxmlformats.org/presentationml/2006/main" showMasterSp="0">
-  <p:cSld>
-    <p:bg>
-      <p:bgPr>
-        <a:blipFill rotWithShape="1">
-          <a:blip r:embed="rId2" cstate="print">
             <a:alphaModFix amt="39000"/>
           </a:blip>
           <a:stretch>
@@ -4877,7 +4602,7 @@
                 <a:cs typeface="+mn-cs"/>
               </a:rPr>
               <a:pPr fontAlgn="auto"/>
-              <a:t>11</a:t>
+              <a:t>10</a:t>
             </a:fld>
             <a:endParaRPr lang="zh-CN" altLang="en-US" strike="noStrike" noProof="1"/>
           </a:p>
@@ -4899,7 +4624,7 @@
 </p:sld>
 </file>
 
-<file path=ppt/slides/slide12.xml><?xml version="1.0" encoding="utf-8"?>
+<file path=ppt/slides/slide11.xml><?xml version="1.0" encoding="utf-8"?>
 <p:sld xmlns:a="http://schemas.openxmlformats.org/drawingml/2006/main" xmlns:r="http://schemas.openxmlformats.org/officeDocument/2006/relationships" xmlns:p="http://schemas.openxmlformats.org/presentationml/2006/main" showMasterSp="0">
   <p:cSld>
     <p:bg>
@@ -5151,7 +4876,7 @@
                 <a:cs typeface="+mn-cs"/>
               </a:rPr>
               <a:pPr fontAlgn="auto"/>
-              <a:t>12</a:t>
+              <a:t>11</a:t>
             </a:fld>
             <a:endParaRPr lang="zh-CN" altLang="en-US" strike="noStrike" noProof="1"/>
           </a:p>
@@ -5173,7 +4898,7 @@
 </p:sld>
 </file>
 
-<file path=ppt/slides/slide13.xml><?xml version="1.0" encoding="utf-8"?>
+<file path=ppt/slides/slide12.xml><?xml version="1.0" encoding="utf-8"?>
 <p:sld xmlns:a="http://schemas.openxmlformats.org/drawingml/2006/main" xmlns:r="http://schemas.openxmlformats.org/officeDocument/2006/relationships" xmlns:p="http://schemas.openxmlformats.org/presentationml/2006/main" showMasterSp="0">
   <p:cSld>
     <p:bg>
@@ -5670,7 +5395,7 @@
                 <a:cs typeface="+mn-cs"/>
               </a:rPr>
               <a:pPr fontAlgn="auto"/>
-              <a:t>13</a:t>
+              <a:t>12</a:t>
             </a:fld>
             <a:endParaRPr lang="zh-CN" altLang="en-US" strike="noStrike" noProof="1"/>
           </a:p>
@@ -5692,7 +5417,7 @@
 </p:sld>
 </file>
 
-<file path=ppt/slides/slide14.xml><?xml version="1.0" encoding="utf-8"?>
+<file path=ppt/slides/slide13.xml><?xml version="1.0" encoding="utf-8"?>
 <p:sld xmlns:a="http://schemas.openxmlformats.org/drawingml/2006/main" xmlns:r="http://schemas.openxmlformats.org/officeDocument/2006/relationships" xmlns:p="http://schemas.openxmlformats.org/presentationml/2006/main" showMasterSp="0">
   <p:cSld>
     <p:bg>
@@ -5917,7 +5642,7 @@
                 <a:cs typeface="+mn-cs"/>
               </a:rPr>
               <a:pPr fontAlgn="auto"/>
-              <a:t>14</a:t>
+              <a:t>13</a:t>
             </a:fld>
             <a:endParaRPr lang="zh-CN" altLang="en-US" strike="noStrike" noProof="1"/>
           </a:p>
@@ -7047,7 +6772,7 @@
                 <a:latin typeface="Consolas" panose="020B0609020204030204" pitchFamily="49" charset="0"/>
                 <a:sym typeface="SimSun-ExtB" panose="02010609060101010101" pitchFamily="49" charset="-122"/>
               </a:rPr>
-              <a:t>学习</a:t>
+              <a:t>结合教程学习</a:t>
             </a:r>
             <a:r>
               <a:rPr lang="en-US" altLang="zh-CN" sz="2000" dirty="0">
@@ -7289,6 +7014,42 @@
           </a:p>
         </p:txBody>
       </p:sp>
+      <p:pic>
+        <p:nvPicPr>
+          <p:cNvPr id="4" name="图片 3">
+            <a:extLst>
+              <a:ext uri="{FF2B5EF4-FFF2-40B4-BE49-F238E27FC236}">
+                <a16:creationId xmlns:a16="http://schemas.microsoft.com/office/drawing/2014/main" id="{DFAB99A4-948F-682D-F0D3-279BDFEC87A6}"/>
+              </a:ext>
+            </a:extLst>
+          </p:cNvPr>
+          <p:cNvPicPr>
+            <a:picLocks noChangeAspect="1"/>
+          </p:cNvPicPr>
+          <p:nvPr/>
+        </p:nvPicPr>
+        <p:blipFill>
+          <a:blip r:embed="rId4">
+            <a:extLst>
+              <a:ext uri="{28A0092B-C50C-407E-A947-70E740481C1C}">
+                <a14:useLocalDpi xmlns:a14="http://schemas.microsoft.com/office/drawing/2010/main" val="0"/>
+              </a:ext>
+            </a:extLst>
+          </a:blip>
+          <a:stretch>
+            <a:fillRect/>
+          </a:stretch>
+        </p:blipFill>
+        <p:spPr>
+          <a:xfrm>
+            <a:off x="1297180" y="3429000"/>
+            <a:ext cx="4983336" cy="2730075"/>
+          </a:xfrm>
+          <a:prstGeom prst="rect">
+            <a:avLst/>
+          </a:prstGeom>
+        </p:spPr>
+      </p:pic>
     </p:spTree>
     <p:extLst>
       <p:ext uri="{BB962C8B-B14F-4D97-AF65-F5344CB8AC3E}">
@@ -9490,7 +9251,37 @@
                 <a:latin typeface="Consolas" panose="020B0609020204030204" pitchFamily="49" charset="0"/>
                 <a:sym typeface="SimSun-ExtB" panose="02010609060101010101" pitchFamily="49" charset="-122"/>
               </a:rPr>
-              <a:t>文档</a:t>
+              <a:t>文档，阅读技术文档并结合代码理解</a:t>
+            </a:r>
+            <a:r>
+              <a:rPr lang="en-US" altLang="zh-CN" sz="2000" dirty="0">
+                <a:solidFill>
+                  <a:srgbClr val="000000"/>
+                </a:solidFill>
+                <a:latin typeface="Consolas" panose="020B0609020204030204" pitchFamily="49" charset="0"/>
+                <a:sym typeface="SimSun-ExtB" panose="02010609060101010101" pitchFamily="49" charset="-122"/>
+              </a:rPr>
+              <a:t>reL4</a:t>
+            </a:r>
+            <a:r>
+              <a:rPr lang="zh-CN" altLang="en-US" sz="2000" dirty="0">
+                <a:solidFill>
+                  <a:srgbClr val="000000"/>
+                </a:solidFill>
+                <a:latin typeface="Consolas" panose="020B0609020204030204" pitchFamily="49" charset="0"/>
+                <a:sym typeface="SimSun-ExtB" panose="02010609060101010101" pitchFamily="49" charset="-122"/>
+              </a:rPr>
+              <a:t>异步</a:t>
+            </a:r>
+            <a:r>
+              <a:rPr lang="en-US" altLang="zh-CN" sz="2000" dirty="0">
+                <a:solidFill>
+                  <a:srgbClr val="000000"/>
+                </a:solidFill>
+                <a:latin typeface="Consolas" panose="020B0609020204030204" pitchFamily="49" charset="0"/>
+                <a:sym typeface="SimSun-ExtB" panose="02010609060101010101" pitchFamily="49" charset="-122"/>
+              </a:rPr>
+              <a:t>IPC</a:t>
             </a:r>
             <a:endParaRPr lang="zh-CN" altLang="en-US" sz="2000" dirty="0">
               <a:solidFill>
@@ -9631,10 +9422,10 @@
       <p:bgPr>
         <a:blipFill rotWithShape="1">
           <a:blip r:embed="rId2" cstate="print">
-            <a:alphaModFix amt="39000"/>
+            <a:alphaModFix amt="74000"/>
           </a:blip>
           <a:stretch>
-            <a:fillRect l="-5000" t="-9000" r="-10000" b="-13000"/>
+            <a:fillRect l="-15000" t="-9000" r="-4000" b="-1000"/>
           </a:stretch>
         </a:blipFill>
         <a:effectLst/>
@@ -9645,7 +9436,7 @@
         <p:cNvPr id="1" name="">
           <a:extLst>
             <a:ext uri="{FF2B5EF4-FFF2-40B4-BE49-F238E27FC236}">
-              <a16:creationId xmlns:a16="http://schemas.microsoft.com/office/drawing/2014/main" id="{D7B3757C-37F6-3F39-162E-7DFBE4B8DCFD}"/>
+              <a16:creationId xmlns:a16="http://schemas.microsoft.com/office/drawing/2014/main" id="{3D5305F2-1267-6578-16DE-E7E484D26FAA}"/>
             </a:ext>
           </a:extLst>
         </p:cNvPr>
@@ -9660,245 +9451,131 @@
           <a:chExt cx="0" cy="0"/>
         </a:xfrm>
       </p:grpSpPr>
-      <p:sp>
-        <p:nvSpPr>
-          <p:cNvPr id="1048856" name="燕尾形 9">
+      <p:grpSp>
+        <p:nvGrpSpPr>
+          <p:cNvPr id="52" name="组合 13">
             <a:extLst>
               <a:ext uri="{FF2B5EF4-FFF2-40B4-BE49-F238E27FC236}">
-                <a16:creationId xmlns:a16="http://schemas.microsoft.com/office/drawing/2014/main" id="{8D390BBA-B652-3C0B-375B-658863095F5F}"/>
+                <a16:creationId xmlns:a16="http://schemas.microsoft.com/office/drawing/2014/main" id="{0B778E5F-4943-E79C-8231-A01BC59E7602}"/>
               </a:ext>
             </a:extLst>
           </p:cNvPr>
-          <p:cNvSpPr/>
+          <p:cNvGrpSpPr/>
           <p:nvPr/>
-        </p:nvSpPr>
-        <p:spPr>
+        </p:nvGrpSpPr>
+        <p:grpSpPr>
           <a:xfrm>
-            <a:off x="849630" y="494030"/>
-            <a:ext cx="812800" cy="340360"/>
+            <a:off x="695325" y="2082799"/>
+            <a:ext cx="3830902" cy="1247397"/>
+            <a:chOff x="695324" y="2082338"/>
+            <a:chExt cx="3545903" cy="1247733"/>
           </a:xfrm>
-          <a:prstGeom prst="chevron">
-            <a:avLst/>
-          </a:prstGeom>
-          <a:solidFill>
-            <a:schemeClr val="tx2">
-              <a:lumMod val="40000"/>
-              <a:lumOff val="60000"/>
-            </a:schemeClr>
-          </a:solidFill>
-          <a:ln>
+        </p:grpSpPr>
+        <p:sp>
+          <p:nvSpPr>
+            <p:cNvPr id="1048620" name="稻壳儿春秋广告/盗版必究        原创来源：http://chn.docer.com/works?userid=199329941#!/work_time">
+              <a:extLst>
+                <a:ext uri="{FF2B5EF4-FFF2-40B4-BE49-F238E27FC236}">
+                  <a16:creationId xmlns:a16="http://schemas.microsoft.com/office/drawing/2014/main" id="{6057AE25-2CDE-2A6B-CD1E-7A3A96CF5E6C}"/>
+                </a:ext>
+              </a:extLst>
+            </p:cNvPr>
+            <p:cNvSpPr txBox="1"/>
+            <p:nvPr/>
+          </p:nvSpPr>
+          <p:spPr>
+            <a:xfrm flipH="1">
+              <a:off x="695324" y="2806851"/>
+              <a:ext cx="3545903" cy="523220"/>
+            </a:xfrm>
+            <a:prstGeom prst="rect">
+              <a:avLst/>
+            </a:prstGeom>
             <a:noFill/>
-          </a:ln>
-        </p:spPr>
-        <p:style>
-          <a:lnRef idx="2">
-            <a:schemeClr val="accent1">
-              <a:shade val="50000"/>
-            </a:schemeClr>
-          </a:lnRef>
-          <a:fillRef idx="1">
-            <a:schemeClr val="accent1"/>
-          </a:fillRef>
-          <a:effectRef idx="0">
-            <a:schemeClr val="accent1"/>
-          </a:effectRef>
-          <a:fontRef idx="minor">
-            <a:schemeClr val="lt1"/>
-          </a:fontRef>
-        </p:style>
-        <p:txBody>
-          <a:bodyPr rtlCol="0" anchor="ctr"/>
-          <a:lstStyle/>
-          <a:p>
-            <a:pPr algn="ctr"/>
-            <a:endParaRPr lang="zh-CN" altLang="en-US"/>
-          </a:p>
-        </p:txBody>
-      </p:sp>
-      <p:sp>
-        <p:nvSpPr>
-          <p:cNvPr id="1048857" name="文本框 39">
+            <a:ln w="9525">
+              <a:noFill/>
+            </a:ln>
+          </p:spPr>
+          <p:txBody>
+            <a:bodyPr wrap="square" anchor="t">
+              <a:spAutoFit/>
+            </a:bodyPr>
+            <a:lstStyle/>
+            <a:p>
+              <a:r>
+                <a:rPr lang="zh-CN" altLang="en-US" sz="2800" b="1" dirty="0">
+                  <a:solidFill>
+                    <a:srgbClr val="2D3E50"/>
+                  </a:solidFill>
+                  <a:latin typeface="黑体" pitchFamily="49" charset="-122"/>
+                  <a:ea typeface="黑体" pitchFamily="49" charset="-122"/>
+                  <a:sym typeface="SimSun-ExtB" panose="02010609060101010101" pitchFamily="49" charset="-122"/>
+                </a:rPr>
+                <a:t>现存问题</a:t>
+              </a:r>
+            </a:p>
+          </p:txBody>
+        </p:sp>
+        <p:sp>
+          <p:nvSpPr>
+            <p:cNvPr id="1048621" name="稻壳儿春秋广告/盗版必究        原创来源：http://chn.docer.com/works?userid=199329941#!/work_time">
+              <a:extLst>
+                <a:ext uri="{FF2B5EF4-FFF2-40B4-BE49-F238E27FC236}">
+                  <a16:creationId xmlns:a16="http://schemas.microsoft.com/office/drawing/2014/main" id="{C760F5A4-35E2-DA0B-3B53-40F10F528DD3}"/>
+                </a:ext>
+              </a:extLst>
+            </p:cNvPr>
+            <p:cNvSpPr txBox="1"/>
+            <p:nvPr/>
+          </p:nvSpPr>
+          <p:spPr>
+            <a:xfrm flipH="1">
+              <a:off x="695324" y="2082338"/>
+              <a:ext cx="2778958" cy="707886"/>
+            </a:xfrm>
+            <a:prstGeom prst="rect">
+              <a:avLst/>
+            </a:prstGeom>
+            <a:noFill/>
+            <a:ln w="9525">
+              <a:noFill/>
+            </a:ln>
+          </p:spPr>
+          <p:txBody>
+            <a:bodyPr wrap="square" anchor="t">
+              <a:spAutoFit/>
+            </a:bodyPr>
+            <a:lstStyle/>
+            <a:p>
+              <a:r>
+                <a:rPr lang="en-US" altLang="zh-CN" sz="4000" b="1" dirty="0">
+                  <a:gradFill>
+                    <a:gsLst>
+                      <a:gs pos="0">
+                        <a:srgbClr val="012D86"/>
+                      </a:gs>
+                      <a:gs pos="100000">
+                        <a:srgbClr val="0E2557"/>
+                      </a:gs>
+                    </a:gsLst>
+                    <a:lin scaled="0"/>
+                  </a:gradFill>
+                  <a:latin typeface="SimSun-ExtB" panose="02010609060101010101" pitchFamily="49" charset="-122"/>
+                  <a:ea typeface="微软雅黑 Light" panose="020B0502040204020203" pitchFamily="34" charset="-122"/>
+                  <a:sym typeface="SimSun-ExtB" panose="02010609060101010101" pitchFamily="49" charset="-122"/>
+                </a:rPr>
+                <a:t>PART 02</a:t>
+              </a:r>
+            </a:p>
+          </p:txBody>
+        </p:sp>
+      </p:grpSp>
+      <p:pic>
+        <p:nvPicPr>
+          <p:cNvPr id="2097156" name="图片 1" descr="理工灰">
             <a:extLst>
               <a:ext uri="{FF2B5EF4-FFF2-40B4-BE49-F238E27FC236}">
-                <a16:creationId xmlns:a16="http://schemas.microsoft.com/office/drawing/2014/main" id="{0F29EE2C-E958-1EBC-06F3-BC4368123B5D}"/>
-              </a:ext>
-            </a:extLst>
-          </p:cNvPr>
-          <p:cNvSpPr txBox="1"/>
-          <p:nvPr/>
-        </p:nvSpPr>
-        <p:spPr>
-          <a:xfrm>
-            <a:off x="1783080" y="361950"/>
-            <a:ext cx="5379720" cy="584775"/>
-          </a:xfrm>
-          <a:prstGeom prst="rect">
-            <a:avLst/>
-          </a:prstGeom>
-          <a:noFill/>
-          <a:ln w="9525">
-            <a:noFill/>
-          </a:ln>
-        </p:spPr>
-        <p:txBody>
-          <a:bodyPr wrap="square" anchor="t">
-            <a:spAutoFit/>
-          </a:bodyPr>
-          <a:lstStyle/>
-          <a:p>
-            <a:r>
-              <a:rPr lang="en-US" altLang="zh-CN" sz="3200" b="0" dirty="0">
-                <a:solidFill>
-                  <a:srgbClr val="000000"/>
-                </a:solidFill>
-                <a:effectLst/>
-                <a:highlight>
-                  <a:srgbClr val="FFFFFF"/>
-                </a:highlight>
-                <a:latin typeface="Consolas" panose="020B0609020204030204" pitchFamily="49" charset="0"/>
-              </a:rPr>
-              <a:t>reL4</a:t>
-            </a:r>
-            <a:r>
-              <a:rPr lang="zh-CN" altLang="en-US" sz="3200" b="0" dirty="0">
-                <a:solidFill>
-                  <a:srgbClr val="000000"/>
-                </a:solidFill>
-                <a:effectLst/>
-                <a:highlight>
-                  <a:srgbClr val="FFFFFF"/>
-                </a:highlight>
-                <a:latin typeface="Consolas" panose="020B0609020204030204" pitchFamily="49" charset="0"/>
-              </a:rPr>
-              <a:t>异步</a:t>
-            </a:r>
-            <a:r>
-              <a:rPr lang="en-US" altLang="zh-CN" sz="3200" b="0" dirty="0">
-                <a:solidFill>
-                  <a:srgbClr val="000000"/>
-                </a:solidFill>
-                <a:effectLst/>
-                <a:highlight>
-                  <a:srgbClr val="FFFFFF"/>
-                </a:highlight>
-                <a:latin typeface="Consolas" panose="020B0609020204030204" pitchFamily="49" charset="0"/>
-              </a:rPr>
-              <a:t>IPC</a:t>
-            </a:r>
-            <a:r>
-              <a:rPr lang="zh-CN" altLang="en-US" sz="3200" b="0" dirty="0">
-                <a:solidFill>
-                  <a:srgbClr val="000000"/>
-                </a:solidFill>
-                <a:effectLst/>
-                <a:highlight>
-                  <a:srgbClr val="FFFFFF"/>
-                </a:highlight>
-                <a:latin typeface="Consolas" panose="020B0609020204030204" pitchFamily="49" charset="0"/>
-              </a:rPr>
-              <a:t>实验</a:t>
-            </a:r>
-          </a:p>
-        </p:txBody>
-      </p:sp>
-      <p:sp>
-        <p:nvSpPr>
-          <p:cNvPr id="1048858" name="矩形 16">
-            <a:extLst>
-              <a:ext uri="{FF2B5EF4-FFF2-40B4-BE49-F238E27FC236}">
-                <a16:creationId xmlns:a16="http://schemas.microsoft.com/office/drawing/2014/main" id="{50B68FEA-4DD6-81EB-9693-DDB769063201}"/>
-              </a:ext>
-            </a:extLst>
-          </p:cNvPr>
-          <p:cNvSpPr/>
-          <p:nvPr/>
-        </p:nvSpPr>
-        <p:spPr>
-          <a:xfrm>
-            <a:off x="664431" y="1218648"/>
-            <a:ext cx="8117755" cy="400110"/>
-          </a:xfrm>
-          <a:prstGeom prst="rect">
-            <a:avLst/>
-          </a:prstGeom>
-          <a:noFill/>
-          <a:ln w="9525">
-            <a:noFill/>
-          </a:ln>
-        </p:spPr>
-        <p:txBody>
-          <a:bodyPr wrap="square" anchor="t">
-            <a:spAutoFit/>
-          </a:bodyPr>
-          <a:lstStyle/>
-          <a:p>
-            <a:r>
-              <a:rPr lang="en-US" altLang="zh-CN" sz="2000" dirty="0">
-                <a:solidFill>
-                  <a:srgbClr val="000000"/>
-                </a:solidFill>
-                <a:latin typeface="Consolas" panose="020B0609020204030204" pitchFamily="49" charset="0"/>
-                <a:sym typeface="SimSun-ExtB" panose="02010609060101010101" pitchFamily="49" charset="-122"/>
-              </a:rPr>
-              <a:t>2.</a:t>
-            </a:r>
-            <a:r>
-              <a:rPr lang="zh-CN" altLang="en-US" sz="2000" dirty="0">
-                <a:solidFill>
-                  <a:srgbClr val="000000"/>
-                </a:solidFill>
-                <a:latin typeface="Consolas" panose="020B0609020204030204" pitchFamily="49" charset="0"/>
-                <a:sym typeface="SimSun-ExtB" panose="02010609060101010101" pitchFamily="49" charset="-122"/>
-              </a:rPr>
-              <a:t>阅读技术文档并结合代码理解</a:t>
-            </a:r>
-            <a:r>
-              <a:rPr lang="en-US" altLang="zh-CN" sz="2000" dirty="0">
-                <a:solidFill>
-                  <a:srgbClr val="000000"/>
-                </a:solidFill>
-                <a:latin typeface="Consolas" panose="020B0609020204030204" pitchFamily="49" charset="0"/>
-                <a:sym typeface="SimSun-ExtB" panose="02010609060101010101" pitchFamily="49" charset="-122"/>
-              </a:rPr>
-              <a:t>reL4</a:t>
-            </a:r>
-            <a:r>
-              <a:rPr lang="zh-CN" altLang="en-US" sz="2000" dirty="0">
-                <a:solidFill>
-                  <a:srgbClr val="000000"/>
-                </a:solidFill>
-                <a:latin typeface="Consolas" panose="020B0609020204030204" pitchFamily="49" charset="0"/>
-                <a:sym typeface="SimSun-ExtB" panose="02010609060101010101" pitchFamily="49" charset="-122"/>
-              </a:rPr>
-              <a:t>异步</a:t>
-            </a:r>
-            <a:r>
-              <a:rPr lang="en-US" altLang="zh-CN" sz="2000" dirty="0">
-                <a:solidFill>
-                  <a:srgbClr val="000000"/>
-                </a:solidFill>
-                <a:latin typeface="Consolas" panose="020B0609020204030204" pitchFamily="49" charset="0"/>
-                <a:sym typeface="SimSun-ExtB" panose="02010609060101010101" pitchFamily="49" charset="-122"/>
-              </a:rPr>
-              <a:t>IPC</a:t>
-            </a:r>
-            <a:endParaRPr lang="zh-CN" altLang="en-US" sz="2000" dirty="0">
-              <a:solidFill>
-                <a:srgbClr val="2D3E50"/>
-              </a:solidFill>
-              <a:latin typeface="SimSun-ExtB" panose="02010609060101010101" pitchFamily="49" charset="-122"/>
-              <a:ea typeface="微软雅黑 Light" panose="020B0502040204020203" pitchFamily="34" charset="-122"/>
-              <a:sym typeface="SimSun-ExtB" panose="02010609060101010101" pitchFamily="49" charset="-122"/>
-            </a:endParaRPr>
-          </a:p>
-        </p:txBody>
-      </p:sp>
-      <p:pic>
-        <p:nvPicPr>
-          <p:cNvPr id="2097192" name="图片 3" descr="理工灰">
-            <a:extLst>
-              <a:ext uri="{FF2B5EF4-FFF2-40B4-BE49-F238E27FC236}">
-                <a16:creationId xmlns:a16="http://schemas.microsoft.com/office/drawing/2014/main" id="{4E12E03C-27C6-7B08-AD5D-91308F2E9793}"/>
+                <a16:creationId xmlns:a16="http://schemas.microsoft.com/office/drawing/2014/main" id="{F3394123-3BAA-7E0F-91D5-FEFAD5E8A884}"/>
               </a:ext>
             </a:extLst>
           </p:cNvPr>
@@ -9909,6 +9586,40 @@
         </p:nvPicPr>
         <p:blipFill>
           <a:blip r:embed="rId3" cstate="print"/>
+          <a:stretch>
+            <a:fillRect/>
+          </a:stretch>
+        </p:blipFill>
+        <p:spPr>
+          <a:xfrm>
+            <a:off x="11095038" y="5745163"/>
+            <a:ext cx="846137" cy="730250"/>
+          </a:xfrm>
+          <a:prstGeom prst="rect">
+            <a:avLst/>
+          </a:prstGeom>
+          <a:noFill/>
+          <a:ln w="9525">
+            <a:noFill/>
+          </a:ln>
+        </p:spPr>
+      </p:pic>
+      <p:pic>
+        <p:nvPicPr>
+          <p:cNvPr id="2097157" name="图片 3" descr="理工灰">
+            <a:extLst>
+              <a:ext uri="{FF2B5EF4-FFF2-40B4-BE49-F238E27FC236}">
+                <a16:creationId xmlns:a16="http://schemas.microsoft.com/office/drawing/2014/main" id="{B7DFB1E8-FFBF-0D56-CC58-0E413CE789AB}"/>
+              </a:ext>
+            </a:extLst>
+          </p:cNvPr>
+          <p:cNvPicPr>
+            <a:picLocks noChangeAspect="1"/>
+          </p:cNvPicPr>
+          <p:nvPr/>
+        </p:nvPicPr>
+        <p:blipFill>
+          <a:blip r:embed="rId4" cstate="print"/>
           <a:stretch>
             <a:fillRect/>
           </a:stretch>
@@ -9932,7 +9643,7 @@
           <p:cNvPr id="2" name="灯片编号占位符 1">
             <a:extLst>
               <a:ext uri="{FF2B5EF4-FFF2-40B4-BE49-F238E27FC236}">
-                <a16:creationId xmlns:a16="http://schemas.microsoft.com/office/drawing/2014/main" id="{6069CFEF-DCB2-EE8E-9109-DA0AEF336CD3}"/>
+                <a16:creationId xmlns:a16="http://schemas.microsoft.com/office/drawing/2014/main" id="{18802F67-890D-63E6-E315-4B401A2A77D7}"/>
               </a:ext>
             </a:extLst>
           </p:cNvPr>
@@ -9962,46 +9673,10 @@
           </a:p>
         </p:txBody>
       </p:sp>
-      <p:pic>
-        <p:nvPicPr>
-          <p:cNvPr id="4" name="图片 3">
-            <a:extLst>
-              <a:ext uri="{FF2B5EF4-FFF2-40B4-BE49-F238E27FC236}">
-                <a16:creationId xmlns:a16="http://schemas.microsoft.com/office/drawing/2014/main" id="{8DD1695F-076D-8816-58C9-1555F36F9B58}"/>
-              </a:ext>
-            </a:extLst>
-          </p:cNvPr>
-          <p:cNvPicPr>
-            <a:picLocks noChangeAspect="1"/>
-          </p:cNvPicPr>
-          <p:nvPr/>
-        </p:nvPicPr>
-        <p:blipFill>
-          <a:blip r:embed="rId4">
-            <a:extLst>
-              <a:ext uri="{28A0092B-C50C-407E-A947-70E740481C1C}">
-                <a14:useLocalDpi xmlns:a14="http://schemas.microsoft.com/office/drawing/2010/main" val="0"/>
-              </a:ext>
-            </a:extLst>
-          </a:blip>
-          <a:stretch>
-            <a:fillRect/>
-          </a:stretch>
-        </p:blipFill>
-        <p:spPr>
-          <a:xfrm>
-            <a:off x="664431" y="1639570"/>
-            <a:ext cx="7495729" cy="4724400"/>
-          </a:xfrm>
-          <a:prstGeom prst="rect">
-            <a:avLst/>
-          </a:prstGeom>
-        </p:spPr>
-      </p:pic>
     </p:spTree>
     <p:extLst>
       <p:ext uri="{BB962C8B-B14F-4D97-AF65-F5344CB8AC3E}">
-        <p14:creationId xmlns:p14="http://schemas.microsoft.com/office/powerpoint/2010/main" val="4194884469"/>
+        <p14:creationId xmlns:p14="http://schemas.microsoft.com/office/powerpoint/2010/main" val="895125780"/>
       </p:ext>
     </p:extLst>
   </p:cSld>
@@ -10009,7 +9684,7 @@
     <a:masterClrMapping/>
   </p:clrMapOvr>
   <p:transition>
-    <p:fade thruBlk="1"/>
+    <p:wipe/>
   </p:transition>
 </p:sld>
 </file>

</xml_diff>

<commit_message>
mid-term repo ppt final
</commit_message>
<xml_diff>
--- a/中期报告-04-08.pptx
+++ b/中期报告-04-08.pptx
@@ -5,22 +5,24 @@
     <p:sldMasterId id="2147483648" r:id="rId1"/>
   </p:sldMasterIdLst>
   <p:notesMasterIdLst>
-    <p:notesMasterId r:id="rId15"/>
+    <p:notesMasterId r:id="rId17"/>
   </p:notesMasterIdLst>
   <p:sldIdLst>
     <p:sldId id="256" r:id="rId2"/>
     <p:sldId id="257" r:id="rId3"/>
-    <p:sldId id="259" r:id="rId4"/>
-    <p:sldId id="283" r:id="rId5"/>
-    <p:sldId id="274" r:id="rId6"/>
-    <p:sldId id="287" r:id="rId7"/>
-    <p:sldId id="288" r:id="rId8"/>
-    <p:sldId id="285" r:id="rId9"/>
-    <p:sldId id="275" r:id="rId10"/>
-    <p:sldId id="289" r:id="rId11"/>
-    <p:sldId id="278" r:id="rId12"/>
-    <p:sldId id="276" r:id="rId13"/>
-    <p:sldId id="272" r:id="rId14"/>
+    <p:sldId id="291" r:id="rId4"/>
+    <p:sldId id="290" r:id="rId5"/>
+    <p:sldId id="259" r:id="rId6"/>
+    <p:sldId id="283" r:id="rId7"/>
+    <p:sldId id="274" r:id="rId8"/>
+    <p:sldId id="287" r:id="rId9"/>
+    <p:sldId id="288" r:id="rId10"/>
+    <p:sldId id="285" r:id="rId11"/>
+    <p:sldId id="275" r:id="rId12"/>
+    <p:sldId id="289" r:id="rId13"/>
+    <p:sldId id="278" r:id="rId14"/>
+    <p:sldId id="276" r:id="rId15"/>
+    <p:sldId id="272" r:id="rId16"/>
   </p:sldIdLst>
   <p:sldSz cx="12192000" cy="6858000"/>
   <p:notesSz cx="6858000" cy="9144000"/>
@@ -4241,7 +4243,7 @@
           <a:lstStyle/>
           <a:p>
             <a:r>
-              <a:rPr lang="zh-CN" altLang="en-US" sz="3200" b="0" dirty="0">
+              <a:rPr lang="en-US" altLang="zh-CN" sz="3200" b="0" dirty="0">
                 <a:solidFill>
                   <a:srgbClr val="000000"/>
                 </a:solidFill>
@@ -4251,7 +4253,46 @@
                 </a:highlight>
                 <a:latin typeface="Consolas" panose="020B0609020204030204" pitchFamily="49" charset="0"/>
               </a:rPr>
-              <a:t>现存问题与解决方案</a:t>
+              <a:t>reL4</a:t>
+            </a:r>
+            <a:r>
+              <a:rPr lang="zh-CN" altLang="en-US" sz="3200" b="0" dirty="0">
+                <a:solidFill>
+                  <a:srgbClr val="000000"/>
+                </a:solidFill>
+                <a:effectLst/>
+                <a:highlight>
+                  <a:srgbClr val="FFFFFF"/>
+                </a:highlight>
+                <a:latin typeface="Consolas" panose="020B0609020204030204" pitchFamily="49" charset="0"/>
+              </a:rPr>
+              <a:t>异步</a:t>
+            </a:r>
+            <a:r>
+              <a:rPr lang="en-US" altLang="zh-CN" sz="3200" b="0" dirty="0">
+                <a:solidFill>
+                  <a:srgbClr val="000000"/>
+                </a:solidFill>
+                <a:effectLst/>
+                <a:highlight>
+                  <a:srgbClr val="FFFFFF"/>
+                </a:highlight>
+                <a:latin typeface="Consolas" panose="020B0609020204030204" pitchFamily="49" charset="0"/>
+              </a:rPr>
+              <a:t>IPC</a:t>
+            </a:r>
+            <a:r>
+              <a:rPr lang="zh-CN" altLang="en-US" sz="3200" b="0" dirty="0">
+                <a:solidFill>
+                  <a:srgbClr val="000000"/>
+                </a:solidFill>
+                <a:effectLst/>
+                <a:highlight>
+                  <a:srgbClr val="FFFFFF"/>
+                </a:highlight>
+                <a:latin typeface="Consolas" panose="020B0609020204030204" pitchFamily="49" charset="0"/>
+              </a:rPr>
+              <a:t>实验</a:t>
             </a:r>
           </a:p>
         </p:txBody>
@@ -4271,7 +4312,7 @@
         <p:spPr>
           <a:xfrm>
             <a:off x="664431" y="1218648"/>
-            <a:ext cx="10689369" cy="1938992"/>
+            <a:ext cx="10970723" cy="400110"/>
           </a:xfrm>
           <a:prstGeom prst="rect">
             <a:avLst/>
@@ -4305,7 +4346,7 @@
                 <a:latin typeface="Consolas" panose="020B0609020204030204" pitchFamily="49" charset="0"/>
                 <a:sym typeface="SimSun-ExtB" panose="02010609060101010101" pitchFamily="49" charset="-122"/>
               </a:rPr>
-              <a:t>工作主要集中在</a:t>
+              <a:t>阅读</a:t>
             </a:r>
             <a:r>
               <a:rPr lang="en-US" altLang="zh-CN" sz="2000" dirty="0">
@@ -4315,7 +4356,7 @@
                 <a:latin typeface="Consolas" panose="020B0609020204030204" pitchFamily="49" charset="0"/>
                 <a:sym typeface="SimSun-ExtB" panose="02010609060101010101" pitchFamily="49" charset="-122"/>
               </a:rPr>
-              <a:t>seL4</a:t>
+              <a:t>Notification</a:t>
             </a:r>
             <a:r>
               <a:rPr lang="zh-CN" altLang="en-US" sz="2000" dirty="0">
@@ -4325,7 +4366,7 @@
                 <a:latin typeface="Consolas" panose="020B0609020204030204" pitchFamily="49" charset="0"/>
                 <a:sym typeface="SimSun-ExtB" panose="02010609060101010101" pitchFamily="49" charset="-122"/>
               </a:rPr>
-              <a:t>知识补充和</a:t>
+              <a:t>技术文档，阅读技术文档并结合代码理解</a:t>
             </a:r>
             <a:r>
               <a:rPr lang="en-US" altLang="zh-CN" sz="2000" dirty="0">
@@ -4345,27 +4386,7 @@
                 <a:latin typeface="Consolas" panose="020B0609020204030204" pitchFamily="49" charset="0"/>
                 <a:sym typeface="SimSun-ExtB" panose="02010609060101010101" pitchFamily="49" charset="-122"/>
               </a:rPr>
-              <a:t>代码框架阅读方面，代码编写较少。</a:t>
-            </a:r>
-            <a:endParaRPr lang="en-US" altLang="zh-CN" sz="2000" dirty="0">
-              <a:solidFill>
-                <a:srgbClr val="000000"/>
-              </a:solidFill>
-              <a:latin typeface="Consolas" panose="020B0609020204030204" pitchFamily="49" charset="0"/>
-              <a:sym typeface="SimSun-ExtB" panose="02010609060101010101" pitchFamily="49" charset="-122"/>
-            </a:endParaRPr>
-          </a:p>
-          <a:p>
-            <a:r>
-              <a:rPr lang="zh-CN" altLang="en-US" sz="2000" dirty="0">
-                <a:solidFill>
-                  <a:srgbClr val="000000"/>
-                </a:solidFill>
-                <a:latin typeface="Consolas" panose="020B0609020204030204" pitchFamily="49" charset="0"/>
-                <a:ea typeface="微软雅黑 Light" panose="020B0502040204020203" pitchFamily="34" charset="-122"/>
-                <a:sym typeface="SimSun-ExtB" panose="02010609060101010101" pitchFamily="49" charset="-122"/>
-              </a:rPr>
-              <a:t>解决方案：着手开始</a:t>
+              <a:t>异步</a:t>
             </a:r>
             <a:r>
               <a:rPr lang="en-US" altLang="zh-CN" sz="2000" dirty="0">
@@ -4373,161 +4394,10 @@
                   <a:srgbClr val="000000"/>
                 </a:solidFill>
                 <a:latin typeface="Consolas" panose="020B0609020204030204" pitchFamily="49" charset="0"/>
-                <a:ea typeface="微软雅黑 Light" panose="020B0502040204020203" pitchFamily="34" charset="-122"/>
-                <a:sym typeface="SimSun-ExtB" panose="02010609060101010101" pitchFamily="49" charset="-122"/>
-              </a:rPr>
-              <a:t>reL4</a:t>
-            </a:r>
-            <a:r>
-              <a:rPr lang="zh-CN" altLang="en-US" sz="2000" dirty="0">
-                <a:solidFill>
-                  <a:srgbClr val="000000"/>
-                </a:solidFill>
-                <a:latin typeface="Consolas" panose="020B0609020204030204" pitchFamily="49" charset="0"/>
-                <a:ea typeface="微软雅黑 Light" panose="020B0502040204020203" pitchFamily="34" charset="-122"/>
-                <a:sym typeface="SimSun-ExtB" panose="02010609060101010101" pitchFamily="49" charset="-122"/>
-              </a:rPr>
-              <a:t>异步系统调用开发工作。</a:t>
-            </a:r>
-            <a:endParaRPr lang="en-US" altLang="zh-CN" sz="2000" dirty="0">
-              <a:solidFill>
-                <a:srgbClr val="000000"/>
-              </a:solidFill>
-              <a:latin typeface="Consolas" panose="020B0609020204030204" pitchFamily="49" charset="0"/>
-              <a:ea typeface="微软雅黑 Light" panose="020B0502040204020203" pitchFamily="34" charset="-122"/>
-              <a:sym typeface="SimSun-ExtB" panose="02010609060101010101" pitchFamily="49" charset="-122"/>
-            </a:endParaRPr>
-          </a:p>
-          <a:p>
-            <a:endParaRPr lang="en-US" altLang="zh-CN" sz="2000" dirty="0">
-              <a:solidFill>
-                <a:srgbClr val="000000"/>
-              </a:solidFill>
-              <a:latin typeface="Consolas" panose="020B0609020204030204" pitchFamily="49" charset="0"/>
-              <a:ea typeface="微软雅黑 Light" panose="020B0502040204020203" pitchFamily="34" charset="-122"/>
-              <a:sym typeface="SimSun-ExtB" panose="02010609060101010101" pitchFamily="49" charset="-122"/>
-            </a:endParaRPr>
-          </a:p>
-          <a:p>
-            <a:r>
-              <a:rPr lang="en-US" altLang="zh-CN" sz="2000" dirty="0">
-                <a:solidFill>
-                  <a:srgbClr val="000000"/>
-                </a:solidFill>
-                <a:latin typeface="Consolas" panose="020B0609020204030204" pitchFamily="49" charset="0"/>
-                <a:ea typeface="微软雅黑 Light" panose="020B0502040204020203" pitchFamily="34" charset="-122"/>
-                <a:sym typeface="SimSun-ExtB" panose="02010609060101010101" pitchFamily="49" charset="-122"/>
-              </a:rPr>
-              <a:t>2.</a:t>
-            </a:r>
-            <a:r>
-              <a:rPr lang="zh-CN" altLang="en-US" sz="2000" dirty="0">
-                <a:solidFill>
-                  <a:srgbClr val="000000"/>
-                </a:solidFill>
-                <a:latin typeface="Consolas" panose="020B0609020204030204" pitchFamily="49" charset="0"/>
-                <a:ea typeface="微软雅黑 Light" panose="020B0502040204020203" pitchFamily="34" charset="-122"/>
-                <a:sym typeface="SimSun-ExtB" panose="02010609060101010101" pitchFamily="49" charset="-122"/>
-              </a:rPr>
-              <a:t>对于</a:t>
-            </a:r>
-            <a:r>
-              <a:rPr lang="en-US" altLang="zh-CN" sz="2000" dirty="0">
-                <a:solidFill>
-                  <a:srgbClr val="000000"/>
-                </a:solidFill>
-                <a:latin typeface="Consolas" panose="020B0609020204030204" pitchFamily="49" charset="0"/>
-                <a:ea typeface="微软雅黑 Light" panose="020B0502040204020203" pitchFamily="34" charset="-122"/>
-                <a:sym typeface="SimSun-ExtB" panose="02010609060101010101" pitchFamily="49" charset="-122"/>
-              </a:rPr>
-              <a:t>reL4</a:t>
-            </a:r>
-            <a:r>
-              <a:rPr lang="zh-CN" altLang="en-US" sz="2000" dirty="0">
-                <a:solidFill>
-                  <a:srgbClr val="000000"/>
-                </a:solidFill>
-                <a:latin typeface="Consolas" panose="020B0609020204030204" pitchFamily="49" charset="0"/>
-                <a:ea typeface="微软雅黑 Light" panose="020B0502040204020203" pitchFamily="34" charset="-122"/>
-                <a:sym typeface="SimSun-ExtB" panose="02010609060101010101" pitchFamily="49" charset="-122"/>
-              </a:rPr>
-              <a:t>的运行框架仅局限于</a:t>
-            </a:r>
-            <a:r>
-              <a:rPr lang="en-US" altLang="zh-CN" sz="2000" dirty="0">
-                <a:solidFill>
-                  <a:srgbClr val="000000"/>
-                </a:solidFill>
-                <a:latin typeface="Consolas" panose="020B0609020204030204" pitchFamily="49" charset="0"/>
-                <a:ea typeface="微软雅黑 Light" panose="020B0502040204020203" pitchFamily="34" charset="-122"/>
                 <a:sym typeface="SimSun-ExtB" panose="02010609060101010101" pitchFamily="49" charset="-122"/>
               </a:rPr>
               <a:t>IPC</a:t>
             </a:r>
-            <a:r>
-              <a:rPr lang="zh-CN" altLang="en-US" sz="2000" dirty="0">
-                <a:solidFill>
-                  <a:srgbClr val="000000"/>
-                </a:solidFill>
-                <a:latin typeface="Consolas" panose="020B0609020204030204" pitchFamily="49" charset="0"/>
-                <a:ea typeface="微软雅黑 Light" panose="020B0502040204020203" pitchFamily="34" charset="-122"/>
-                <a:sym typeface="SimSun-ExtB" panose="02010609060101010101" pitchFamily="49" charset="-122"/>
-              </a:rPr>
-              <a:t>代码路径部分，其余部分代码的联系理解缺失</a:t>
-            </a:r>
-            <a:endParaRPr lang="en-US" altLang="zh-CN" sz="2000" dirty="0">
-              <a:solidFill>
-                <a:srgbClr val="000000"/>
-              </a:solidFill>
-              <a:latin typeface="Consolas" panose="020B0609020204030204" pitchFamily="49" charset="0"/>
-              <a:ea typeface="微软雅黑 Light" panose="020B0502040204020203" pitchFamily="34" charset="-122"/>
-              <a:sym typeface="SimSun-ExtB" panose="02010609060101010101" pitchFamily="49" charset="-122"/>
-            </a:endParaRPr>
-          </a:p>
-          <a:p>
-            <a:r>
-              <a:rPr lang="zh-CN" altLang="en-US" sz="2000" dirty="0">
-                <a:solidFill>
-                  <a:srgbClr val="000000"/>
-                </a:solidFill>
-                <a:latin typeface="Consolas" panose="020B0609020204030204" pitchFamily="49" charset="0"/>
-                <a:ea typeface="微软雅黑 Light" panose="020B0502040204020203" pitchFamily="34" charset="-122"/>
-                <a:sym typeface="SimSun-ExtB" panose="02010609060101010101" pitchFamily="49" charset="-122"/>
-              </a:rPr>
-              <a:t>解决方案：需要尝试理顺</a:t>
-            </a:r>
-            <a:r>
-              <a:rPr lang="en-US" altLang="zh-CN" sz="2000" dirty="0">
-                <a:solidFill>
-                  <a:srgbClr val="000000"/>
-                </a:solidFill>
-                <a:latin typeface="Consolas" panose="020B0609020204030204" pitchFamily="49" charset="0"/>
-                <a:ea typeface="微软雅黑 Light" panose="020B0502040204020203" pitchFamily="34" charset="-122"/>
-                <a:sym typeface="SimSun-ExtB" panose="02010609060101010101" pitchFamily="49" charset="-122"/>
-              </a:rPr>
-              <a:t>reL4</a:t>
-            </a:r>
-            <a:r>
-              <a:rPr lang="zh-CN" altLang="en-US" sz="2000" dirty="0">
-                <a:solidFill>
-                  <a:srgbClr val="000000"/>
-                </a:solidFill>
-                <a:latin typeface="Consolas" panose="020B0609020204030204" pitchFamily="49" charset="0"/>
-                <a:ea typeface="微软雅黑 Light" panose="020B0502040204020203" pitchFamily="34" charset="-122"/>
-                <a:sym typeface="SimSun-ExtB" panose="02010609060101010101" pitchFamily="49" charset="-122"/>
-              </a:rPr>
-              <a:t>代码框架。</a:t>
-            </a:r>
-            <a:endParaRPr lang="zh-CN" altLang="en-US" sz="2000" dirty="0">
-              <a:solidFill>
-                <a:srgbClr val="2D3E50"/>
-              </a:solidFill>
-              <a:latin typeface="SimSun-ExtB" panose="02010609060101010101" pitchFamily="49" charset="-122"/>
-              <a:ea typeface="微软雅黑 Light" panose="020B0502040204020203" pitchFamily="34" charset="-122"/>
-              <a:sym typeface="SimSun-ExtB" panose="02010609060101010101" pitchFamily="49" charset="-122"/>
-            </a:endParaRPr>
-          </a:p>
-          <a:p>
             <a:endParaRPr lang="zh-CN" altLang="en-US" sz="2000" dirty="0">
               <a:solidFill>
                 <a:srgbClr val="2D3E50"/>
@@ -4608,6 +4478,822 @@
           </a:p>
         </p:txBody>
       </p:sp>
+      <p:pic>
+        <p:nvPicPr>
+          <p:cNvPr id="6" name="图片 5">
+            <a:extLst>
+              <a:ext uri="{FF2B5EF4-FFF2-40B4-BE49-F238E27FC236}">
+                <a16:creationId xmlns:a16="http://schemas.microsoft.com/office/drawing/2014/main" id="{08A2AE65-21F0-BB40-6081-A5FC404C9DA8}"/>
+              </a:ext>
+            </a:extLst>
+          </p:cNvPr>
+          <p:cNvPicPr>
+            <a:picLocks noChangeAspect="1"/>
+          </p:cNvPicPr>
+          <p:nvPr/>
+        </p:nvPicPr>
+        <p:blipFill>
+          <a:blip r:embed="rId4">
+            <a:extLst>
+              <a:ext uri="{28A0092B-C50C-407E-A947-70E740481C1C}">
+                <a14:useLocalDpi xmlns:a14="http://schemas.microsoft.com/office/drawing/2010/main" val="0"/>
+              </a:ext>
+            </a:extLst>
+          </a:blip>
+          <a:stretch>
+            <a:fillRect/>
+          </a:stretch>
+        </p:blipFill>
+        <p:spPr>
+          <a:xfrm>
+            <a:off x="664432" y="2070680"/>
+            <a:ext cx="7043492" cy="3748410"/>
+          </a:xfrm>
+          <a:prstGeom prst="rect">
+            <a:avLst/>
+          </a:prstGeom>
+        </p:spPr>
+      </p:pic>
+    </p:spTree>
+    <p:extLst>
+      <p:ext uri="{BB962C8B-B14F-4D97-AF65-F5344CB8AC3E}">
+        <p14:creationId xmlns:p14="http://schemas.microsoft.com/office/powerpoint/2010/main" val="3605829571"/>
+      </p:ext>
+    </p:extLst>
+  </p:cSld>
+  <p:clrMapOvr>
+    <a:masterClrMapping/>
+  </p:clrMapOvr>
+  <p:transition>
+    <p:fade thruBlk="1"/>
+  </p:transition>
+</p:sld>
+</file>
+
+<file path=ppt/slides/slide11.xml><?xml version="1.0" encoding="utf-8"?>
+<p:sld xmlns:a="http://schemas.openxmlformats.org/drawingml/2006/main" xmlns:r="http://schemas.openxmlformats.org/officeDocument/2006/relationships" xmlns:p="http://schemas.openxmlformats.org/presentationml/2006/main" showMasterSp="0">
+  <p:cSld>
+    <p:bg>
+      <p:bgPr>
+        <a:blipFill rotWithShape="1">
+          <a:blip r:embed="rId2" cstate="print">
+            <a:alphaModFix amt="74000"/>
+          </a:blip>
+          <a:stretch>
+            <a:fillRect l="-15000" t="-9000" r="-4000" b="-1000"/>
+          </a:stretch>
+        </a:blipFill>
+        <a:effectLst/>
+      </p:bgPr>
+    </p:bg>
+    <p:spTree>
+      <p:nvGrpSpPr>
+        <p:cNvPr id="1" name="">
+          <a:extLst>
+            <a:ext uri="{FF2B5EF4-FFF2-40B4-BE49-F238E27FC236}">
+              <a16:creationId xmlns:a16="http://schemas.microsoft.com/office/drawing/2014/main" id="{3D5305F2-1267-6578-16DE-E7E484D26FAA}"/>
+            </a:ext>
+          </a:extLst>
+        </p:cNvPr>
+        <p:cNvGrpSpPr/>
+        <p:nvPr/>
+      </p:nvGrpSpPr>
+      <p:grpSpPr>
+        <a:xfrm>
+          <a:off x="0" y="0"/>
+          <a:ext cx="0" cy="0"/>
+          <a:chOff x="0" y="0"/>
+          <a:chExt cx="0" cy="0"/>
+        </a:xfrm>
+      </p:grpSpPr>
+      <p:grpSp>
+        <p:nvGrpSpPr>
+          <p:cNvPr id="52" name="组合 13">
+            <a:extLst>
+              <a:ext uri="{FF2B5EF4-FFF2-40B4-BE49-F238E27FC236}">
+                <a16:creationId xmlns:a16="http://schemas.microsoft.com/office/drawing/2014/main" id="{0B778E5F-4943-E79C-8231-A01BC59E7602}"/>
+              </a:ext>
+            </a:extLst>
+          </p:cNvPr>
+          <p:cNvGrpSpPr/>
+          <p:nvPr/>
+        </p:nvGrpSpPr>
+        <p:grpSpPr>
+          <a:xfrm>
+            <a:off x="695325" y="2082799"/>
+            <a:ext cx="3830902" cy="1247397"/>
+            <a:chOff x="695324" y="2082338"/>
+            <a:chExt cx="3545903" cy="1247733"/>
+          </a:xfrm>
+        </p:grpSpPr>
+        <p:sp>
+          <p:nvSpPr>
+            <p:cNvPr id="1048620" name="稻壳儿春秋广告/盗版必究        原创来源：http://chn.docer.com/works?userid=199329941#!/work_time">
+              <a:extLst>
+                <a:ext uri="{FF2B5EF4-FFF2-40B4-BE49-F238E27FC236}">
+                  <a16:creationId xmlns:a16="http://schemas.microsoft.com/office/drawing/2014/main" id="{6057AE25-2CDE-2A6B-CD1E-7A3A96CF5E6C}"/>
+                </a:ext>
+              </a:extLst>
+            </p:cNvPr>
+            <p:cNvSpPr txBox="1"/>
+            <p:nvPr/>
+          </p:nvSpPr>
+          <p:spPr>
+            <a:xfrm flipH="1">
+              <a:off x="695324" y="2806851"/>
+              <a:ext cx="3545903" cy="523220"/>
+            </a:xfrm>
+            <a:prstGeom prst="rect">
+              <a:avLst/>
+            </a:prstGeom>
+            <a:noFill/>
+            <a:ln w="9525">
+              <a:noFill/>
+            </a:ln>
+          </p:spPr>
+          <p:txBody>
+            <a:bodyPr wrap="square" anchor="t">
+              <a:spAutoFit/>
+            </a:bodyPr>
+            <a:lstStyle/>
+            <a:p>
+              <a:r>
+                <a:rPr lang="zh-CN" altLang="en-US" sz="2800" b="1" dirty="0">
+                  <a:solidFill>
+                    <a:srgbClr val="2D3E50"/>
+                  </a:solidFill>
+                  <a:latin typeface="黑体" pitchFamily="49" charset="-122"/>
+                  <a:ea typeface="黑体" pitchFamily="49" charset="-122"/>
+                  <a:sym typeface="SimSun-ExtB" panose="02010609060101010101" pitchFamily="49" charset="-122"/>
+                </a:rPr>
+                <a:t>现存问题</a:t>
+              </a:r>
+            </a:p>
+          </p:txBody>
+        </p:sp>
+        <p:sp>
+          <p:nvSpPr>
+            <p:cNvPr id="1048621" name="稻壳儿春秋广告/盗版必究        原创来源：http://chn.docer.com/works?userid=199329941#!/work_time">
+              <a:extLst>
+                <a:ext uri="{FF2B5EF4-FFF2-40B4-BE49-F238E27FC236}">
+                  <a16:creationId xmlns:a16="http://schemas.microsoft.com/office/drawing/2014/main" id="{C760F5A4-35E2-DA0B-3B53-40F10F528DD3}"/>
+                </a:ext>
+              </a:extLst>
+            </p:cNvPr>
+            <p:cNvSpPr txBox="1"/>
+            <p:nvPr/>
+          </p:nvSpPr>
+          <p:spPr>
+            <a:xfrm flipH="1">
+              <a:off x="695324" y="2082338"/>
+              <a:ext cx="2778958" cy="707886"/>
+            </a:xfrm>
+            <a:prstGeom prst="rect">
+              <a:avLst/>
+            </a:prstGeom>
+            <a:noFill/>
+            <a:ln w="9525">
+              <a:noFill/>
+            </a:ln>
+          </p:spPr>
+          <p:txBody>
+            <a:bodyPr wrap="square" anchor="t">
+              <a:spAutoFit/>
+            </a:bodyPr>
+            <a:lstStyle/>
+            <a:p>
+              <a:r>
+                <a:rPr lang="en-US" altLang="zh-CN" sz="4000" b="1" dirty="0">
+                  <a:gradFill>
+                    <a:gsLst>
+                      <a:gs pos="0">
+                        <a:srgbClr val="012D86"/>
+                      </a:gs>
+                      <a:gs pos="100000">
+                        <a:srgbClr val="0E2557"/>
+                      </a:gs>
+                    </a:gsLst>
+                    <a:lin scaled="0"/>
+                  </a:gradFill>
+                  <a:latin typeface="SimSun-ExtB" panose="02010609060101010101" pitchFamily="49" charset="-122"/>
+                  <a:ea typeface="微软雅黑 Light" panose="020B0502040204020203" pitchFamily="34" charset="-122"/>
+                  <a:sym typeface="SimSun-ExtB" panose="02010609060101010101" pitchFamily="49" charset="-122"/>
+                </a:rPr>
+                <a:t>PART 03</a:t>
+              </a:r>
+            </a:p>
+          </p:txBody>
+        </p:sp>
+      </p:grpSp>
+      <p:pic>
+        <p:nvPicPr>
+          <p:cNvPr id="2097156" name="图片 1" descr="理工灰">
+            <a:extLst>
+              <a:ext uri="{FF2B5EF4-FFF2-40B4-BE49-F238E27FC236}">
+                <a16:creationId xmlns:a16="http://schemas.microsoft.com/office/drawing/2014/main" id="{F3394123-3BAA-7E0F-91D5-FEFAD5E8A884}"/>
+              </a:ext>
+            </a:extLst>
+          </p:cNvPr>
+          <p:cNvPicPr>
+            <a:picLocks noChangeAspect="1"/>
+          </p:cNvPicPr>
+          <p:nvPr/>
+        </p:nvPicPr>
+        <p:blipFill>
+          <a:blip r:embed="rId3" cstate="print"/>
+          <a:stretch>
+            <a:fillRect/>
+          </a:stretch>
+        </p:blipFill>
+        <p:spPr>
+          <a:xfrm>
+            <a:off x="11095038" y="5745163"/>
+            <a:ext cx="846137" cy="730250"/>
+          </a:xfrm>
+          <a:prstGeom prst="rect">
+            <a:avLst/>
+          </a:prstGeom>
+          <a:noFill/>
+          <a:ln w="9525">
+            <a:noFill/>
+          </a:ln>
+        </p:spPr>
+      </p:pic>
+      <p:pic>
+        <p:nvPicPr>
+          <p:cNvPr id="2097157" name="图片 3" descr="理工灰">
+            <a:extLst>
+              <a:ext uri="{FF2B5EF4-FFF2-40B4-BE49-F238E27FC236}">
+                <a16:creationId xmlns:a16="http://schemas.microsoft.com/office/drawing/2014/main" id="{B7DFB1E8-FFBF-0D56-CC58-0E413CE789AB}"/>
+              </a:ext>
+            </a:extLst>
+          </p:cNvPr>
+          <p:cNvPicPr>
+            <a:picLocks noChangeAspect="1"/>
+          </p:cNvPicPr>
+          <p:nvPr/>
+        </p:nvPicPr>
+        <p:blipFill>
+          <a:blip r:embed="rId4" cstate="print"/>
+          <a:stretch>
+            <a:fillRect/>
+          </a:stretch>
+        </p:blipFill>
+        <p:spPr>
+          <a:xfrm>
+            <a:off x="11017250" y="279400"/>
+            <a:ext cx="873125" cy="752475"/>
+          </a:xfrm>
+          <a:prstGeom prst="rect">
+            <a:avLst/>
+          </a:prstGeom>
+          <a:noFill/>
+          <a:ln w="9525">
+            <a:noFill/>
+          </a:ln>
+        </p:spPr>
+      </p:pic>
+      <p:sp>
+        <p:nvSpPr>
+          <p:cNvPr id="2" name="灯片编号占位符 1">
+            <a:extLst>
+              <a:ext uri="{FF2B5EF4-FFF2-40B4-BE49-F238E27FC236}">
+                <a16:creationId xmlns:a16="http://schemas.microsoft.com/office/drawing/2014/main" id="{18802F67-890D-63E6-E315-4B401A2A77D7}"/>
+              </a:ext>
+            </a:extLst>
+          </p:cNvPr>
+          <p:cNvSpPr>
+            <a:spLocks noGrp="1"/>
+          </p:cNvSpPr>
+          <p:nvPr>
+            <p:ph type="sldNum" sz="quarter" idx="12"/>
+          </p:nvPr>
+        </p:nvSpPr>
+        <p:spPr/>
+        <p:txBody>
+          <a:bodyPr/>
+          <a:lstStyle/>
+          <a:p>
+            <a:pPr fontAlgn="auto"/>
+            <a:fld id="{CA2E1F5A-C151-4DEE-93E4-F5F32EEAF57D}" type="slidenum">
+              <a:rPr lang="zh-CN" altLang="en-US" strike="noStrike" noProof="1" smtClean="0">
+                <a:latin typeface="+mn-lt"/>
+                <a:ea typeface="+mn-ea"/>
+                <a:cs typeface="+mn-cs"/>
+              </a:rPr>
+              <a:pPr fontAlgn="auto"/>
+              <a:t>11</a:t>
+            </a:fld>
+            <a:endParaRPr lang="zh-CN" altLang="en-US" strike="noStrike" noProof="1"/>
+          </a:p>
+        </p:txBody>
+      </p:sp>
+    </p:spTree>
+    <p:extLst>
+      <p:ext uri="{BB962C8B-B14F-4D97-AF65-F5344CB8AC3E}">
+        <p14:creationId xmlns:p14="http://schemas.microsoft.com/office/powerpoint/2010/main" val="895125780"/>
+      </p:ext>
+    </p:extLst>
+  </p:cSld>
+  <p:clrMapOvr>
+    <a:masterClrMapping/>
+  </p:clrMapOvr>
+  <p:transition>
+    <p:wipe/>
+  </p:transition>
+</p:sld>
+</file>
+
+<file path=ppt/slides/slide12.xml><?xml version="1.0" encoding="utf-8"?>
+<p:sld xmlns:a="http://schemas.openxmlformats.org/drawingml/2006/main" xmlns:r="http://schemas.openxmlformats.org/officeDocument/2006/relationships" xmlns:p="http://schemas.openxmlformats.org/presentationml/2006/main" showMasterSp="0">
+  <p:cSld>
+    <p:bg>
+      <p:bgPr>
+        <a:blipFill rotWithShape="1">
+          <a:blip r:embed="rId2" cstate="print">
+            <a:alphaModFix amt="39000"/>
+          </a:blip>
+          <a:stretch>
+            <a:fillRect l="-5000" t="-9000" r="-10000" b="-13000"/>
+          </a:stretch>
+        </a:blipFill>
+        <a:effectLst/>
+      </p:bgPr>
+    </p:bg>
+    <p:spTree>
+      <p:nvGrpSpPr>
+        <p:cNvPr id="1" name="">
+          <a:extLst>
+            <a:ext uri="{FF2B5EF4-FFF2-40B4-BE49-F238E27FC236}">
+              <a16:creationId xmlns:a16="http://schemas.microsoft.com/office/drawing/2014/main" id="{D7B3757C-37F6-3F39-162E-7DFBE4B8DCFD}"/>
+            </a:ext>
+          </a:extLst>
+        </p:cNvPr>
+        <p:cNvGrpSpPr/>
+        <p:nvPr/>
+      </p:nvGrpSpPr>
+      <p:grpSpPr>
+        <a:xfrm>
+          <a:off x="0" y="0"/>
+          <a:ext cx="0" cy="0"/>
+          <a:chOff x="0" y="0"/>
+          <a:chExt cx="0" cy="0"/>
+        </a:xfrm>
+      </p:grpSpPr>
+      <p:sp>
+        <p:nvSpPr>
+          <p:cNvPr id="1048856" name="燕尾形 9">
+            <a:extLst>
+              <a:ext uri="{FF2B5EF4-FFF2-40B4-BE49-F238E27FC236}">
+                <a16:creationId xmlns:a16="http://schemas.microsoft.com/office/drawing/2014/main" id="{8D390BBA-B652-3C0B-375B-658863095F5F}"/>
+              </a:ext>
+            </a:extLst>
+          </p:cNvPr>
+          <p:cNvSpPr/>
+          <p:nvPr/>
+        </p:nvSpPr>
+        <p:spPr>
+          <a:xfrm>
+            <a:off x="849630" y="494030"/>
+            <a:ext cx="812800" cy="340360"/>
+          </a:xfrm>
+          <a:prstGeom prst="chevron">
+            <a:avLst/>
+          </a:prstGeom>
+          <a:solidFill>
+            <a:schemeClr val="tx2">
+              <a:lumMod val="40000"/>
+              <a:lumOff val="60000"/>
+            </a:schemeClr>
+          </a:solidFill>
+          <a:ln>
+            <a:noFill/>
+          </a:ln>
+        </p:spPr>
+        <p:style>
+          <a:lnRef idx="2">
+            <a:schemeClr val="accent1">
+              <a:shade val="50000"/>
+            </a:schemeClr>
+          </a:lnRef>
+          <a:fillRef idx="1">
+            <a:schemeClr val="accent1"/>
+          </a:fillRef>
+          <a:effectRef idx="0">
+            <a:schemeClr val="accent1"/>
+          </a:effectRef>
+          <a:fontRef idx="minor">
+            <a:schemeClr val="lt1"/>
+          </a:fontRef>
+        </p:style>
+        <p:txBody>
+          <a:bodyPr rtlCol="0" anchor="ctr"/>
+          <a:lstStyle/>
+          <a:p>
+            <a:pPr algn="ctr"/>
+            <a:endParaRPr lang="zh-CN" altLang="en-US"/>
+          </a:p>
+        </p:txBody>
+      </p:sp>
+      <p:sp>
+        <p:nvSpPr>
+          <p:cNvPr id="1048857" name="文本框 39">
+            <a:extLst>
+              <a:ext uri="{FF2B5EF4-FFF2-40B4-BE49-F238E27FC236}">
+                <a16:creationId xmlns:a16="http://schemas.microsoft.com/office/drawing/2014/main" id="{0F29EE2C-E958-1EBC-06F3-BC4368123B5D}"/>
+              </a:ext>
+            </a:extLst>
+          </p:cNvPr>
+          <p:cNvSpPr txBox="1"/>
+          <p:nvPr/>
+        </p:nvSpPr>
+        <p:spPr>
+          <a:xfrm>
+            <a:off x="1783080" y="361950"/>
+            <a:ext cx="5379720" cy="584775"/>
+          </a:xfrm>
+          <a:prstGeom prst="rect">
+            <a:avLst/>
+          </a:prstGeom>
+          <a:noFill/>
+          <a:ln w="9525">
+            <a:noFill/>
+          </a:ln>
+        </p:spPr>
+        <p:txBody>
+          <a:bodyPr wrap="square" anchor="t">
+            <a:spAutoFit/>
+          </a:bodyPr>
+          <a:lstStyle/>
+          <a:p>
+            <a:r>
+              <a:rPr lang="zh-CN" altLang="en-US" sz="3200" b="0" dirty="0">
+                <a:solidFill>
+                  <a:srgbClr val="000000"/>
+                </a:solidFill>
+                <a:effectLst/>
+                <a:highlight>
+                  <a:srgbClr val="FFFFFF"/>
+                </a:highlight>
+                <a:latin typeface="Consolas" panose="020B0609020204030204" pitchFamily="49" charset="0"/>
+              </a:rPr>
+              <a:t>现存问题与解决方案</a:t>
+            </a:r>
+          </a:p>
+        </p:txBody>
+      </p:sp>
+      <p:sp>
+        <p:nvSpPr>
+          <p:cNvPr id="1048858" name="矩形 16">
+            <a:extLst>
+              <a:ext uri="{FF2B5EF4-FFF2-40B4-BE49-F238E27FC236}">
+                <a16:creationId xmlns:a16="http://schemas.microsoft.com/office/drawing/2014/main" id="{50B68FEA-4DD6-81EB-9693-DDB769063201}"/>
+              </a:ext>
+            </a:extLst>
+          </p:cNvPr>
+          <p:cNvSpPr/>
+          <p:nvPr/>
+        </p:nvSpPr>
+        <p:spPr>
+          <a:xfrm>
+            <a:off x="664431" y="1218648"/>
+            <a:ext cx="10689369" cy="1938992"/>
+          </a:xfrm>
+          <a:prstGeom prst="rect">
+            <a:avLst/>
+          </a:prstGeom>
+          <a:noFill/>
+          <a:ln w="9525">
+            <a:noFill/>
+          </a:ln>
+        </p:spPr>
+        <p:txBody>
+          <a:bodyPr wrap="square" anchor="t">
+            <a:spAutoFit/>
+          </a:bodyPr>
+          <a:lstStyle/>
+          <a:p>
+            <a:r>
+              <a:rPr lang="en-US" altLang="zh-CN" sz="2000" dirty="0">
+                <a:solidFill>
+                  <a:srgbClr val="000000"/>
+                </a:solidFill>
+                <a:latin typeface="Consolas" panose="020B0609020204030204" pitchFamily="49" charset="0"/>
+                <a:sym typeface="SimSun-ExtB" panose="02010609060101010101" pitchFamily="49" charset="-122"/>
+              </a:rPr>
+              <a:t>1.</a:t>
+            </a:r>
+            <a:r>
+              <a:rPr lang="zh-CN" altLang="en-US" sz="2000" dirty="0">
+                <a:solidFill>
+                  <a:srgbClr val="000000"/>
+                </a:solidFill>
+                <a:latin typeface="Consolas" panose="020B0609020204030204" pitchFamily="49" charset="0"/>
+                <a:sym typeface="SimSun-ExtB" panose="02010609060101010101" pitchFamily="49" charset="-122"/>
+              </a:rPr>
+              <a:t>工作主要集中在</a:t>
+            </a:r>
+            <a:r>
+              <a:rPr lang="en-US" altLang="zh-CN" sz="2000" dirty="0">
+                <a:solidFill>
+                  <a:srgbClr val="000000"/>
+                </a:solidFill>
+                <a:latin typeface="Consolas" panose="020B0609020204030204" pitchFamily="49" charset="0"/>
+                <a:sym typeface="SimSun-ExtB" panose="02010609060101010101" pitchFamily="49" charset="-122"/>
+              </a:rPr>
+              <a:t>seL4</a:t>
+            </a:r>
+            <a:r>
+              <a:rPr lang="zh-CN" altLang="en-US" sz="2000" dirty="0">
+                <a:solidFill>
+                  <a:srgbClr val="000000"/>
+                </a:solidFill>
+                <a:latin typeface="Consolas" panose="020B0609020204030204" pitchFamily="49" charset="0"/>
+                <a:sym typeface="SimSun-ExtB" panose="02010609060101010101" pitchFamily="49" charset="-122"/>
+              </a:rPr>
+              <a:t>知识补充和</a:t>
+            </a:r>
+            <a:r>
+              <a:rPr lang="en-US" altLang="zh-CN" sz="2000" dirty="0">
+                <a:solidFill>
+                  <a:srgbClr val="000000"/>
+                </a:solidFill>
+                <a:latin typeface="Consolas" panose="020B0609020204030204" pitchFamily="49" charset="0"/>
+                <a:sym typeface="SimSun-ExtB" panose="02010609060101010101" pitchFamily="49" charset="-122"/>
+              </a:rPr>
+              <a:t>reL4</a:t>
+            </a:r>
+            <a:r>
+              <a:rPr lang="zh-CN" altLang="en-US" sz="2000" dirty="0">
+                <a:solidFill>
+                  <a:srgbClr val="000000"/>
+                </a:solidFill>
+                <a:latin typeface="Consolas" panose="020B0609020204030204" pitchFamily="49" charset="0"/>
+                <a:sym typeface="SimSun-ExtB" panose="02010609060101010101" pitchFamily="49" charset="-122"/>
+              </a:rPr>
+              <a:t>代码框架阅读方面，代码编写较少。</a:t>
+            </a:r>
+            <a:endParaRPr lang="en-US" altLang="zh-CN" sz="2000" dirty="0">
+              <a:solidFill>
+                <a:srgbClr val="000000"/>
+              </a:solidFill>
+              <a:latin typeface="Consolas" panose="020B0609020204030204" pitchFamily="49" charset="0"/>
+              <a:sym typeface="SimSun-ExtB" panose="02010609060101010101" pitchFamily="49" charset="-122"/>
+            </a:endParaRPr>
+          </a:p>
+          <a:p>
+            <a:r>
+              <a:rPr lang="zh-CN" altLang="en-US" sz="2000" dirty="0">
+                <a:solidFill>
+                  <a:srgbClr val="000000"/>
+                </a:solidFill>
+                <a:latin typeface="Consolas" panose="020B0609020204030204" pitchFamily="49" charset="0"/>
+                <a:ea typeface="微软雅黑 Light" panose="020B0502040204020203" pitchFamily="34" charset="-122"/>
+                <a:sym typeface="SimSun-ExtB" panose="02010609060101010101" pitchFamily="49" charset="-122"/>
+              </a:rPr>
+              <a:t>解决方案：着手开始</a:t>
+            </a:r>
+            <a:r>
+              <a:rPr lang="en-US" altLang="zh-CN" sz="2000" dirty="0">
+                <a:solidFill>
+                  <a:srgbClr val="000000"/>
+                </a:solidFill>
+                <a:latin typeface="Consolas" panose="020B0609020204030204" pitchFamily="49" charset="0"/>
+                <a:ea typeface="微软雅黑 Light" panose="020B0502040204020203" pitchFamily="34" charset="-122"/>
+                <a:sym typeface="SimSun-ExtB" panose="02010609060101010101" pitchFamily="49" charset="-122"/>
+              </a:rPr>
+              <a:t>reL4</a:t>
+            </a:r>
+            <a:r>
+              <a:rPr lang="zh-CN" altLang="en-US" sz="2000" dirty="0">
+                <a:solidFill>
+                  <a:srgbClr val="000000"/>
+                </a:solidFill>
+                <a:latin typeface="Consolas" panose="020B0609020204030204" pitchFamily="49" charset="0"/>
+                <a:ea typeface="微软雅黑 Light" panose="020B0502040204020203" pitchFamily="34" charset="-122"/>
+                <a:sym typeface="SimSun-ExtB" panose="02010609060101010101" pitchFamily="49" charset="-122"/>
+              </a:rPr>
+              <a:t>异步系统调用开发工作。</a:t>
+            </a:r>
+            <a:endParaRPr lang="en-US" altLang="zh-CN" sz="2000" dirty="0">
+              <a:solidFill>
+                <a:srgbClr val="000000"/>
+              </a:solidFill>
+              <a:latin typeface="Consolas" panose="020B0609020204030204" pitchFamily="49" charset="0"/>
+              <a:ea typeface="微软雅黑 Light" panose="020B0502040204020203" pitchFamily="34" charset="-122"/>
+              <a:sym typeface="SimSun-ExtB" panose="02010609060101010101" pitchFamily="49" charset="-122"/>
+            </a:endParaRPr>
+          </a:p>
+          <a:p>
+            <a:endParaRPr lang="en-US" altLang="zh-CN" sz="2000" dirty="0">
+              <a:solidFill>
+                <a:srgbClr val="000000"/>
+              </a:solidFill>
+              <a:latin typeface="Consolas" panose="020B0609020204030204" pitchFamily="49" charset="0"/>
+              <a:ea typeface="微软雅黑 Light" panose="020B0502040204020203" pitchFamily="34" charset="-122"/>
+              <a:sym typeface="SimSun-ExtB" panose="02010609060101010101" pitchFamily="49" charset="-122"/>
+            </a:endParaRPr>
+          </a:p>
+          <a:p>
+            <a:r>
+              <a:rPr lang="en-US" altLang="zh-CN" sz="2000" dirty="0">
+                <a:solidFill>
+                  <a:srgbClr val="000000"/>
+                </a:solidFill>
+                <a:latin typeface="Consolas" panose="020B0609020204030204" pitchFamily="49" charset="0"/>
+                <a:ea typeface="微软雅黑 Light" panose="020B0502040204020203" pitchFamily="34" charset="-122"/>
+                <a:sym typeface="SimSun-ExtB" panose="02010609060101010101" pitchFamily="49" charset="-122"/>
+              </a:rPr>
+              <a:t>2.</a:t>
+            </a:r>
+            <a:r>
+              <a:rPr lang="zh-CN" altLang="en-US" sz="2000" dirty="0">
+                <a:solidFill>
+                  <a:srgbClr val="000000"/>
+                </a:solidFill>
+                <a:latin typeface="Consolas" panose="020B0609020204030204" pitchFamily="49" charset="0"/>
+                <a:ea typeface="微软雅黑 Light" panose="020B0502040204020203" pitchFamily="34" charset="-122"/>
+                <a:sym typeface="SimSun-ExtB" panose="02010609060101010101" pitchFamily="49" charset="-122"/>
+              </a:rPr>
+              <a:t>对于</a:t>
+            </a:r>
+            <a:r>
+              <a:rPr lang="en-US" altLang="zh-CN" sz="2000" dirty="0">
+                <a:solidFill>
+                  <a:srgbClr val="000000"/>
+                </a:solidFill>
+                <a:latin typeface="Consolas" panose="020B0609020204030204" pitchFamily="49" charset="0"/>
+                <a:ea typeface="微软雅黑 Light" panose="020B0502040204020203" pitchFamily="34" charset="-122"/>
+                <a:sym typeface="SimSun-ExtB" panose="02010609060101010101" pitchFamily="49" charset="-122"/>
+              </a:rPr>
+              <a:t>reL4</a:t>
+            </a:r>
+            <a:r>
+              <a:rPr lang="zh-CN" altLang="en-US" sz="2000" dirty="0">
+                <a:solidFill>
+                  <a:srgbClr val="000000"/>
+                </a:solidFill>
+                <a:latin typeface="Consolas" panose="020B0609020204030204" pitchFamily="49" charset="0"/>
+                <a:ea typeface="微软雅黑 Light" panose="020B0502040204020203" pitchFamily="34" charset="-122"/>
+                <a:sym typeface="SimSun-ExtB" panose="02010609060101010101" pitchFamily="49" charset="-122"/>
+              </a:rPr>
+              <a:t>的运行框架仅局限于</a:t>
+            </a:r>
+            <a:r>
+              <a:rPr lang="en-US" altLang="zh-CN" sz="2000" dirty="0">
+                <a:solidFill>
+                  <a:srgbClr val="000000"/>
+                </a:solidFill>
+                <a:latin typeface="Consolas" panose="020B0609020204030204" pitchFamily="49" charset="0"/>
+                <a:ea typeface="微软雅黑 Light" panose="020B0502040204020203" pitchFamily="34" charset="-122"/>
+                <a:sym typeface="SimSun-ExtB" panose="02010609060101010101" pitchFamily="49" charset="-122"/>
+              </a:rPr>
+              <a:t>IPC</a:t>
+            </a:r>
+            <a:r>
+              <a:rPr lang="zh-CN" altLang="en-US" sz="2000" dirty="0">
+                <a:solidFill>
+                  <a:srgbClr val="000000"/>
+                </a:solidFill>
+                <a:latin typeface="Consolas" panose="020B0609020204030204" pitchFamily="49" charset="0"/>
+                <a:ea typeface="微软雅黑 Light" panose="020B0502040204020203" pitchFamily="34" charset="-122"/>
+                <a:sym typeface="SimSun-ExtB" panose="02010609060101010101" pitchFamily="49" charset="-122"/>
+              </a:rPr>
+              <a:t>代码路径部分，其余部分代码的联系理解缺失</a:t>
+            </a:r>
+            <a:endParaRPr lang="en-US" altLang="zh-CN" sz="2000" dirty="0">
+              <a:solidFill>
+                <a:srgbClr val="000000"/>
+              </a:solidFill>
+              <a:latin typeface="Consolas" panose="020B0609020204030204" pitchFamily="49" charset="0"/>
+              <a:ea typeface="微软雅黑 Light" panose="020B0502040204020203" pitchFamily="34" charset="-122"/>
+              <a:sym typeface="SimSun-ExtB" panose="02010609060101010101" pitchFamily="49" charset="-122"/>
+            </a:endParaRPr>
+          </a:p>
+          <a:p>
+            <a:r>
+              <a:rPr lang="zh-CN" altLang="en-US" sz="2000" dirty="0">
+                <a:solidFill>
+                  <a:srgbClr val="000000"/>
+                </a:solidFill>
+                <a:latin typeface="Consolas" panose="020B0609020204030204" pitchFamily="49" charset="0"/>
+                <a:ea typeface="微软雅黑 Light" panose="020B0502040204020203" pitchFamily="34" charset="-122"/>
+                <a:sym typeface="SimSun-ExtB" panose="02010609060101010101" pitchFamily="49" charset="-122"/>
+              </a:rPr>
+              <a:t>解决方案：需要尝试理顺</a:t>
+            </a:r>
+            <a:r>
+              <a:rPr lang="en-US" altLang="zh-CN" sz="2000" dirty="0">
+                <a:solidFill>
+                  <a:srgbClr val="000000"/>
+                </a:solidFill>
+                <a:latin typeface="Consolas" panose="020B0609020204030204" pitchFamily="49" charset="0"/>
+                <a:ea typeface="微软雅黑 Light" panose="020B0502040204020203" pitchFamily="34" charset="-122"/>
+                <a:sym typeface="SimSun-ExtB" panose="02010609060101010101" pitchFamily="49" charset="-122"/>
+              </a:rPr>
+              <a:t>reL4</a:t>
+            </a:r>
+            <a:r>
+              <a:rPr lang="zh-CN" altLang="en-US" sz="2000" dirty="0">
+                <a:solidFill>
+                  <a:srgbClr val="000000"/>
+                </a:solidFill>
+                <a:latin typeface="Consolas" panose="020B0609020204030204" pitchFamily="49" charset="0"/>
+                <a:ea typeface="微软雅黑 Light" panose="020B0502040204020203" pitchFamily="34" charset="-122"/>
+                <a:sym typeface="SimSun-ExtB" panose="02010609060101010101" pitchFamily="49" charset="-122"/>
+              </a:rPr>
+              <a:t>代码框架。</a:t>
+            </a:r>
+            <a:endParaRPr lang="zh-CN" altLang="en-US" sz="2000" dirty="0">
+              <a:solidFill>
+                <a:srgbClr val="2D3E50"/>
+              </a:solidFill>
+              <a:latin typeface="SimSun-ExtB" panose="02010609060101010101" pitchFamily="49" charset="-122"/>
+              <a:ea typeface="微软雅黑 Light" panose="020B0502040204020203" pitchFamily="34" charset="-122"/>
+              <a:sym typeface="SimSun-ExtB" panose="02010609060101010101" pitchFamily="49" charset="-122"/>
+            </a:endParaRPr>
+          </a:p>
+          <a:p>
+            <a:endParaRPr lang="zh-CN" altLang="en-US" sz="2000" dirty="0">
+              <a:solidFill>
+                <a:srgbClr val="2D3E50"/>
+              </a:solidFill>
+              <a:latin typeface="SimSun-ExtB" panose="02010609060101010101" pitchFamily="49" charset="-122"/>
+              <a:ea typeface="微软雅黑 Light" panose="020B0502040204020203" pitchFamily="34" charset="-122"/>
+              <a:sym typeface="SimSun-ExtB" panose="02010609060101010101" pitchFamily="49" charset="-122"/>
+            </a:endParaRPr>
+          </a:p>
+        </p:txBody>
+      </p:sp>
+      <p:pic>
+        <p:nvPicPr>
+          <p:cNvPr id="2097192" name="图片 3" descr="理工灰">
+            <a:extLst>
+              <a:ext uri="{FF2B5EF4-FFF2-40B4-BE49-F238E27FC236}">
+                <a16:creationId xmlns:a16="http://schemas.microsoft.com/office/drawing/2014/main" id="{4E12E03C-27C6-7B08-AD5D-91308F2E9793}"/>
+              </a:ext>
+            </a:extLst>
+          </p:cNvPr>
+          <p:cNvPicPr>
+            <a:picLocks noChangeAspect="1"/>
+          </p:cNvPicPr>
+          <p:nvPr/>
+        </p:nvPicPr>
+        <p:blipFill>
+          <a:blip r:embed="rId3" cstate="print"/>
+          <a:stretch>
+            <a:fillRect/>
+          </a:stretch>
+        </p:blipFill>
+        <p:spPr>
+          <a:xfrm>
+            <a:off x="11017250" y="279400"/>
+            <a:ext cx="873125" cy="752475"/>
+          </a:xfrm>
+          <a:prstGeom prst="rect">
+            <a:avLst/>
+          </a:prstGeom>
+          <a:noFill/>
+          <a:ln w="9525">
+            <a:noFill/>
+          </a:ln>
+        </p:spPr>
+      </p:pic>
+      <p:sp>
+        <p:nvSpPr>
+          <p:cNvPr id="2" name="灯片编号占位符 1">
+            <a:extLst>
+              <a:ext uri="{FF2B5EF4-FFF2-40B4-BE49-F238E27FC236}">
+                <a16:creationId xmlns:a16="http://schemas.microsoft.com/office/drawing/2014/main" id="{6069CFEF-DCB2-EE8E-9109-DA0AEF336CD3}"/>
+              </a:ext>
+            </a:extLst>
+          </p:cNvPr>
+          <p:cNvSpPr>
+            <a:spLocks noGrp="1"/>
+          </p:cNvSpPr>
+          <p:nvPr>
+            <p:ph type="sldNum" sz="quarter" idx="12"/>
+          </p:nvPr>
+        </p:nvSpPr>
+        <p:spPr/>
+        <p:txBody>
+          <a:bodyPr/>
+          <a:lstStyle/>
+          <a:p>
+            <a:pPr fontAlgn="auto"/>
+            <a:fld id="{CA2E1F5A-C151-4DEE-93E4-F5F32EEAF57D}" type="slidenum">
+              <a:rPr lang="zh-CN" altLang="en-US" strike="noStrike" noProof="1" smtClean="0">
+                <a:latin typeface="+mn-lt"/>
+                <a:ea typeface="+mn-ea"/>
+                <a:cs typeface="+mn-cs"/>
+              </a:rPr>
+              <a:pPr fontAlgn="auto"/>
+              <a:t>12</a:t>
+            </a:fld>
+            <a:endParaRPr lang="zh-CN" altLang="en-US" strike="noStrike" noProof="1"/>
+          </a:p>
+        </p:txBody>
+      </p:sp>
     </p:spTree>
     <p:extLst>
       <p:ext uri="{BB962C8B-B14F-4D97-AF65-F5344CB8AC3E}">
@@ -4624,7 +5310,7 @@
 </p:sld>
 </file>
 
-<file path=ppt/slides/slide11.xml><?xml version="1.0" encoding="utf-8"?>
+<file path=ppt/slides/slide13.xml><?xml version="1.0" encoding="utf-8"?>
 <p:sld xmlns:a="http://schemas.openxmlformats.org/drawingml/2006/main" xmlns:r="http://schemas.openxmlformats.org/officeDocument/2006/relationships" xmlns:p="http://schemas.openxmlformats.org/presentationml/2006/main" showMasterSp="0">
   <p:cSld>
     <p:bg>
@@ -4773,7 +5459,7 @@
                   <a:ea typeface="微软雅黑 Light" panose="020B0502040204020203" pitchFamily="34" charset="-122"/>
                   <a:sym typeface="SimSun-ExtB" panose="02010609060101010101" pitchFamily="49" charset="-122"/>
                 </a:rPr>
-                <a:t>PART 03</a:t>
+                <a:t>PART 04</a:t>
               </a:r>
             </a:p>
           </p:txBody>
@@ -4876,7 +5562,7 @@
                 <a:cs typeface="+mn-cs"/>
               </a:rPr>
               <a:pPr fontAlgn="auto"/>
-              <a:t>11</a:t>
+              <a:t>13</a:t>
             </a:fld>
             <a:endParaRPr lang="zh-CN" altLang="en-US" strike="noStrike" noProof="1"/>
           </a:p>
@@ -4898,7 +5584,7 @@
 </p:sld>
 </file>
 
-<file path=ppt/slides/slide12.xml><?xml version="1.0" encoding="utf-8"?>
+<file path=ppt/slides/slide14.xml><?xml version="1.0" encoding="utf-8"?>
 <p:sld xmlns:a="http://schemas.openxmlformats.org/drawingml/2006/main" xmlns:r="http://schemas.openxmlformats.org/officeDocument/2006/relationships" xmlns:p="http://schemas.openxmlformats.org/presentationml/2006/main" showMasterSp="0">
   <p:cSld>
     <p:bg>
@@ -5060,7 +5746,7 @@
         <p:spPr>
           <a:xfrm>
             <a:off x="664431" y="1218647"/>
-            <a:ext cx="11225944" cy="2246769"/>
+            <a:ext cx="11225944" cy="2862322"/>
           </a:xfrm>
           <a:prstGeom prst="rect">
             <a:avLst/>
@@ -5155,7 +5841,7 @@
                 <a:latin typeface="Consolas" panose="020B0609020204030204" pitchFamily="49" charset="0"/>
                 <a:sym typeface="SimSun-ExtB" panose="02010609060101010101" pitchFamily="49" charset="-122"/>
               </a:rPr>
-              <a:t>15</a:t>
+              <a:t>13</a:t>
             </a:r>
             <a:r>
               <a:rPr lang="zh-CN" altLang="en-US" sz="2000" dirty="0">
@@ -5256,7 +5942,7 @@
                 <a:latin typeface="Consolas" panose="020B0609020204030204" pitchFamily="49" charset="0"/>
                 <a:sym typeface="SimSun-ExtB" panose="02010609060101010101" pitchFamily="49" charset="-122"/>
               </a:rPr>
-              <a:t>月前完成</a:t>
+              <a:t>月</a:t>
             </a:r>
             <a:r>
               <a:rPr lang="en-US" altLang="zh-CN" sz="2000" dirty="0">
@@ -5266,6 +5952,26 @@
                 <a:latin typeface="Consolas" panose="020B0609020204030204" pitchFamily="49" charset="0"/>
                 <a:sym typeface="SimSun-ExtB" panose="02010609060101010101" pitchFamily="49" charset="-122"/>
               </a:rPr>
+              <a:t>5</a:t>
+            </a:r>
+            <a:r>
+              <a:rPr lang="zh-CN" altLang="en-US" sz="2000" dirty="0">
+                <a:solidFill>
+                  <a:srgbClr val="000000"/>
+                </a:solidFill>
+                <a:latin typeface="Consolas" panose="020B0609020204030204" pitchFamily="49" charset="0"/>
+                <a:sym typeface="SimSun-ExtB" panose="02010609060101010101" pitchFamily="49" charset="-122"/>
+              </a:rPr>
+              <a:t>日前完成</a:t>
+            </a:r>
+            <a:r>
+              <a:rPr lang="en-US" altLang="zh-CN" sz="2000" dirty="0">
+                <a:solidFill>
+                  <a:srgbClr val="000000"/>
+                </a:solidFill>
+                <a:latin typeface="Consolas" panose="020B0609020204030204" pitchFamily="49" charset="0"/>
+                <a:sym typeface="SimSun-ExtB" panose="02010609060101010101" pitchFamily="49" charset="-122"/>
+              </a:rPr>
               <a:t>rel4</a:t>
             </a:r>
             <a:r>
@@ -5276,10 +5982,8 @@
                 <a:latin typeface="Consolas" panose="020B0609020204030204" pitchFamily="49" charset="0"/>
                 <a:sym typeface="SimSun-ExtB" panose="02010609060101010101" pitchFamily="49" charset="-122"/>
               </a:rPr>
-              <a:t>异步系统调用实现</a:t>
-            </a:r>
-          </a:p>
-          <a:p>
+              <a:t>异步系统调用实现（与廖东海学长沟通）并着手安排论文撰写</a:t>
+            </a:r>
             <a:endParaRPr lang="en-US" altLang="zh-CN" sz="2000" dirty="0">
               <a:solidFill>
                 <a:srgbClr val="000000"/>
@@ -5289,6 +5993,15 @@
             </a:endParaRPr>
           </a:p>
           <a:p>
+            <a:endParaRPr lang="en-US" altLang="zh-CN" sz="2000" dirty="0">
+              <a:solidFill>
+                <a:srgbClr val="000000"/>
+              </a:solidFill>
+              <a:latin typeface="Consolas" panose="020B0609020204030204" pitchFamily="49" charset="0"/>
+              <a:sym typeface="SimSun-ExtB" panose="02010609060101010101" pitchFamily="49" charset="-122"/>
+            </a:endParaRPr>
+          </a:p>
+          <a:p>
             <a:r>
               <a:rPr lang="en-US" altLang="zh-CN" sz="2000" dirty="0">
                 <a:solidFill>
@@ -5298,6 +6011,57 @@
                 <a:sym typeface="SimSun-ExtB" panose="02010609060101010101" pitchFamily="49" charset="-122"/>
               </a:rPr>
               <a:t>4.</a:t>
+            </a:r>
+            <a:r>
+              <a:rPr lang="zh-CN" altLang="en-US" sz="2000" dirty="0">
+                <a:solidFill>
+                  <a:srgbClr val="000000"/>
+                </a:solidFill>
+                <a:latin typeface="Consolas" panose="020B0609020204030204" pitchFamily="49" charset="0"/>
+                <a:sym typeface="SimSun-ExtB" panose="02010609060101010101" pitchFamily="49" charset="-122"/>
+              </a:rPr>
+              <a:t>预计</a:t>
+            </a:r>
+            <a:r>
+              <a:rPr lang="en-US" altLang="zh-CN" sz="2000" dirty="0">
+                <a:solidFill>
+                  <a:srgbClr val="000000"/>
+                </a:solidFill>
+                <a:latin typeface="Consolas" panose="020B0609020204030204" pitchFamily="49" charset="0"/>
+                <a:sym typeface="SimSun-ExtB" panose="02010609060101010101" pitchFamily="49" charset="-122"/>
+              </a:rPr>
+              <a:t>5</a:t>
+            </a:r>
+            <a:r>
+              <a:rPr lang="zh-CN" altLang="en-US" sz="2000" dirty="0">
+                <a:solidFill>
+                  <a:srgbClr val="000000"/>
+                </a:solidFill>
+                <a:latin typeface="Consolas" panose="020B0609020204030204" pitchFamily="49" charset="0"/>
+                <a:sym typeface="SimSun-ExtB" panose="02010609060101010101" pitchFamily="49" charset="-122"/>
+              </a:rPr>
+              <a:t>月中旬完成性能测试</a:t>
+            </a:r>
+          </a:p>
+          <a:p>
+            <a:endParaRPr lang="en-US" altLang="zh-CN" sz="2000" dirty="0">
+              <a:solidFill>
+                <a:srgbClr val="000000"/>
+              </a:solidFill>
+              <a:latin typeface="Consolas" panose="020B0609020204030204" pitchFamily="49" charset="0"/>
+              <a:sym typeface="SimSun-ExtB" panose="02010609060101010101" pitchFamily="49" charset="-122"/>
+            </a:endParaRPr>
+          </a:p>
+          <a:p>
+            <a:r>
+              <a:rPr lang="en-US" altLang="zh-CN" sz="2000" dirty="0">
+                <a:solidFill>
+                  <a:srgbClr val="000000"/>
+                </a:solidFill>
+                <a:latin typeface="Consolas" panose="020B0609020204030204" pitchFamily="49" charset="0"/>
+                <a:sym typeface="SimSun-ExtB" panose="02010609060101010101" pitchFamily="49" charset="-122"/>
+              </a:rPr>
+              <a:t>5.</a:t>
             </a:r>
             <a:r>
               <a:rPr lang="zh-CN" altLang="en-US" sz="2000" dirty="0">
@@ -5395,7 +6159,7 @@
                 <a:cs typeface="+mn-cs"/>
               </a:rPr>
               <a:pPr fontAlgn="auto"/>
-              <a:t>12</a:t>
+              <a:t>14</a:t>
             </a:fld>
             <a:endParaRPr lang="zh-CN" altLang="en-US" strike="noStrike" noProof="1"/>
           </a:p>
@@ -5417,7 +6181,7 @@
 </p:sld>
 </file>
 
-<file path=ppt/slides/slide13.xml><?xml version="1.0" encoding="utf-8"?>
+<file path=ppt/slides/slide15.xml><?xml version="1.0" encoding="utf-8"?>
 <p:sld xmlns:a="http://schemas.openxmlformats.org/drawingml/2006/main" xmlns:r="http://schemas.openxmlformats.org/officeDocument/2006/relationships" xmlns:p="http://schemas.openxmlformats.org/presentationml/2006/main" showMasterSp="0">
   <p:cSld>
     <p:bg>
@@ -5642,7 +6406,7 @@
                 <a:cs typeface="+mn-cs"/>
               </a:rPr>
               <a:pPr fontAlgn="auto"/>
-              <a:t>13</a:t>
+              <a:t>15</a:t>
             </a:fld>
             <a:endParaRPr lang="zh-CN" altLang="en-US" strike="noStrike" noProof="1"/>
           </a:p>
@@ -6031,7 +6795,7 @@
                 <a:ea typeface="黑体" pitchFamily="49" charset="-122"/>
                 <a:sym typeface="SimSun-ExtB" panose="02010609060101010101" pitchFamily="49" charset="-122"/>
               </a:rPr>
-              <a:t>现有进展</a:t>
+              <a:t>毕设内容</a:t>
             </a:r>
           </a:p>
         </p:txBody>
@@ -6121,7 +6885,7 @@
                   <a:ea typeface="黑体" pitchFamily="49" charset="-122"/>
                   <a:sym typeface="SimSun-ExtB" panose="02010609060101010101" pitchFamily="49" charset="-122"/>
                 </a:rPr>
-                <a:t>现存问题</a:t>
+                <a:t>现有进展</a:t>
               </a:r>
             </a:p>
           </p:txBody>
@@ -6224,6 +6988,99 @@
         </p:nvSpPr>
         <p:spPr>
           <a:xfrm>
+            <a:off x="3197518" y="5162405"/>
+            <a:ext cx="3620106" cy="461985"/>
+          </a:xfrm>
+          <a:prstGeom prst="rect">
+            <a:avLst/>
+          </a:prstGeom>
+          <a:noFill/>
+          <a:ln w="9525">
+            <a:noFill/>
+          </a:ln>
+        </p:spPr>
+        <p:txBody>
+          <a:bodyPr wrap="square" anchor="t">
+            <a:spAutoFit/>
+          </a:bodyPr>
+          <a:lstStyle/>
+          <a:p>
+            <a:r>
+              <a:rPr lang="zh-CN" altLang="en-US" sz="2400" b="1" dirty="0">
+                <a:solidFill>
+                  <a:srgbClr val="2D3E50"/>
+                </a:solidFill>
+                <a:latin typeface="黑体" pitchFamily="49" charset="-122"/>
+                <a:ea typeface="黑体" pitchFamily="49" charset="-122"/>
+                <a:sym typeface="SimSun-ExtB" panose="02010609060101010101" pitchFamily="49" charset="-122"/>
+              </a:rPr>
+              <a:t>进度安排</a:t>
+            </a:r>
+          </a:p>
+        </p:txBody>
+      </p:sp>
+      <p:sp>
+        <p:nvSpPr>
+          <p:cNvPr id="3" name="文本框 40">
+            <a:extLst>
+              <a:ext uri="{FF2B5EF4-FFF2-40B4-BE49-F238E27FC236}">
+                <a16:creationId xmlns:a16="http://schemas.microsoft.com/office/drawing/2014/main" id="{D0AB4C6C-F5A4-9AA2-EE60-2CBBCBDD7405}"/>
+              </a:ext>
+            </a:extLst>
+          </p:cNvPr>
+          <p:cNvSpPr txBox="1"/>
+          <p:nvPr/>
+        </p:nvSpPr>
+        <p:spPr>
+          <a:xfrm>
+            <a:off x="1975803" y="5039068"/>
+            <a:ext cx="1003300" cy="708660"/>
+          </a:xfrm>
+          <a:prstGeom prst="rect">
+            <a:avLst/>
+          </a:prstGeom>
+          <a:noFill/>
+          <a:ln w="9525">
+            <a:noFill/>
+          </a:ln>
+        </p:spPr>
+        <p:txBody>
+          <a:bodyPr wrap="square" anchor="t">
+            <a:spAutoFit/>
+          </a:bodyPr>
+          <a:lstStyle/>
+          <a:p>
+            <a:pPr algn="ctr"/>
+            <a:r>
+              <a:rPr lang="en-US" altLang="zh-CN" sz="4000" b="1" dirty="0">
+                <a:solidFill>
+                  <a:schemeClr val="tx2">
+                    <a:lumMod val="75000"/>
+                  </a:schemeClr>
+                </a:solidFill>
+                <a:latin typeface="SimSun-ExtB" panose="02010609060101010101" pitchFamily="49" charset="-122"/>
+                <a:ea typeface="微软雅黑 Light" panose="020B0502040204020203" pitchFamily="34" charset="-122"/>
+                <a:sym typeface="SimSun-ExtB" panose="02010609060101010101" pitchFamily="49" charset="-122"/>
+              </a:rPr>
+              <a:t>04</a:t>
+            </a:r>
+          </a:p>
+        </p:txBody>
+      </p:sp>
+      <p:sp>
+        <p:nvSpPr>
+          <p:cNvPr id="4" name="文本框 39">
+            <a:extLst>
+              <a:ext uri="{FF2B5EF4-FFF2-40B4-BE49-F238E27FC236}">
+                <a16:creationId xmlns:a16="http://schemas.microsoft.com/office/drawing/2014/main" id="{08A5DE5A-D95F-8AB8-21EB-DBA7169FE10A}"/>
+              </a:ext>
+            </a:extLst>
+          </p:cNvPr>
+          <p:cNvSpPr txBox="1"/>
+          <p:nvPr/>
+        </p:nvSpPr>
+        <p:spPr>
+          <a:xfrm>
             <a:off x="3197518" y="4183528"/>
             <a:ext cx="3620106" cy="461985"/>
           </a:xfrm>
@@ -6250,7 +7107,7 @@
                 <a:ea typeface="黑体" pitchFamily="49" charset="-122"/>
                 <a:sym typeface="SimSun-ExtB" panose="02010609060101010101" pitchFamily="49" charset="-122"/>
               </a:rPr>
-              <a:t>进度安排</a:t>
+              <a:t>现存问题</a:t>
             </a:r>
           </a:p>
         </p:txBody>
@@ -6267,6 +7124,1031 @@
 </file>
 
 <file path=ppt/slides/slide3.xml><?xml version="1.0" encoding="utf-8"?>
+<p:sld xmlns:a="http://schemas.openxmlformats.org/drawingml/2006/main" xmlns:r="http://schemas.openxmlformats.org/officeDocument/2006/relationships" xmlns:p="http://schemas.openxmlformats.org/presentationml/2006/main" showMasterSp="0">
+  <p:cSld>
+    <p:bg>
+      <p:bgPr>
+        <a:blipFill rotWithShape="1">
+          <a:blip r:embed="rId2" cstate="print">
+            <a:alphaModFix amt="74000"/>
+          </a:blip>
+          <a:stretch>
+            <a:fillRect l="-15000" t="-9000" r="-4000" b="-1000"/>
+          </a:stretch>
+        </a:blipFill>
+        <a:effectLst/>
+      </p:bgPr>
+    </p:bg>
+    <p:spTree>
+      <p:nvGrpSpPr>
+        <p:cNvPr id="1" name=""/>
+        <p:cNvGrpSpPr/>
+        <p:nvPr/>
+      </p:nvGrpSpPr>
+      <p:grpSpPr>
+        <a:xfrm>
+          <a:off x="0" y="0"/>
+          <a:ext cx="0" cy="0"/>
+          <a:chOff x="0" y="0"/>
+          <a:chExt cx="0" cy="0"/>
+        </a:xfrm>
+      </p:grpSpPr>
+      <p:grpSp>
+        <p:nvGrpSpPr>
+          <p:cNvPr id="52" name="组合 13"/>
+          <p:cNvGrpSpPr/>
+          <p:nvPr/>
+        </p:nvGrpSpPr>
+        <p:grpSpPr>
+          <a:xfrm>
+            <a:off x="695325" y="2082799"/>
+            <a:ext cx="3830902" cy="1247397"/>
+            <a:chOff x="695324" y="2082338"/>
+            <a:chExt cx="3545903" cy="1247733"/>
+          </a:xfrm>
+        </p:grpSpPr>
+        <p:sp>
+          <p:nvSpPr>
+            <p:cNvPr id="1048620" name="稻壳儿春秋广告/盗版必究        原创来源：http://chn.docer.com/works?userid=199329941#!/work_time"/>
+            <p:cNvSpPr txBox="1"/>
+            <p:nvPr/>
+          </p:nvSpPr>
+          <p:spPr>
+            <a:xfrm flipH="1">
+              <a:off x="695324" y="2806851"/>
+              <a:ext cx="3545903" cy="523220"/>
+            </a:xfrm>
+            <a:prstGeom prst="rect">
+              <a:avLst/>
+            </a:prstGeom>
+            <a:noFill/>
+            <a:ln w="9525">
+              <a:noFill/>
+            </a:ln>
+          </p:spPr>
+          <p:txBody>
+            <a:bodyPr wrap="square" anchor="t">
+              <a:spAutoFit/>
+            </a:bodyPr>
+            <a:lstStyle/>
+            <a:p>
+              <a:r>
+                <a:rPr lang="zh-CN" altLang="en-US" sz="2800" b="1" dirty="0">
+                  <a:solidFill>
+                    <a:srgbClr val="2D3E50"/>
+                  </a:solidFill>
+                  <a:latin typeface="黑体" pitchFamily="49" charset="-122"/>
+                  <a:ea typeface="黑体" pitchFamily="49" charset="-122"/>
+                  <a:sym typeface="SimSun-ExtB" panose="02010609060101010101" pitchFamily="49" charset="-122"/>
+                </a:rPr>
+                <a:t>毕设内容</a:t>
+              </a:r>
+            </a:p>
+          </p:txBody>
+        </p:sp>
+        <p:sp>
+          <p:nvSpPr>
+            <p:cNvPr id="1048621" name="稻壳儿春秋广告/盗版必究        原创来源：http://chn.docer.com/works?userid=199329941#!/work_time"/>
+            <p:cNvSpPr txBox="1"/>
+            <p:nvPr/>
+          </p:nvSpPr>
+          <p:spPr>
+            <a:xfrm flipH="1">
+              <a:off x="695324" y="2082338"/>
+              <a:ext cx="2778958" cy="707886"/>
+            </a:xfrm>
+            <a:prstGeom prst="rect">
+              <a:avLst/>
+            </a:prstGeom>
+            <a:noFill/>
+            <a:ln w="9525">
+              <a:noFill/>
+            </a:ln>
+          </p:spPr>
+          <p:txBody>
+            <a:bodyPr wrap="square" anchor="t">
+              <a:spAutoFit/>
+            </a:bodyPr>
+            <a:lstStyle/>
+            <a:p>
+              <a:r>
+                <a:rPr lang="en-US" altLang="zh-CN" sz="4000" b="1" dirty="0">
+                  <a:gradFill>
+                    <a:gsLst>
+                      <a:gs pos="0">
+                        <a:srgbClr val="012D86"/>
+                      </a:gs>
+                      <a:gs pos="100000">
+                        <a:srgbClr val="0E2557"/>
+                      </a:gs>
+                    </a:gsLst>
+                    <a:lin scaled="0"/>
+                  </a:gradFill>
+                  <a:latin typeface="SimSun-ExtB" panose="02010609060101010101" pitchFamily="49" charset="-122"/>
+                  <a:ea typeface="微软雅黑 Light" panose="020B0502040204020203" pitchFamily="34" charset="-122"/>
+                  <a:sym typeface="SimSun-ExtB" panose="02010609060101010101" pitchFamily="49" charset="-122"/>
+                </a:rPr>
+                <a:t>PART 01</a:t>
+              </a:r>
+            </a:p>
+          </p:txBody>
+        </p:sp>
+      </p:grpSp>
+      <p:pic>
+        <p:nvPicPr>
+          <p:cNvPr id="2097156" name="图片 1" descr="理工灰"/>
+          <p:cNvPicPr>
+            <a:picLocks noChangeAspect="1"/>
+          </p:cNvPicPr>
+          <p:nvPr/>
+        </p:nvPicPr>
+        <p:blipFill>
+          <a:blip r:embed="rId3" cstate="print"/>
+          <a:stretch>
+            <a:fillRect/>
+          </a:stretch>
+        </p:blipFill>
+        <p:spPr>
+          <a:xfrm>
+            <a:off x="11095038" y="5745163"/>
+            <a:ext cx="846137" cy="730250"/>
+          </a:xfrm>
+          <a:prstGeom prst="rect">
+            <a:avLst/>
+          </a:prstGeom>
+          <a:noFill/>
+          <a:ln w="9525">
+            <a:noFill/>
+          </a:ln>
+        </p:spPr>
+      </p:pic>
+      <p:pic>
+        <p:nvPicPr>
+          <p:cNvPr id="2097157" name="图片 3" descr="理工灰"/>
+          <p:cNvPicPr>
+            <a:picLocks noChangeAspect="1"/>
+          </p:cNvPicPr>
+          <p:nvPr/>
+        </p:nvPicPr>
+        <p:blipFill>
+          <a:blip r:embed="rId4" cstate="print"/>
+          <a:stretch>
+            <a:fillRect/>
+          </a:stretch>
+        </p:blipFill>
+        <p:spPr>
+          <a:xfrm>
+            <a:off x="11017250" y="279400"/>
+            <a:ext cx="873125" cy="752475"/>
+          </a:xfrm>
+          <a:prstGeom prst="rect">
+            <a:avLst/>
+          </a:prstGeom>
+          <a:noFill/>
+          <a:ln w="9525">
+            <a:noFill/>
+          </a:ln>
+        </p:spPr>
+      </p:pic>
+      <p:sp>
+        <p:nvSpPr>
+          <p:cNvPr id="2" name="灯片编号占位符 1">
+            <a:extLst>
+              <a:ext uri="{FF2B5EF4-FFF2-40B4-BE49-F238E27FC236}">
+                <a16:creationId xmlns:a16="http://schemas.microsoft.com/office/drawing/2014/main" id="{18DB78D0-E61E-03A8-48C4-A75FE7F51902}"/>
+              </a:ext>
+            </a:extLst>
+          </p:cNvPr>
+          <p:cNvSpPr>
+            <a:spLocks noGrp="1"/>
+          </p:cNvSpPr>
+          <p:nvPr>
+            <p:ph type="sldNum" sz="quarter" idx="12"/>
+          </p:nvPr>
+        </p:nvSpPr>
+        <p:spPr/>
+        <p:txBody>
+          <a:bodyPr/>
+          <a:lstStyle/>
+          <a:p>
+            <a:pPr fontAlgn="auto"/>
+            <a:fld id="{CA2E1F5A-C151-4DEE-93E4-F5F32EEAF57D}" type="slidenum">
+              <a:rPr lang="zh-CN" altLang="en-US" strike="noStrike" noProof="1" smtClean="0">
+                <a:latin typeface="+mn-lt"/>
+                <a:ea typeface="+mn-ea"/>
+                <a:cs typeface="+mn-cs"/>
+              </a:rPr>
+              <a:pPr fontAlgn="auto"/>
+              <a:t>3</a:t>
+            </a:fld>
+            <a:endParaRPr lang="zh-CN" altLang="en-US" strike="noStrike" noProof="1"/>
+          </a:p>
+        </p:txBody>
+      </p:sp>
+    </p:spTree>
+    <p:extLst>
+      <p:ext uri="{BB962C8B-B14F-4D97-AF65-F5344CB8AC3E}">
+        <p14:creationId xmlns:p14="http://schemas.microsoft.com/office/powerpoint/2010/main" val="1019771851"/>
+      </p:ext>
+    </p:extLst>
+  </p:cSld>
+  <p:clrMapOvr>
+    <a:masterClrMapping/>
+  </p:clrMapOvr>
+  <p:transition>
+    <p:wipe/>
+  </p:transition>
+</p:sld>
+</file>
+
+<file path=ppt/slides/slide4.xml><?xml version="1.0" encoding="utf-8"?>
+<p:sld xmlns:a="http://schemas.openxmlformats.org/drawingml/2006/main" xmlns:r="http://schemas.openxmlformats.org/officeDocument/2006/relationships" xmlns:p="http://schemas.openxmlformats.org/presentationml/2006/main" showMasterSp="0">
+  <p:cSld>
+    <p:bg>
+      <p:bgPr>
+        <a:blipFill rotWithShape="1">
+          <a:blip r:embed="rId2" cstate="print">
+            <a:alphaModFix amt="39000"/>
+          </a:blip>
+          <a:stretch>
+            <a:fillRect l="-5000" t="-9000" r="-10000" b="-13000"/>
+          </a:stretch>
+        </a:blipFill>
+        <a:effectLst/>
+      </p:bgPr>
+    </p:bg>
+    <p:spTree>
+      <p:nvGrpSpPr>
+        <p:cNvPr id="1" name="">
+          <a:extLst>
+            <a:ext uri="{FF2B5EF4-FFF2-40B4-BE49-F238E27FC236}">
+              <a16:creationId xmlns:a16="http://schemas.microsoft.com/office/drawing/2014/main" id="{D7B3757C-37F6-3F39-162E-7DFBE4B8DCFD}"/>
+            </a:ext>
+          </a:extLst>
+        </p:cNvPr>
+        <p:cNvGrpSpPr/>
+        <p:nvPr/>
+      </p:nvGrpSpPr>
+      <p:grpSpPr>
+        <a:xfrm>
+          <a:off x="0" y="0"/>
+          <a:ext cx="0" cy="0"/>
+          <a:chOff x="0" y="0"/>
+          <a:chExt cx="0" cy="0"/>
+        </a:xfrm>
+      </p:grpSpPr>
+      <p:sp>
+        <p:nvSpPr>
+          <p:cNvPr id="1048856" name="燕尾形 9">
+            <a:extLst>
+              <a:ext uri="{FF2B5EF4-FFF2-40B4-BE49-F238E27FC236}">
+                <a16:creationId xmlns:a16="http://schemas.microsoft.com/office/drawing/2014/main" id="{8D390BBA-B652-3C0B-375B-658863095F5F}"/>
+              </a:ext>
+            </a:extLst>
+          </p:cNvPr>
+          <p:cNvSpPr/>
+          <p:nvPr/>
+        </p:nvSpPr>
+        <p:spPr>
+          <a:xfrm>
+            <a:off x="849630" y="494030"/>
+            <a:ext cx="812800" cy="340360"/>
+          </a:xfrm>
+          <a:prstGeom prst="chevron">
+            <a:avLst/>
+          </a:prstGeom>
+          <a:solidFill>
+            <a:schemeClr val="tx2">
+              <a:lumMod val="40000"/>
+              <a:lumOff val="60000"/>
+            </a:schemeClr>
+          </a:solidFill>
+          <a:ln>
+            <a:noFill/>
+          </a:ln>
+        </p:spPr>
+        <p:style>
+          <a:lnRef idx="2">
+            <a:schemeClr val="accent1">
+              <a:shade val="50000"/>
+            </a:schemeClr>
+          </a:lnRef>
+          <a:fillRef idx="1">
+            <a:schemeClr val="accent1"/>
+          </a:fillRef>
+          <a:effectRef idx="0">
+            <a:schemeClr val="accent1"/>
+          </a:effectRef>
+          <a:fontRef idx="minor">
+            <a:schemeClr val="lt1"/>
+          </a:fontRef>
+        </p:style>
+        <p:txBody>
+          <a:bodyPr rtlCol="0" anchor="ctr"/>
+          <a:lstStyle/>
+          <a:p>
+            <a:pPr algn="ctr"/>
+            <a:endParaRPr lang="zh-CN" altLang="en-US"/>
+          </a:p>
+        </p:txBody>
+      </p:sp>
+      <p:sp>
+        <p:nvSpPr>
+          <p:cNvPr id="1048857" name="文本框 39">
+            <a:extLst>
+              <a:ext uri="{FF2B5EF4-FFF2-40B4-BE49-F238E27FC236}">
+                <a16:creationId xmlns:a16="http://schemas.microsoft.com/office/drawing/2014/main" id="{0F29EE2C-E958-1EBC-06F3-BC4368123B5D}"/>
+              </a:ext>
+            </a:extLst>
+          </p:cNvPr>
+          <p:cNvSpPr txBox="1"/>
+          <p:nvPr/>
+        </p:nvSpPr>
+        <p:spPr>
+          <a:xfrm>
+            <a:off x="1783080" y="361950"/>
+            <a:ext cx="5379720" cy="584775"/>
+          </a:xfrm>
+          <a:prstGeom prst="rect">
+            <a:avLst/>
+          </a:prstGeom>
+          <a:noFill/>
+          <a:ln w="9525">
+            <a:noFill/>
+          </a:ln>
+        </p:spPr>
+        <p:txBody>
+          <a:bodyPr wrap="square" anchor="t">
+            <a:spAutoFit/>
+          </a:bodyPr>
+          <a:lstStyle/>
+          <a:p>
+            <a:r>
+              <a:rPr lang="zh-CN" altLang="en-US" sz="3200" b="0" dirty="0">
+                <a:solidFill>
+                  <a:srgbClr val="000000"/>
+                </a:solidFill>
+                <a:effectLst/>
+                <a:highlight>
+                  <a:srgbClr val="FFFFFF"/>
+                </a:highlight>
+                <a:latin typeface="Consolas" panose="020B0609020204030204" pitchFamily="49" charset="0"/>
+              </a:rPr>
+              <a:t>毕设内容</a:t>
+            </a:r>
+          </a:p>
+        </p:txBody>
+      </p:sp>
+      <p:sp>
+        <p:nvSpPr>
+          <p:cNvPr id="1048858" name="矩形 16">
+            <a:extLst>
+              <a:ext uri="{FF2B5EF4-FFF2-40B4-BE49-F238E27FC236}">
+                <a16:creationId xmlns:a16="http://schemas.microsoft.com/office/drawing/2014/main" id="{50B68FEA-4DD6-81EB-9693-DDB769063201}"/>
+              </a:ext>
+            </a:extLst>
+          </p:cNvPr>
+          <p:cNvSpPr/>
+          <p:nvPr/>
+        </p:nvSpPr>
+        <p:spPr>
+          <a:xfrm>
+            <a:off x="664431" y="1218648"/>
+            <a:ext cx="10994169" cy="4401205"/>
+          </a:xfrm>
+          <a:prstGeom prst="rect">
+            <a:avLst/>
+          </a:prstGeom>
+          <a:noFill/>
+          <a:ln w="9525">
+            <a:noFill/>
+          </a:ln>
+        </p:spPr>
+        <p:txBody>
+          <a:bodyPr wrap="square" anchor="t">
+            <a:spAutoFit/>
+          </a:bodyPr>
+          <a:lstStyle/>
+          <a:p>
+            <a:r>
+              <a:rPr lang="zh-CN" altLang="en-US" sz="2000" b="1" dirty="0">
+                <a:solidFill>
+                  <a:srgbClr val="000000"/>
+                </a:solidFill>
+                <a:latin typeface="Consolas" panose="020B0609020204030204" pitchFamily="49" charset="0"/>
+                <a:sym typeface="SimSun-ExtB" panose="02010609060101010101" pitchFamily="49" charset="-122"/>
+              </a:rPr>
+              <a:t>毕设题目：</a:t>
+            </a:r>
+            <a:endParaRPr lang="en-US" altLang="zh-CN" sz="2000" b="1" dirty="0">
+              <a:solidFill>
+                <a:srgbClr val="000000"/>
+              </a:solidFill>
+              <a:latin typeface="Consolas" panose="020B0609020204030204" pitchFamily="49" charset="0"/>
+              <a:sym typeface="SimSun-ExtB" panose="02010609060101010101" pitchFamily="49" charset="-122"/>
+            </a:endParaRPr>
+          </a:p>
+          <a:p>
+            <a:r>
+              <a:rPr lang="zh-CN" altLang="en-US" sz="2000" b="0" dirty="0">
+                <a:solidFill>
+                  <a:srgbClr val="000000"/>
+                </a:solidFill>
+                <a:effectLst/>
+                <a:highlight>
+                  <a:srgbClr val="FFFFFF"/>
+                </a:highlight>
+                <a:latin typeface="Consolas" panose="020B0609020204030204" pitchFamily="49" charset="0"/>
+              </a:rPr>
+              <a:t>微内核操作系统</a:t>
+            </a:r>
+            <a:r>
+              <a:rPr lang="en-US" altLang="zh-CN" sz="2000" b="0" dirty="0">
+                <a:solidFill>
+                  <a:srgbClr val="000000"/>
+                </a:solidFill>
+                <a:effectLst/>
+                <a:highlight>
+                  <a:srgbClr val="FFFFFF"/>
+                </a:highlight>
+                <a:latin typeface="Consolas" panose="020B0609020204030204" pitchFamily="49" charset="0"/>
+              </a:rPr>
+              <a:t>ReL4</a:t>
+            </a:r>
+            <a:r>
+              <a:rPr lang="zh-CN" altLang="en-US" sz="2000" b="0" dirty="0">
+                <a:solidFill>
+                  <a:srgbClr val="000000"/>
+                </a:solidFill>
+                <a:effectLst/>
+                <a:highlight>
+                  <a:srgbClr val="FFFFFF"/>
+                </a:highlight>
+                <a:latin typeface="Consolas" panose="020B0609020204030204" pitchFamily="49" charset="0"/>
+              </a:rPr>
+              <a:t>中基于用户态中断的异步系统调用设计</a:t>
+            </a:r>
+          </a:p>
+          <a:p>
+            <a:endParaRPr lang="en-US" altLang="zh-CN" sz="2000" dirty="0">
+              <a:solidFill>
+                <a:srgbClr val="000000"/>
+              </a:solidFill>
+              <a:latin typeface="Consolas" panose="020B0609020204030204" pitchFamily="49" charset="0"/>
+              <a:sym typeface="SimSun-ExtB" panose="02010609060101010101" pitchFamily="49" charset="-122"/>
+            </a:endParaRPr>
+          </a:p>
+          <a:p>
+            <a:r>
+              <a:rPr lang="zh-CN" altLang="en-US" sz="2000" b="1" dirty="0">
+                <a:solidFill>
+                  <a:srgbClr val="000000"/>
+                </a:solidFill>
+                <a:latin typeface="Consolas" panose="020B0609020204030204" pitchFamily="49" charset="0"/>
+                <a:sym typeface="SimSun-ExtB" panose="02010609060101010101" pitchFamily="49" charset="-122"/>
+              </a:rPr>
+              <a:t>毕设内容：</a:t>
+            </a:r>
+            <a:endParaRPr lang="en-US" altLang="zh-CN" sz="2000" b="1" dirty="0">
+              <a:solidFill>
+                <a:srgbClr val="000000"/>
+              </a:solidFill>
+              <a:latin typeface="Consolas" panose="020B0609020204030204" pitchFamily="49" charset="0"/>
+              <a:sym typeface="SimSun-ExtB" panose="02010609060101010101" pitchFamily="49" charset="-122"/>
+            </a:endParaRPr>
+          </a:p>
+          <a:p>
+            <a:r>
+              <a:rPr lang="zh-CN" altLang="en-US" sz="2000" dirty="0">
+                <a:solidFill>
+                  <a:srgbClr val="000000"/>
+                </a:solidFill>
+                <a:latin typeface="Consolas" panose="020B0609020204030204" pitchFamily="49" charset="0"/>
+                <a:sym typeface="SimSun-ExtB" panose="02010609060101010101" pitchFamily="49" charset="-122"/>
+              </a:rPr>
+              <a:t>研究的主要内容在于利用</a:t>
+            </a:r>
+            <a:r>
+              <a:rPr lang="en-US" altLang="zh-CN" sz="2000" dirty="0">
+                <a:solidFill>
+                  <a:srgbClr val="000000"/>
+                </a:solidFill>
+                <a:latin typeface="Consolas" panose="020B0609020204030204" pitchFamily="49" charset="0"/>
+                <a:sym typeface="SimSun-ExtB" panose="02010609060101010101" pitchFamily="49" charset="-122"/>
+              </a:rPr>
+              <a:t>RISCV</a:t>
+            </a:r>
+            <a:r>
+              <a:rPr lang="zh-CN" altLang="en-US" sz="2000" dirty="0">
+                <a:solidFill>
+                  <a:srgbClr val="000000"/>
+                </a:solidFill>
+                <a:latin typeface="Consolas" panose="020B0609020204030204" pitchFamily="49" charset="0"/>
+                <a:sym typeface="SimSun-ExtB" panose="02010609060101010101" pitchFamily="49" charset="-122"/>
+              </a:rPr>
+              <a:t>平台已有的用户态中断机制，利用改进后的</a:t>
+            </a:r>
+            <a:r>
+              <a:rPr lang="en-US" altLang="zh-CN" sz="2000" dirty="0">
+                <a:solidFill>
+                  <a:srgbClr val="000000"/>
+                </a:solidFill>
+                <a:latin typeface="Consolas" panose="020B0609020204030204" pitchFamily="49" charset="0"/>
+                <a:sym typeface="SimSun-ExtB" panose="02010609060101010101" pitchFamily="49" charset="-122"/>
+              </a:rPr>
+              <a:t>Notification</a:t>
+            </a:r>
+            <a:r>
+              <a:rPr lang="zh-CN" altLang="en-US" sz="2000" dirty="0">
+                <a:solidFill>
+                  <a:srgbClr val="000000"/>
+                </a:solidFill>
+                <a:latin typeface="Consolas" panose="020B0609020204030204" pitchFamily="49" charset="0"/>
+                <a:sym typeface="SimSun-ExtB" panose="02010609060101010101" pitchFamily="49" charset="-122"/>
+              </a:rPr>
+              <a:t>机制以及共享内存，对</a:t>
+            </a:r>
+            <a:r>
+              <a:rPr lang="en-US" altLang="zh-CN" sz="2000" dirty="0">
+                <a:solidFill>
+                  <a:srgbClr val="000000"/>
+                </a:solidFill>
+                <a:latin typeface="Consolas" panose="020B0609020204030204" pitchFamily="49" charset="0"/>
+                <a:sym typeface="SimSun-ExtB" panose="02010609060101010101" pitchFamily="49" charset="-122"/>
+              </a:rPr>
+              <a:t>ReL4</a:t>
+            </a:r>
+            <a:r>
+              <a:rPr lang="zh-CN" altLang="en-US" sz="2000" dirty="0">
+                <a:solidFill>
+                  <a:srgbClr val="000000"/>
+                </a:solidFill>
+                <a:latin typeface="Consolas" panose="020B0609020204030204" pitchFamily="49" charset="0"/>
+                <a:sym typeface="SimSun-ExtB" panose="02010609060101010101" pitchFamily="49" charset="-122"/>
+              </a:rPr>
+              <a:t>微内核中的同步系统调用进⾏异步化改造，减少内核陷⼊和上下⽂切换次数，从⽽降低系统调用开销，提升系统性能。</a:t>
+            </a:r>
+            <a:endParaRPr lang="en-US" altLang="zh-CN" sz="2000" dirty="0">
+              <a:solidFill>
+                <a:srgbClr val="000000"/>
+              </a:solidFill>
+              <a:latin typeface="Consolas" panose="020B0609020204030204" pitchFamily="49" charset="0"/>
+              <a:sym typeface="SimSun-ExtB" panose="02010609060101010101" pitchFamily="49" charset="-122"/>
+            </a:endParaRPr>
+          </a:p>
+          <a:p>
+            <a:endParaRPr lang="en-US" altLang="zh-CN" sz="2000" dirty="0">
+              <a:solidFill>
+                <a:srgbClr val="000000"/>
+              </a:solidFill>
+              <a:latin typeface="Consolas" panose="020B0609020204030204" pitchFamily="49" charset="0"/>
+              <a:sym typeface="SimSun-ExtB" panose="02010609060101010101" pitchFamily="49" charset="-122"/>
+            </a:endParaRPr>
+          </a:p>
+          <a:p>
+            <a:r>
+              <a:rPr lang="zh-CN" altLang="en-US" sz="2000" b="1" dirty="0">
+                <a:solidFill>
+                  <a:srgbClr val="000000"/>
+                </a:solidFill>
+                <a:latin typeface="Consolas" panose="020B0609020204030204" pitchFamily="49" charset="0"/>
+                <a:sym typeface="SimSun-ExtB" panose="02010609060101010101" pitchFamily="49" charset="-122"/>
+              </a:rPr>
+              <a:t>关键点：</a:t>
+            </a:r>
+            <a:endParaRPr lang="en-US" altLang="zh-CN" sz="2000" b="1" dirty="0">
+              <a:solidFill>
+                <a:srgbClr val="000000"/>
+              </a:solidFill>
+              <a:latin typeface="Consolas" panose="020B0609020204030204" pitchFamily="49" charset="0"/>
+              <a:sym typeface="SimSun-ExtB" panose="02010609060101010101" pitchFamily="49" charset="-122"/>
+            </a:endParaRPr>
+          </a:p>
+          <a:p>
+            <a:r>
+              <a:rPr lang="en-US" altLang="zh-CN" sz="2000" dirty="0">
+                <a:solidFill>
+                  <a:srgbClr val="000000"/>
+                </a:solidFill>
+                <a:latin typeface="Consolas" panose="020B0609020204030204" pitchFamily="49" charset="0"/>
+                <a:sym typeface="SimSun-ExtB" panose="02010609060101010101" pitchFamily="49" charset="-122"/>
+              </a:rPr>
+              <a:t>1.</a:t>
+            </a:r>
+            <a:r>
+              <a:rPr lang="zh-CN" altLang="en-US" sz="2000" dirty="0">
+                <a:solidFill>
+                  <a:srgbClr val="000000"/>
+                </a:solidFill>
+                <a:latin typeface="Consolas" panose="020B0609020204030204" pitchFamily="49" charset="0"/>
+                <a:sym typeface="SimSun-ExtB" panose="02010609060101010101" pitchFamily="49" charset="-122"/>
+              </a:rPr>
+              <a:t>理解</a:t>
+            </a:r>
+            <a:r>
+              <a:rPr lang="en-US" altLang="zh-CN" sz="2000" dirty="0">
+                <a:solidFill>
+                  <a:srgbClr val="000000"/>
+                </a:solidFill>
+                <a:latin typeface="Consolas" panose="020B0609020204030204" pitchFamily="49" charset="0"/>
+                <a:sym typeface="SimSun-ExtB" panose="02010609060101010101" pitchFamily="49" charset="-122"/>
+              </a:rPr>
+              <a:t>ReL4</a:t>
+            </a:r>
+            <a:r>
+              <a:rPr lang="zh-CN" altLang="en-US" sz="2000" dirty="0">
+                <a:solidFill>
+                  <a:srgbClr val="000000"/>
+                </a:solidFill>
+                <a:latin typeface="Consolas" panose="020B0609020204030204" pitchFamily="49" charset="0"/>
+                <a:sym typeface="SimSun-ExtB" panose="02010609060101010101" pitchFamily="49" charset="-122"/>
+              </a:rPr>
+              <a:t>中的同步</a:t>
+            </a:r>
+            <a:r>
+              <a:rPr lang="en-US" altLang="zh-CN" sz="2000" dirty="0">
+                <a:solidFill>
+                  <a:srgbClr val="000000"/>
+                </a:solidFill>
+                <a:latin typeface="Consolas" panose="020B0609020204030204" pitchFamily="49" charset="0"/>
+                <a:sym typeface="SimSun-ExtB" panose="02010609060101010101" pitchFamily="49" charset="-122"/>
+              </a:rPr>
+              <a:t>IPC</a:t>
+            </a:r>
+            <a:r>
+              <a:rPr lang="zh-CN" altLang="en-US" sz="2000" dirty="0">
+                <a:solidFill>
+                  <a:srgbClr val="000000"/>
+                </a:solidFill>
+                <a:latin typeface="Consolas" panose="020B0609020204030204" pitchFamily="49" charset="0"/>
+                <a:sym typeface="SimSun-ExtB" panose="02010609060101010101" pitchFamily="49" charset="-122"/>
+              </a:rPr>
+              <a:t>方式，了解</a:t>
+            </a:r>
+            <a:r>
+              <a:rPr lang="en-US" altLang="zh-CN" sz="2000" dirty="0">
+                <a:solidFill>
+                  <a:srgbClr val="000000"/>
+                </a:solidFill>
+                <a:latin typeface="Consolas" panose="020B0609020204030204" pitchFamily="49" charset="0"/>
+                <a:sym typeface="SimSun-ExtB" panose="02010609060101010101" pitchFamily="49" charset="-122"/>
+              </a:rPr>
+              <a:t>ReL4</a:t>
+            </a:r>
+            <a:r>
+              <a:rPr lang="zh-CN" altLang="en-US" sz="2000" dirty="0">
+                <a:solidFill>
+                  <a:srgbClr val="000000"/>
+                </a:solidFill>
+                <a:latin typeface="Consolas" panose="020B0609020204030204" pitchFamily="49" charset="0"/>
+                <a:sym typeface="SimSun-ExtB" panose="02010609060101010101" pitchFamily="49" charset="-122"/>
+              </a:rPr>
+              <a:t>的内核</a:t>
+            </a:r>
+            <a:r>
+              <a:rPr lang="en-US" altLang="zh-CN" sz="2000" dirty="0">
+                <a:solidFill>
+                  <a:srgbClr val="000000"/>
+                </a:solidFill>
+                <a:latin typeface="Consolas" panose="020B0609020204030204" pitchFamily="49" charset="0"/>
+                <a:sym typeface="SimSun-ExtB" panose="02010609060101010101" pitchFamily="49" charset="-122"/>
+              </a:rPr>
+              <a:t>IPC</a:t>
+            </a:r>
+            <a:r>
+              <a:rPr lang="zh-CN" altLang="en-US" sz="2000" dirty="0">
+                <a:solidFill>
+                  <a:srgbClr val="000000"/>
+                </a:solidFill>
+                <a:latin typeface="Consolas" panose="020B0609020204030204" pitchFamily="49" charset="0"/>
+                <a:sym typeface="SimSun-ExtB" panose="02010609060101010101" pitchFamily="49" charset="-122"/>
+              </a:rPr>
+              <a:t>路径以及重要内核对象如</a:t>
+            </a:r>
+            <a:r>
+              <a:rPr lang="en-US" altLang="zh-CN" sz="2000" dirty="0">
+                <a:solidFill>
+                  <a:srgbClr val="000000"/>
+                </a:solidFill>
+                <a:latin typeface="Consolas" panose="020B0609020204030204" pitchFamily="49" charset="0"/>
+                <a:sym typeface="SimSun-ExtB" panose="02010609060101010101" pitchFamily="49" charset="-122"/>
+              </a:rPr>
+              <a:t>Capability</a:t>
+            </a:r>
+            <a:r>
+              <a:rPr lang="zh-CN" altLang="en-US" sz="2000" dirty="0">
+                <a:solidFill>
+                  <a:srgbClr val="000000"/>
+                </a:solidFill>
+                <a:latin typeface="Consolas" panose="020B0609020204030204" pitchFamily="49" charset="0"/>
+                <a:sym typeface="SimSun-ExtB" panose="02010609060101010101" pitchFamily="49" charset="-122"/>
+              </a:rPr>
+              <a:t>、</a:t>
+            </a:r>
+            <a:r>
+              <a:rPr lang="en-US" altLang="zh-CN" sz="2000" dirty="0">
+                <a:solidFill>
+                  <a:srgbClr val="000000"/>
+                </a:solidFill>
+                <a:latin typeface="Consolas" panose="020B0609020204030204" pitchFamily="49" charset="0"/>
+                <a:sym typeface="SimSun-ExtB" panose="02010609060101010101" pitchFamily="49" charset="-122"/>
+              </a:rPr>
+              <a:t>Untyped</a:t>
+            </a:r>
+            <a:r>
+              <a:rPr lang="zh-CN" altLang="en-US" sz="2000" dirty="0">
+                <a:solidFill>
+                  <a:srgbClr val="000000"/>
+                </a:solidFill>
+                <a:latin typeface="Consolas" panose="020B0609020204030204" pitchFamily="49" charset="0"/>
+                <a:sym typeface="SimSun-ExtB" panose="02010609060101010101" pitchFamily="49" charset="-122"/>
+              </a:rPr>
+              <a:t>等。</a:t>
+            </a:r>
+            <a:endParaRPr lang="en-US" altLang="zh-CN" sz="2000" dirty="0">
+              <a:solidFill>
+                <a:srgbClr val="000000"/>
+              </a:solidFill>
+              <a:latin typeface="Consolas" panose="020B0609020204030204" pitchFamily="49" charset="0"/>
+              <a:sym typeface="SimSun-ExtB" panose="02010609060101010101" pitchFamily="49" charset="-122"/>
+            </a:endParaRPr>
+          </a:p>
+          <a:p>
+            <a:r>
+              <a:rPr lang="en-US" altLang="zh-CN" sz="2000" dirty="0">
+                <a:solidFill>
+                  <a:srgbClr val="000000"/>
+                </a:solidFill>
+                <a:latin typeface="Consolas" panose="020B0609020204030204" pitchFamily="49" charset="0"/>
+                <a:sym typeface="SimSun-ExtB" panose="02010609060101010101" pitchFamily="49" charset="-122"/>
+              </a:rPr>
+              <a:t>2.</a:t>
+            </a:r>
+            <a:r>
+              <a:rPr lang="zh-CN" altLang="en-US" sz="2000" dirty="0">
+                <a:solidFill>
+                  <a:srgbClr val="000000"/>
+                </a:solidFill>
+                <a:latin typeface="Consolas" panose="020B0609020204030204" pitchFamily="49" charset="0"/>
+                <a:sym typeface="SimSun-ExtB" panose="02010609060101010101" pitchFamily="49" charset="-122"/>
+              </a:rPr>
+              <a:t>理解</a:t>
+            </a:r>
+            <a:r>
+              <a:rPr lang="en-US" altLang="zh-CN" sz="2000" dirty="0">
+                <a:solidFill>
+                  <a:srgbClr val="000000"/>
+                </a:solidFill>
+                <a:latin typeface="Consolas" panose="020B0609020204030204" pitchFamily="49" charset="0"/>
+                <a:sym typeface="SimSun-ExtB" panose="02010609060101010101" pitchFamily="49" charset="-122"/>
+              </a:rPr>
+              <a:t>ReL4</a:t>
+            </a:r>
+            <a:r>
+              <a:rPr lang="zh-CN" altLang="en-US" sz="2000" dirty="0">
+                <a:solidFill>
+                  <a:srgbClr val="000000"/>
+                </a:solidFill>
+                <a:latin typeface="Consolas" panose="020B0609020204030204" pitchFamily="49" charset="0"/>
+                <a:sym typeface="SimSun-ExtB" panose="02010609060101010101" pitchFamily="49" charset="-122"/>
+              </a:rPr>
+              <a:t>中的</a:t>
+            </a:r>
+            <a:r>
+              <a:rPr lang="en-US" altLang="zh-CN" sz="2000" dirty="0">
+                <a:solidFill>
+                  <a:srgbClr val="000000"/>
+                </a:solidFill>
+                <a:latin typeface="Consolas" panose="020B0609020204030204" pitchFamily="49" charset="0"/>
+                <a:sym typeface="SimSun-ExtB" panose="02010609060101010101" pitchFamily="49" charset="-122"/>
+              </a:rPr>
+              <a:t>Notification</a:t>
+            </a:r>
+            <a:r>
+              <a:rPr lang="zh-CN" altLang="en-US" sz="2000" dirty="0">
+                <a:solidFill>
+                  <a:srgbClr val="000000"/>
+                </a:solidFill>
+                <a:latin typeface="Consolas" panose="020B0609020204030204" pitchFamily="49" charset="0"/>
+                <a:sym typeface="SimSun-ExtB" panose="02010609060101010101" pitchFamily="49" charset="-122"/>
+              </a:rPr>
+              <a:t>机制以及异步</a:t>
+            </a:r>
+            <a:r>
+              <a:rPr lang="en-US" altLang="zh-CN" sz="2000" dirty="0">
+                <a:solidFill>
+                  <a:srgbClr val="000000"/>
+                </a:solidFill>
+                <a:latin typeface="Consolas" panose="020B0609020204030204" pitchFamily="49" charset="0"/>
+                <a:sym typeface="SimSun-ExtB" panose="02010609060101010101" pitchFamily="49" charset="-122"/>
+              </a:rPr>
+              <a:t>IPC</a:t>
+            </a:r>
+            <a:r>
+              <a:rPr lang="zh-CN" altLang="en-US" sz="2000" dirty="0">
+                <a:solidFill>
+                  <a:srgbClr val="000000"/>
+                </a:solidFill>
+                <a:latin typeface="Consolas" panose="020B0609020204030204" pitchFamily="49" charset="0"/>
+                <a:sym typeface="SimSun-ExtB" panose="02010609060101010101" pitchFamily="49" charset="-122"/>
+              </a:rPr>
+              <a:t>机制。</a:t>
+            </a:r>
+            <a:endParaRPr lang="en-US" altLang="zh-CN" sz="2000" dirty="0">
+              <a:solidFill>
+                <a:srgbClr val="000000"/>
+              </a:solidFill>
+              <a:latin typeface="Consolas" panose="020B0609020204030204" pitchFamily="49" charset="0"/>
+              <a:sym typeface="SimSun-ExtB" panose="02010609060101010101" pitchFamily="49" charset="-122"/>
+            </a:endParaRPr>
+          </a:p>
+          <a:p>
+            <a:r>
+              <a:rPr lang="en-US" altLang="zh-CN" sz="2000" dirty="0">
+                <a:solidFill>
+                  <a:srgbClr val="000000"/>
+                </a:solidFill>
+                <a:latin typeface="Consolas" panose="020B0609020204030204" pitchFamily="49" charset="0"/>
+                <a:sym typeface="SimSun-ExtB" panose="02010609060101010101" pitchFamily="49" charset="-122"/>
+              </a:rPr>
+              <a:t>3.</a:t>
+            </a:r>
+            <a:r>
+              <a:rPr lang="zh-CN" altLang="en-US" sz="2000" dirty="0">
+                <a:solidFill>
+                  <a:srgbClr val="000000"/>
+                </a:solidFill>
+                <a:latin typeface="Consolas" panose="020B0609020204030204" pitchFamily="49" charset="0"/>
+                <a:sym typeface="SimSun-ExtB" panose="02010609060101010101" pitchFamily="49" charset="-122"/>
+              </a:rPr>
+              <a:t>在</a:t>
+            </a:r>
+            <a:r>
+              <a:rPr lang="en-US" altLang="zh-CN" sz="2000" dirty="0">
+                <a:solidFill>
+                  <a:srgbClr val="000000"/>
+                </a:solidFill>
+                <a:latin typeface="Consolas" panose="020B0609020204030204" pitchFamily="49" charset="0"/>
+                <a:sym typeface="SimSun-ExtB" panose="02010609060101010101" pitchFamily="49" charset="-122"/>
+              </a:rPr>
+              <a:t>ReL4</a:t>
+            </a:r>
+            <a:r>
+              <a:rPr lang="zh-CN" altLang="en-US" sz="2000" dirty="0">
+                <a:solidFill>
+                  <a:srgbClr val="000000"/>
+                </a:solidFill>
+                <a:latin typeface="Consolas" panose="020B0609020204030204" pitchFamily="49" charset="0"/>
+                <a:sym typeface="SimSun-ExtB" panose="02010609060101010101" pitchFamily="49" charset="-122"/>
+              </a:rPr>
+              <a:t>的</a:t>
+            </a:r>
+            <a:r>
+              <a:rPr lang="en-US" altLang="zh-CN" sz="2000" dirty="0">
+                <a:solidFill>
+                  <a:srgbClr val="000000"/>
+                </a:solidFill>
+                <a:latin typeface="Consolas" panose="020B0609020204030204" pitchFamily="49" charset="0"/>
+                <a:sym typeface="SimSun-ExtB" panose="02010609060101010101" pitchFamily="49" charset="-122"/>
+              </a:rPr>
+              <a:t>Notification</a:t>
+            </a:r>
+            <a:r>
+              <a:rPr lang="zh-CN" altLang="en-US" sz="2000" dirty="0">
+                <a:solidFill>
+                  <a:srgbClr val="000000"/>
+                </a:solidFill>
+                <a:latin typeface="Consolas" panose="020B0609020204030204" pitchFamily="49" charset="0"/>
+                <a:sym typeface="SimSun-ExtB" panose="02010609060101010101" pitchFamily="49" charset="-122"/>
+              </a:rPr>
+              <a:t>机制和异步</a:t>
+            </a:r>
+            <a:r>
+              <a:rPr lang="en-US" altLang="zh-CN" sz="2000" dirty="0">
+                <a:solidFill>
+                  <a:srgbClr val="000000"/>
+                </a:solidFill>
+                <a:latin typeface="Consolas" panose="020B0609020204030204" pitchFamily="49" charset="0"/>
+                <a:sym typeface="SimSun-ExtB" panose="02010609060101010101" pitchFamily="49" charset="-122"/>
+              </a:rPr>
+              <a:t>IPC</a:t>
+            </a:r>
+            <a:r>
+              <a:rPr lang="zh-CN" altLang="en-US" sz="2000" dirty="0">
+                <a:solidFill>
+                  <a:srgbClr val="000000"/>
+                </a:solidFill>
+                <a:latin typeface="Consolas" panose="020B0609020204030204" pitchFamily="49" charset="0"/>
+                <a:sym typeface="SimSun-ExtB" panose="02010609060101010101" pitchFamily="49" charset="-122"/>
+              </a:rPr>
+              <a:t>机制的基础上，开发异步系统调用。</a:t>
+            </a:r>
+            <a:endParaRPr lang="en-US" altLang="zh-CN" sz="2000" dirty="0">
+              <a:solidFill>
+                <a:srgbClr val="000000"/>
+              </a:solidFill>
+              <a:latin typeface="Consolas" panose="020B0609020204030204" pitchFamily="49" charset="0"/>
+              <a:sym typeface="SimSun-ExtB" panose="02010609060101010101" pitchFamily="49" charset="-122"/>
+            </a:endParaRPr>
+          </a:p>
+          <a:p>
+            <a:endParaRPr lang="zh-CN" altLang="en-US" sz="2000" dirty="0">
+              <a:solidFill>
+                <a:srgbClr val="2D3E50"/>
+              </a:solidFill>
+              <a:latin typeface="SimSun-ExtB" panose="02010609060101010101" pitchFamily="49" charset="-122"/>
+              <a:ea typeface="微软雅黑 Light" panose="020B0502040204020203" pitchFamily="34" charset="-122"/>
+              <a:sym typeface="SimSun-ExtB" panose="02010609060101010101" pitchFamily="49" charset="-122"/>
+            </a:endParaRPr>
+          </a:p>
+        </p:txBody>
+      </p:sp>
+      <p:pic>
+        <p:nvPicPr>
+          <p:cNvPr id="2097192" name="图片 3" descr="理工灰">
+            <a:extLst>
+              <a:ext uri="{FF2B5EF4-FFF2-40B4-BE49-F238E27FC236}">
+                <a16:creationId xmlns:a16="http://schemas.microsoft.com/office/drawing/2014/main" id="{4E12E03C-27C6-7B08-AD5D-91308F2E9793}"/>
+              </a:ext>
+            </a:extLst>
+          </p:cNvPr>
+          <p:cNvPicPr>
+            <a:picLocks noChangeAspect="1"/>
+          </p:cNvPicPr>
+          <p:nvPr/>
+        </p:nvPicPr>
+        <p:blipFill>
+          <a:blip r:embed="rId3" cstate="print"/>
+          <a:stretch>
+            <a:fillRect/>
+          </a:stretch>
+        </p:blipFill>
+        <p:spPr>
+          <a:xfrm>
+            <a:off x="11017250" y="279400"/>
+            <a:ext cx="873125" cy="752475"/>
+          </a:xfrm>
+          <a:prstGeom prst="rect">
+            <a:avLst/>
+          </a:prstGeom>
+          <a:noFill/>
+          <a:ln w="9525">
+            <a:noFill/>
+          </a:ln>
+        </p:spPr>
+      </p:pic>
+      <p:sp>
+        <p:nvSpPr>
+          <p:cNvPr id="2" name="灯片编号占位符 1">
+            <a:extLst>
+              <a:ext uri="{FF2B5EF4-FFF2-40B4-BE49-F238E27FC236}">
+                <a16:creationId xmlns:a16="http://schemas.microsoft.com/office/drawing/2014/main" id="{6069CFEF-DCB2-EE8E-9109-DA0AEF336CD3}"/>
+              </a:ext>
+            </a:extLst>
+          </p:cNvPr>
+          <p:cNvSpPr>
+            <a:spLocks noGrp="1"/>
+          </p:cNvSpPr>
+          <p:nvPr>
+            <p:ph type="sldNum" sz="quarter" idx="12"/>
+          </p:nvPr>
+        </p:nvSpPr>
+        <p:spPr/>
+        <p:txBody>
+          <a:bodyPr/>
+          <a:lstStyle/>
+          <a:p>
+            <a:pPr fontAlgn="auto"/>
+            <a:fld id="{CA2E1F5A-C151-4DEE-93E4-F5F32EEAF57D}" type="slidenum">
+              <a:rPr lang="zh-CN" altLang="en-US" strike="noStrike" noProof="1" smtClean="0">
+                <a:latin typeface="+mn-lt"/>
+                <a:ea typeface="+mn-ea"/>
+                <a:cs typeface="+mn-cs"/>
+              </a:rPr>
+              <a:pPr fontAlgn="auto"/>
+              <a:t>4</a:t>
+            </a:fld>
+            <a:endParaRPr lang="zh-CN" altLang="en-US" strike="noStrike" noProof="1"/>
+          </a:p>
+        </p:txBody>
+      </p:sp>
+    </p:spTree>
+    <p:extLst>
+      <p:ext uri="{BB962C8B-B14F-4D97-AF65-F5344CB8AC3E}">
+        <p14:creationId xmlns:p14="http://schemas.microsoft.com/office/powerpoint/2010/main" val="1961140447"/>
+      </p:ext>
+    </p:extLst>
+  </p:cSld>
+  <p:clrMapOvr>
+    <a:masterClrMapping/>
+  </p:clrMapOvr>
+  <p:transition>
+    <p:fade thruBlk="1"/>
+  </p:transition>
+</p:sld>
+</file>
+
+<file path=ppt/slides/slide5.xml><?xml version="1.0" encoding="utf-8"?>
 <p:sld xmlns:a="http://schemas.openxmlformats.org/drawingml/2006/main" xmlns:r="http://schemas.openxmlformats.org/officeDocument/2006/relationships" xmlns:p="http://schemas.openxmlformats.org/presentationml/2006/main" showMasterSp="0">
   <p:cSld>
     <p:bg>
@@ -6391,7 +8273,7 @@
                   <a:ea typeface="微软雅黑 Light" panose="020B0502040204020203" pitchFamily="34" charset="-122"/>
                   <a:sym typeface="SimSun-ExtB" panose="02010609060101010101" pitchFamily="49" charset="-122"/>
                 </a:rPr>
-                <a:t>PART 01</a:t>
+                <a:t>PART 02</a:t>
               </a:r>
             </a:p>
           </p:txBody>
@@ -6482,7 +8364,7 @@
                 <a:cs typeface="+mn-cs"/>
               </a:rPr>
               <a:pPr fontAlgn="auto"/>
-              <a:t>3</a:t>
+              <a:t>5</a:t>
             </a:fld>
             <a:endParaRPr lang="zh-CN" altLang="en-US" strike="noStrike" noProof="1"/>
           </a:p>
@@ -6499,7 +8381,7 @@
 </p:sld>
 </file>
 
-<file path=ppt/slides/slide4.xml><?xml version="1.0" encoding="utf-8"?>
+<file path=ppt/slides/slide6.xml><?xml version="1.0" encoding="utf-8"?>
 <p:sld xmlns:a="http://schemas.openxmlformats.org/drawingml/2006/main" xmlns:r="http://schemas.openxmlformats.org/officeDocument/2006/relationships" xmlns:p="http://schemas.openxmlformats.org/presentationml/2006/main" showMasterSp="0">
   <p:cSld>
     <p:bg>
@@ -6834,7 +8716,7 @@
                 <a:ea typeface="微软雅黑 Light" panose="020B0502040204020203" pitchFamily="34" charset="-122"/>
                 <a:sym typeface="SimSun-ExtB" panose="02010609060101010101" pitchFamily="49" charset="-122"/>
               </a:rPr>
-              <a:t>、虚拟内存、线程，其他一切都在用户空间中起作用。于是着重阅读了</a:t>
+              <a:t>、虚拟内存、线程，其他一切都在用户空间中起作用。着重阅读了</a:t>
             </a:r>
             <a:r>
               <a:rPr lang="en-US" altLang="zh-CN" sz="2000" dirty="0">
@@ -7008,7 +8890,7 @@
                 <a:cs typeface="+mn-cs"/>
               </a:rPr>
               <a:pPr fontAlgn="auto"/>
-              <a:t>4</a:t>
+              <a:t>6</a:t>
             </a:fld>
             <a:endParaRPr lang="zh-CN" altLang="en-US" strike="noStrike" noProof="1"/>
           </a:p>
@@ -7066,7 +8948,7 @@
 </p:sld>
 </file>
 
-<file path=ppt/slides/slide5.xml><?xml version="1.0" encoding="utf-8"?>
+<file path=ppt/slides/slide7.xml><?xml version="1.0" encoding="utf-8"?>
 <p:sld xmlns:a="http://schemas.openxmlformats.org/drawingml/2006/main" xmlns:r="http://schemas.openxmlformats.org/officeDocument/2006/relationships" xmlns:p="http://schemas.openxmlformats.org/presentationml/2006/main" showMasterSp="0">
   <p:cSld>
     <p:bg>
@@ -7539,7 +9421,7 @@
                 <a:cs typeface="+mn-cs"/>
               </a:rPr>
               <a:pPr fontAlgn="auto"/>
-              <a:t>5</a:t>
+              <a:t>7</a:t>
             </a:fld>
             <a:endParaRPr lang="zh-CN" altLang="en-US" strike="noStrike" noProof="1"/>
           </a:p>
@@ -7669,7 +9551,7 @@
 </p:sld>
 </file>
 
-<file path=ppt/slides/slide6.xml><?xml version="1.0" encoding="utf-8"?>
+<file path=ppt/slides/slide8.xml><?xml version="1.0" encoding="utf-8"?>
 <p:sld xmlns:a="http://schemas.openxmlformats.org/drawingml/2006/main" xmlns:r="http://schemas.openxmlformats.org/officeDocument/2006/relationships" xmlns:p="http://schemas.openxmlformats.org/presentationml/2006/main" showMasterSp="0">
   <p:cSld>
     <p:bg>
@@ -8244,7 +10126,7 @@
                 <a:cs typeface="+mn-cs"/>
               </a:rPr>
               <a:pPr fontAlgn="auto"/>
-              <a:t>6</a:t>
+              <a:t>8</a:t>
             </a:fld>
             <a:endParaRPr lang="zh-CN" altLang="en-US" strike="noStrike" noProof="1"/>
           </a:p>
@@ -8296,7 +10178,7 @@
 </p:sld>
 </file>
 
-<file path=ppt/slides/slide7.xml><?xml version="1.0" encoding="utf-8"?>
+<file path=ppt/slides/slide9.xml><?xml version="1.0" encoding="utf-8"?>
 <p:sld xmlns:a="http://schemas.openxmlformats.org/drawingml/2006/main" xmlns:r="http://schemas.openxmlformats.org/officeDocument/2006/relationships" xmlns:p="http://schemas.openxmlformats.org/presentationml/2006/main" showMasterSp="0">
   <p:cSld>
     <p:bg>
@@ -8947,7 +10829,7 @@
                 <a:cs typeface="+mn-cs"/>
               </a:rPr>
               <a:pPr fontAlgn="auto"/>
-              <a:t>7</a:t>
+              <a:t>9</a:t>
             </a:fld>
             <a:endParaRPr lang="zh-CN" altLang="en-US" strike="noStrike" noProof="1"/>
           </a:p>
@@ -9001,690 +10883,6 @@
   </p:clrMapOvr>
   <p:transition>
     <p:fade thruBlk="1"/>
-  </p:transition>
-</p:sld>
-</file>
-
-<file path=ppt/slides/slide8.xml><?xml version="1.0" encoding="utf-8"?>
-<p:sld xmlns:a="http://schemas.openxmlformats.org/drawingml/2006/main" xmlns:r="http://schemas.openxmlformats.org/officeDocument/2006/relationships" xmlns:p="http://schemas.openxmlformats.org/presentationml/2006/main" showMasterSp="0">
-  <p:cSld>
-    <p:bg>
-      <p:bgPr>
-        <a:blipFill rotWithShape="1">
-          <a:blip r:embed="rId2" cstate="print">
-            <a:alphaModFix amt="39000"/>
-          </a:blip>
-          <a:stretch>
-            <a:fillRect l="-5000" t="-9000" r="-10000" b="-13000"/>
-          </a:stretch>
-        </a:blipFill>
-        <a:effectLst/>
-      </p:bgPr>
-    </p:bg>
-    <p:spTree>
-      <p:nvGrpSpPr>
-        <p:cNvPr id="1" name="">
-          <a:extLst>
-            <a:ext uri="{FF2B5EF4-FFF2-40B4-BE49-F238E27FC236}">
-              <a16:creationId xmlns:a16="http://schemas.microsoft.com/office/drawing/2014/main" id="{D7B3757C-37F6-3F39-162E-7DFBE4B8DCFD}"/>
-            </a:ext>
-          </a:extLst>
-        </p:cNvPr>
-        <p:cNvGrpSpPr/>
-        <p:nvPr/>
-      </p:nvGrpSpPr>
-      <p:grpSpPr>
-        <a:xfrm>
-          <a:off x="0" y="0"/>
-          <a:ext cx="0" cy="0"/>
-          <a:chOff x="0" y="0"/>
-          <a:chExt cx="0" cy="0"/>
-        </a:xfrm>
-      </p:grpSpPr>
-      <p:sp>
-        <p:nvSpPr>
-          <p:cNvPr id="1048856" name="燕尾形 9">
-            <a:extLst>
-              <a:ext uri="{FF2B5EF4-FFF2-40B4-BE49-F238E27FC236}">
-                <a16:creationId xmlns:a16="http://schemas.microsoft.com/office/drawing/2014/main" id="{8D390BBA-B652-3C0B-375B-658863095F5F}"/>
-              </a:ext>
-            </a:extLst>
-          </p:cNvPr>
-          <p:cNvSpPr/>
-          <p:nvPr/>
-        </p:nvSpPr>
-        <p:spPr>
-          <a:xfrm>
-            <a:off x="849630" y="494030"/>
-            <a:ext cx="812800" cy="340360"/>
-          </a:xfrm>
-          <a:prstGeom prst="chevron">
-            <a:avLst/>
-          </a:prstGeom>
-          <a:solidFill>
-            <a:schemeClr val="tx2">
-              <a:lumMod val="40000"/>
-              <a:lumOff val="60000"/>
-            </a:schemeClr>
-          </a:solidFill>
-          <a:ln>
-            <a:noFill/>
-          </a:ln>
-        </p:spPr>
-        <p:style>
-          <a:lnRef idx="2">
-            <a:schemeClr val="accent1">
-              <a:shade val="50000"/>
-            </a:schemeClr>
-          </a:lnRef>
-          <a:fillRef idx="1">
-            <a:schemeClr val="accent1"/>
-          </a:fillRef>
-          <a:effectRef idx="0">
-            <a:schemeClr val="accent1"/>
-          </a:effectRef>
-          <a:fontRef idx="minor">
-            <a:schemeClr val="lt1"/>
-          </a:fontRef>
-        </p:style>
-        <p:txBody>
-          <a:bodyPr rtlCol="0" anchor="ctr"/>
-          <a:lstStyle/>
-          <a:p>
-            <a:pPr algn="ctr"/>
-            <a:endParaRPr lang="zh-CN" altLang="en-US"/>
-          </a:p>
-        </p:txBody>
-      </p:sp>
-      <p:sp>
-        <p:nvSpPr>
-          <p:cNvPr id="1048857" name="文本框 39">
-            <a:extLst>
-              <a:ext uri="{FF2B5EF4-FFF2-40B4-BE49-F238E27FC236}">
-                <a16:creationId xmlns:a16="http://schemas.microsoft.com/office/drawing/2014/main" id="{0F29EE2C-E958-1EBC-06F3-BC4368123B5D}"/>
-              </a:ext>
-            </a:extLst>
-          </p:cNvPr>
-          <p:cNvSpPr txBox="1"/>
-          <p:nvPr/>
-        </p:nvSpPr>
-        <p:spPr>
-          <a:xfrm>
-            <a:off x="1783080" y="361950"/>
-            <a:ext cx="5379720" cy="584775"/>
-          </a:xfrm>
-          <a:prstGeom prst="rect">
-            <a:avLst/>
-          </a:prstGeom>
-          <a:noFill/>
-          <a:ln w="9525">
-            <a:noFill/>
-          </a:ln>
-        </p:spPr>
-        <p:txBody>
-          <a:bodyPr wrap="square" anchor="t">
-            <a:spAutoFit/>
-          </a:bodyPr>
-          <a:lstStyle/>
-          <a:p>
-            <a:r>
-              <a:rPr lang="en-US" altLang="zh-CN" sz="3200" b="0" dirty="0">
-                <a:solidFill>
-                  <a:srgbClr val="000000"/>
-                </a:solidFill>
-                <a:effectLst/>
-                <a:highlight>
-                  <a:srgbClr val="FFFFFF"/>
-                </a:highlight>
-                <a:latin typeface="Consolas" panose="020B0609020204030204" pitchFamily="49" charset="0"/>
-              </a:rPr>
-              <a:t>reL4</a:t>
-            </a:r>
-            <a:r>
-              <a:rPr lang="zh-CN" altLang="en-US" sz="3200" b="0" dirty="0">
-                <a:solidFill>
-                  <a:srgbClr val="000000"/>
-                </a:solidFill>
-                <a:effectLst/>
-                <a:highlight>
-                  <a:srgbClr val="FFFFFF"/>
-                </a:highlight>
-                <a:latin typeface="Consolas" panose="020B0609020204030204" pitchFamily="49" charset="0"/>
-              </a:rPr>
-              <a:t>异步</a:t>
-            </a:r>
-            <a:r>
-              <a:rPr lang="en-US" altLang="zh-CN" sz="3200" b="0" dirty="0">
-                <a:solidFill>
-                  <a:srgbClr val="000000"/>
-                </a:solidFill>
-                <a:effectLst/>
-                <a:highlight>
-                  <a:srgbClr val="FFFFFF"/>
-                </a:highlight>
-                <a:latin typeface="Consolas" panose="020B0609020204030204" pitchFamily="49" charset="0"/>
-              </a:rPr>
-              <a:t>IPC</a:t>
-            </a:r>
-            <a:r>
-              <a:rPr lang="zh-CN" altLang="en-US" sz="3200" b="0" dirty="0">
-                <a:solidFill>
-                  <a:srgbClr val="000000"/>
-                </a:solidFill>
-                <a:effectLst/>
-                <a:highlight>
-                  <a:srgbClr val="FFFFFF"/>
-                </a:highlight>
-                <a:latin typeface="Consolas" panose="020B0609020204030204" pitchFamily="49" charset="0"/>
-              </a:rPr>
-              <a:t>实验</a:t>
-            </a:r>
-          </a:p>
-        </p:txBody>
-      </p:sp>
-      <p:sp>
-        <p:nvSpPr>
-          <p:cNvPr id="1048858" name="矩形 16">
-            <a:extLst>
-              <a:ext uri="{FF2B5EF4-FFF2-40B4-BE49-F238E27FC236}">
-                <a16:creationId xmlns:a16="http://schemas.microsoft.com/office/drawing/2014/main" id="{50B68FEA-4DD6-81EB-9693-DDB769063201}"/>
-              </a:ext>
-            </a:extLst>
-          </p:cNvPr>
-          <p:cNvSpPr/>
-          <p:nvPr/>
-        </p:nvSpPr>
-        <p:spPr>
-          <a:xfrm>
-            <a:off x="664431" y="1218648"/>
-            <a:ext cx="10970723" cy="400110"/>
-          </a:xfrm>
-          <a:prstGeom prst="rect">
-            <a:avLst/>
-          </a:prstGeom>
-          <a:noFill/>
-          <a:ln w="9525">
-            <a:noFill/>
-          </a:ln>
-        </p:spPr>
-        <p:txBody>
-          <a:bodyPr wrap="square" anchor="t">
-            <a:spAutoFit/>
-          </a:bodyPr>
-          <a:lstStyle/>
-          <a:p>
-            <a:r>
-              <a:rPr lang="en-US" altLang="zh-CN" sz="2000" dirty="0">
-                <a:solidFill>
-                  <a:srgbClr val="000000"/>
-                </a:solidFill>
-                <a:latin typeface="Consolas" panose="020B0609020204030204" pitchFamily="49" charset="0"/>
-                <a:sym typeface="SimSun-ExtB" panose="02010609060101010101" pitchFamily="49" charset="-122"/>
-              </a:rPr>
-              <a:t>1.</a:t>
-            </a:r>
-            <a:r>
-              <a:rPr lang="zh-CN" altLang="en-US" sz="2000" dirty="0">
-                <a:solidFill>
-                  <a:srgbClr val="000000"/>
-                </a:solidFill>
-                <a:latin typeface="Consolas" panose="020B0609020204030204" pitchFamily="49" charset="0"/>
-                <a:sym typeface="SimSun-ExtB" panose="02010609060101010101" pitchFamily="49" charset="-122"/>
-              </a:rPr>
-              <a:t>阅读</a:t>
-            </a:r>
-            <a:r>
-              <a:rPr lang="en-US" altLang="zh-CN" sz="2000" dirty="0">
-                <a:solidFill>
-                  <a:srgbClr val="000000"/>
-                </a:solidFill>
-                <a:latin typeface="Consolas" panose="020B0609020204030204" pitchFamily="49" charset="0"/>
-                <a:sym typeface="SimSun-ExtB" panose="02010609060101010101" pitchFamily="49" charset="-122"/>
-              </a:rPr>
-              <a:t>Notification</a:t>
-            </a:r>
-            <a:r>
-              <a:rPr lang="zh-CN" altLang="en-US" sz="2000" dirty="0">
-                <a:solidFill>
-                  <a:srgbClr val="000000"/>
-                </a:solidFill>
-                <a:latin typeface="Consolas" panose="020B0609020204030204" pitchFamily="49" charset="0"/>
-                <a:sym typeface="SimSun-ExtB" panose="02010609060101010101" pitchFamily="49" charset="-122"/>
-              </a:rPr>
-              <a:t>文档，阅读技术文档并结合代码理解</a:t>
-            </a:r>
-            <a:r>
-              <a:rPr lang="en-US" altLang="zh-CN" sz="2000" dirty="0">
-                <a:solidFill>
-                  <a:srgbClr val="000000"/>
-                </a:solidFill>
-                <a:latin typeface="Consolas" panose="020B0609020204030204" pitchFamily="49" charset="0"/>
-                <a:sym typeface="SimSun-ExtB" panose="02010609060101010101" pitchFamily="49" charset="-122"/>
-              </a:rPr>
-              <a:t>reL4</a:t>
-            </a:r>
-            <a:r>
-              <a:rPr lang="zh-CN" altLang="en-US" sz="2000" dirty="0">
-                <a:solidFill>
-                  <a:srgbClr val="000000"/>
-                </a:solidFill>
-                <a:latin typeface="Consolas" panose="020B0609020204030204" pitchFamily="49" charset="0"/>
-                <a:sym typeface="SimSun-ExtB" panose="02010609060101010101" pitchFamily="49" charset="-122"/>
-              </a:rPr>
-              <a:t>异步</a:t>
-            </a:r>
-            <a:r>
-              <a:rPr lang="en-US" altLang="zh-CN" sz="2000" dirty="0">
-                <a:solidFill>
-                  <a:srgbClr val="000000"/>
-                </a:solidFill>
-                <a:latin typeface="Consolas" panose="020B0609020204030204" pitchFamily="49" charset="0"/>
-                <a:sym typeface="SimSun-ExtB" panose="02010609060101010101" pitchFamily="49" charset="-122"/>
-              </a:rPr>
-              <a:t>IPC</a:t>
-            </a:r>
-            <a:endParaRPr lang="zh-CN" altLang="en-US" sz="2000" dirty="0">
-              <a:solidFill>
-                <a:srgbClr val="2D3E50"/>
-              </a:solidFill>
-              <a:latin typeface="SimSun-ExtB" panose="02010609060101010101" pitchFamily="49" charset="-122"/>
-              <a:ea typeface="微软雅黑 Light" panose="020B0502040204020203" pitchFamily="34" charset="-122"/>
-              <a:sym typeface="SimSun-ExtB" panose="02010609060101010101" pitchFamily="49" charset="-122"/>
-            </a:endParaRPr>
-          </a:p>
-        </p:txBody>
-      </p:sp>
-      <p:pic>
-        <p:nvPicPr>
-          <p:cNvPr id="2097192" name="图片 3" descr="理工灰">
-            <a:extLst>
-              <a:ext uri="{FF2B5EF4-FFF2-40B4-BE49-F238E27FC236}">
-                <a16:creationId xmlns:a16="http://schemas.microsoft.com/office/drawing/2014/main" id="{4E12E03C-27C6-7B08-AD5D-91308F2E9793}"/>
-              </a:ext>
-            </a:extLst>
-          </p:cNvPr>
-          <p:cNvPicPr>
-            <a:picLocks noChangeAspect="1"/>
-          </p:cNvPicPr>
-          <p:nvPr/>
-        </p:nvPicPr>
-        <p:blipFill>
-          <a:blip r:embed="rId3" cstate="print"/>
-          <a:stretch>
-            <a:fillRect/>
-          </a:stretch>
-        </p:blipFill>
-        <p:spPr>
-          <a:xfrm>
-            <a:off x="11017250" y="279400"/>
-            <a:ext cx="873125" cy="752475"/>
-          </a:xfrm>
-          <a:prstGeom prst="rect">
-            <a:avLst/>
-          </a:prstGeom>
-          <a:noFill/>
-          <a:ln w="9525">
-            <a:noFill/>
-          </a:ln>
-        </p:spPr>
-      </p:pic>
-      <p:sp>
-        <p:nvSpPr>
-          <p:cNvPr id="2" name="灯片编号占位符 1">
-            <a:extLst>
-              <a:ext uri="{FF2B5EF4-FFF2-40B4-BE49-F238E27FC236}">
-                <a16:creationId xmlns:a16="http://schemas.microsoft.com/office/drawing/2014/main" id="{6069CFEF-DCB2-EE8E-9109-DA0AEF336CD3}"/>
-              </a:ext>
-            </a:extLst>
-          </p:cNvPr>
-          <p:cNvSpPr>
-            <a:spLocks noGrp="1"/>
-          </p:cNvSpPr>
-          <p:nvPr>
-            <p:ph type="sldNum" sz="quarter" idx="12"/>
-          </p:nvPr>
-        </p:nvSpPr>
-        <p:spPr/>
-        <p:txBody>
-          <a:bodyPr/>
-          <a:lstStyle/>
-          <a:p>
-            <a:pPr fontAlgn="auto"/>
-            <a:fld id="{CA2E1F5A-C151-4DEE-93E4-F5F32EEAF57D}" type="slidenum">
-              <a:rPr lang="zh-CN" altLang="en-US" strike="noStrike" noProof="1" smtClean="0">
-                <a:latin typeface="+mn-lt"/>
-                <a:ea typeface="+mn-ea"/>
-                <a:cs typeface="+mn-cs"/>
-              </a:rPr>
-              <a:pPr fontAlgn="auto"/>
-              <a:t>8</a:t>
-            </a:fld>
-            <a:endParaRPr lang="zh-CN" altLang="en-US" strike="noStrike" noProof="1"/>
-          </a:p>
-        </p:txBody>
-      </p:sp>
-      <p:pic>
-        <p:nvPicPr>
-          <p:cNvPr id="6" name="图片 5">
-            <a:extLst>
-              <a:ext uri="{FF2B5EF4-FFF2-40B4-BE49-F238E27FC236}">
-                <a16:creationId xmlns:a16="http://schemas.microsoft.com/office/drawing/2014/main" id="{08A2AE65-21F0-BB40-6081-A5FC404C9DA8}"/>
-              </a:ext>
-            </a:extLst>
-          </p:cNvPr>
-          <p:cNvPicPr>
-            <a:picLocks noChangeAspect="1"/>
-          </p:cNvPicPr>
-          <p:nvPr/>
-        </p:nvPicPr>
-        <p:blipFill>
-          <a:blip r:embed="rId4">
-            <a:extLst>
-              <a:ext uri="{28A0092B-C50C-407E-A947-70E740481C1C}">
-                <a14:useLocalDpi xmlns:a14="http://schemas.microsoft.com/office/drawing/2010/main" val="0"/>
-              </a:ext>
-            </a:extLst>
-          </a:blip>
-          <a:stretch>
-            <a:fillRect/>
-          </a:stretch>
-        </p:blipFill>
-        <p:spPr>
-          <a:xfrm>
-            <a:off x="664431" y="1805531"/>
-            <a:ext cx="7541723" cy="4013559"/>
-          </a:xfrm>
-          <a:prstGeom prst="rect">
-            <a:avLst/>
-          </a:prstGeom>
-        </p:spPr>
-      </p:pic>
-    </p:spTree>
-    <p:extLst>
-      <p:ext uri="{BB962C8B-B14F-4D97-AF65-F5344CB8AC3E}">
-        <p14:creationId xmlns:p14="http://schemas.microsoft.com/office/powerpoint/2010/main" val="3605829571"/>
-      </p:ext>
-    </p:extLst>
-  </p:cSld>
-  <p:clrMapOvr>
-    <a:masterClrMapping/>
-  </p:clrMapOvr>
-  <p:transition>
-    <p:fade thruBlk="1"/>
-  </p:transition>
-</p:sld>
-</file>
-
-<file path=ppt/slides/slide9.xml><?xml version="1.0" encoding="utf-8"?>
-<p:sld xmlns:a="http://schemas.openxmlformats.org/drawingml/2006/main" xmlns:r="http://schemas.openxmlformats.org/officeDocument/2006/relationships" xmlns:p="http://schemas.openxmlformats.org/presentationml/2006/main" showMasterSp="0">
-  <p:cSld>
-    <p:bg>
-      <p:bgPr>
-        <a:blipFill rotWithShape="1">
-          <a:blip r:embed="rId2" cstate="print">
-            <a:alphaModFix amt="74000"/>
-          </a:blip>
-          <a:stretch>
-            <a:fillRect l="-15000" t="-9000" r="-4000" b="-1000"/>
-          </a:stretch>
-        </a:blipFill>
-        <a:effectLst/>
-      </p:bgPr>
-    </p:bg>
-    <p:spTree>
-      <p:nvGrpSpPr>
-        <p:cNvPr id="1" name="">
-          <a:extLst>
-            <a:ext uri="{FF2B5EF4-FFF2-40B4-BE49-F238E27FC236}">
-              <a16:creationId xmlns:a16="http://schemas.microsoft.com/office/drawing/2014/main" id="{3D5305F2-1267-6578-16DE-E7E484D26FAA}"/>
-            </a:ext>
-          </a:extLst>
-        </p:cNvPr>
-        <p:cNvGrpSpPr/>
-        <p:nvPr/>
-      </p:nvGrpSpPr>
-      <p:grpSpPr>
-        <a:xfrm>
-          <a:off x="0" y="0"/>
-          <a:ext cx="0" cy="0"/>
-          <a:chOff x="0" y="0"/>
-          <a:chExt cx="0" cy="0"/>
-        </a:xfrm>
-      </p:grpSpPr>
-      <p:grpSp>
-        <p:nvGrpSpPr>
-          <p:cNvPr id="52" name="组合 13">
-            <a:extLst>
-              <a:ext uri="{FF2B5EF4-FFF2-40B4-BE49-F238E27FC236}">
-                <a16:creationId xmlns:a16="http://schemas.microsoft.com/office/drawing/2014/main" id="{0B778E5F-4943-E79C-8231-A01BC59E7602}"/>
-              </a:ext>
-            </a:extLst>
-          </p:cNvPr>
-          <p:cNvGrpSpPr/>
-          <p:nvPr/>
-        </p:nvGrpSpPr>
-        <p:grpSpPr>
-          <a:xfrm>
-            <a:off x="695325" y="2082799"/>
-            <a:ext cx="3830902" cy="1247397"/>
-            <a:chOff x="695324" y="2082338"/>
-            <a:chExt cx="3545903" cy="1247733"/>
-          </a:xfrm>
-        </p:grpSpPr>
-        <p:sp>
-          <p:nvSpPr>
-            <p:cNvPr id="1048620" name="稻壳儿春秋广告/盗版必究        原创来源：http://chn.docer.com/works?userid=199329941#!/work_time">
-              <a:extLst>
-                <a:ext uri="{FF2B5EF4-FFF2-40B4-BE49-F238E27FC236}">
-                  <a16:creationId xmlns:a16="http://schemas.microsoft.com/office/drawing/2014/main" id="{6057AE25-2CDE-2A6B-CD1E-7A3A96CF5E6C}"/>
-                </a:ext>
-              </a:extLst>
-            </p:cNvPr>
-            <p:cNvSpPr txBox="1"/>
-            <p:nvPr/>
-          </p:nvSpPr>
-          <p:spPr>
-            <a:xfrm flipH="1">
-              <a:off x="695324" y="2806851"/>
-              <a:ext cx="3545903" cy="523220"/>
-            </a:xfrm>
-            <a:prstGeom prst="rect">
-              <a:avLst/>
-            </a:prstGeom>
-            <a:noFill/>
-            <a:ln w="9525">
-              <a:noFill/>
-            </a:ln>
-          </p:spPr>
-          <p:txBody>
-            <a:bodyPr wrap="square" anchor="t">
-              <a:spAutoFit/>
-            </a:bodyPr>
-            <a:lstStyle/>
-            <a:p>
-              <a:r>
-                <a:rPr lang="zh-CN" altLang="en-US" sz="2800" b="1" dirty="0">
-                  <a:solidFill>
-                    <a:srgbClr val="2D3E50"/>
-                  </a:solidFill>
-                  <a:latin typeface="黑体" pitchFamily="49" charset="-122"/>
-                  <a:ea typeface="黑体" pitchFamily="49" charset="-122"/>
-                  <a:sym typeface="SimSun-ExtB" panose="02010609060101010101" pitchFamily="49" charset="-122"/>
-                </a:rPr>
-                <a:t>现存问题</a:t>
-              </a:r>
-            </a:p>
-          </p:txBody>
-        </p:sp>
-        <p:sp>
-          <p:nvSpPr>
-            <p:cNvPr id="1048621" name="稻壳儿春秋广告/盗版必究        原创来源：http://chn.docer.com/works?userid=199329941#!/work_time">
-              <a:extLst>
-                <a:ext uri="{FF2B5EF4-FFF2-40B4-BE49-F238E27FC236}">
-                  <a16:creationId xmlns:a16="http://schemas.microsoft.com/office/drawing/2014/main" id="{C760F5A4-35E2-DA0B-3B53-40F10F528DD3}"/>
-                </a:ext>
-              </a:extLst>
-            </p:cNvPr>
-            <p:cNvSpPr txBox="1"/>
-            <p:nvPr/>
-          </p:nvSpPr>
-          <p:spPr>
-            <a:xfrm flipH="1">
-              <a:off x="695324" y="2082338"/>
-              <a:ext cx="2778958" cy="707886"/>
-            </a:xfrm>
-            <a:prstGeom prst="rect">
-              <a:avLst/>
-            </a:prstGeom>
-            <a:noFill/>
-            <a:ln w="9525">
-              <a:noFill/>
-            </a:ln>
-          </p:spPr>
-          <p:txBody>
-            <a:bodyPr wrap="square" anchor="t">
-              <a:spAutoFit/>
-            </a:bodyPr>
-            <a:lstStyle/>
-            <a:p>
-              <a:r>
-                <a:rPr lang="en-US" altLang="zh-CN" sz="4000" b="1" dirty="0">
-                  <a:gradFill>
-                    <a:gsLst>
-                      <a:gs pos="0">
-                        <a:srgbClr val="012D86"/>
-                      </a:gs>
-                      <a:gs pos="100000">
-                        <a:srgbClr val="0E2557"/>
-                      </a:gs>
-                    </a:gsLst>
-                    <a:lin scaled="0"/>
-                  </a:gradFill>
-                  <a:latin typeface="SimSun-ExtB" panose="02010609060101010101" pitchFamily="49" charset="-122"/>
-                  <a:ea typeface="微软雅黑 Light" panose="020B0502040204020203" pitchFamily="34" charset="-122"/>
-                  <a:sym typeface="SimSun-ExtB" panose="02010609060101010101" pitchFamily="49" charset="-122"/>
-                </a:rPr>
-                <a:t>PART 02</a:t>
-              </a:r>
-            </a:p>
-          </p:txBody>
-        </p:sp>
-      </p:grpSp>
-      <p:pic>
-        <p:nvPicPr>
-          <p:cNvPr id="2097156" name="图片 1" descr="理工灰">
-            <a:extLst>
-              <a:ext uri="{FF2B5EF4-FFF2-40B4-BE49-F238E27FC236}">
-                <a16:creationId xmlns:a16="http://schemas.microsoft.com/office/drawing/2014/main" id="{F3394123-3BAA-7E0F-91D5-FEFAD5E8A884}"/>
-              </a:ext>
-            </a:extLst>
-          </p:cNvPr>
-          <p:cNvPicPr>
-            <a:picLocks noChangeAspect="1"/>
-          </p:cNvPicPr>
-          <p:nvPr/>
-        </p:nvPicPr>
-        <p:blipFill>
-          <a:blip r:embed="rId3" cstate="print"/>
-          <a:stretch>
-            <a:fillRect/>
-          </a:stretch>
-        </p:blipFill>
-        <p:spPr>
-          <a:xfrm>
-            <a:off x="11095038" y="5745163"/>
-            <a:ext cx="846137" cy="730250"/>
-          </a:xfrm>
-          <a:prstGeom prst="rect">
-            <a:avLst/>
-          </a:prstGeom>
-          <a:noFill/>
-          <a:ln w="9525">
-            <a:noFill/>
-          </a:ln>
-        </p:spPr>
-      </p:pic>
-      <p:pic>
-        <p:nvPicPr>
-          <p:cNvPr id="2097157" name="图片 3" descr="理工灰">
-            <a:extLst>
-              <a:ext uri="{FF2B5EF4-FFF2-40B4-BE49-F238E27FC236}">
-                <a16:creationId xmlns:a16="http://schemas.microsoft.com/office/drawing/2014/main" id="{B7DFB1E8-FFBF-0D56-CC58-0E413CE789AB}"/>
-              </a:ext>
-            </a:extLst>
-          </p:cNvPr>
-          <p:cNvPicPr>
-            <a:picLocks noChangeAspect="1"/>
-          </p:cNvPicPr>
-          <p:nvPr/>
-        </p:nvPicPr>
-        <p:blipFill>
-          <a:blip r:embed="rId4" cstate="print"/>
-          <a:stretch>
-            <a:fillRect/>
-          </a:stretch>
-        </p:blipFill>
-        <p:spPr>
-          <a:xfrm>
-            <a:off x="11017250" y="279400"/>
-            <a:ext cx="873125" cy="752475"/>
-          </a:xfrm>
-          <a:prstGeom prst="rect">
-            <a:avLst/>
-          </a:prstGeom>
-          <a:noFill/>
-          <a:ln w="9525">
-            <a:noFill/>
-          </a:ln>
-        </p:spPr>
-      </p:pic>
-      <p:sp>
-        <p:nvSpPr>
-          <p:cNvPr id="2" name="灯片编号占位符 1">
-            <a:extLst>
-              <a:ext uri="{FF2B5EF4-FFF2-40B4-BE49-F238E27FC236}">
-                <a16:creationId xmlns:a16="http://schemas.microsoft.com/office/drawing/2014/main" id="{18802F67-890D-63E6-E315-4B401A2A77D7}"/>
-              </a:ext>
-            </a:extLst>
-          </p:cNvPr>
-          <p:cNvSpPr>
-            <a:spLocks noGrp="1"/>
-          </p:cNvSpPr>
-          <p:nvPr>
-            <p:ph type="sldNum" sz="quarter" idx="12"/>
-          </p:nvPr>
-        </p:nvSpPr>
-        <p:spPr/>
-        <p:txBody>
-          <a:bodyPr/>
-          <a:lstStyle/>
-          <a:p>
-            <a:pPr fontAlgn="auto"/>
-            <a:fld id="{CA2E1F5A-C151-4DEE-93E4-F5F32EEAF57D}" type="slidenum">
-              <a:rPr lang="zh-CN" altLang="en-US" strike="noStrike" noProof="1" smtClean="0">
-                <a:latin typeface="+mn-lt"/>
-                <a:ea typeface="+mn-ea"/>
-                <a:cs typeface="+mn-cs"/>
-              </a:rPr>
-              <a:pPr fontAlgn="auto"/>
-              <a:t>9</a:t>
-            </a:fld>
-            <a:endParaRPr lang="zh-CN" altLang="en-US" strike="noStrike" noProof="1"/>
-          </a:p>
-        </p:txBody>
-      </p:sp>
-    </p:spTree>
-    <p:extLst>
-      <p:ext uri="{BB962C8B-B14F-4D97-AF65-F5344CB8AC3E}">
-        <p14:creationId xmlns:p14="http://schemas.microsoft.com/office/powerpoint/2010/main" val="895125780"/>
-      </p:ext>
-    </p:extLst>
-  </p:cSld>
-  <p:clrMapOvr>
-    <a:masterClrMapping/>
-  </p:clrMapOvr>
-  <p:transition>
-    <p:wipe/>
   </p:transition>
 </p:sld>
 </file>

</xml_diff>